<commit_message>
added a few more slides to presentation
</commit_message>
<xml_diff>
--- a/Presentation/AL Toolkit.pptx
+++ b/Presentation/AL Toolkit.pptx
@@ -13,23 +13,25 @@
     <p:sldId id="261" r:id="rId7"/>
     <p:sldId id="262" r:id="rId8"/>
     <p:sldId id="263" r:id="rId9"/>
-    <p:sldId id="264" r:id="rId10"/>
-    <p:sldId id="265" r:id="rId11"/>
-    <p:sldId id="266" r:id="rId12"/>
-    <p:sldId id="267" r:id="rId13"/>
-    <p:sldId id="268" r:id="rId14"/>
-    <p:sldId id="269" r:id="rId15"/>
-    <p:sldId id="270" r:id="rId16"/>
-    <p:sldId id="271" r:id="rId17"/>
-    <p:sldId id="272" r:id="rId18"/>
-    <p:sldId id="273" r:id="rId19"/>
-    <p:sldId id="274" r:id="rId20"/>
-    <p:sldId id="275" r:id="rId21"/>
-    <p:sldId id="276" r:id="rId22"/>
-    <p:sldId id="277" r:id="rId23"/>
-    <p:sldId id="279" r:id="rId24"/>
-    <p:sldId id="278" r:id="rId25"/>
-    <p:sldId id="280" r:id="rId26"/>
+    <p:sldId id="281" r:id="rId10"/>
+    <p:sldId id="264" r:id="rId11"/>
+    <p:sldId id="265" r:id="rId12"/>
+    <p:sldId id="266" r:id="rId13"/>
+    <p:sldId id="267" r:id="rId14"/>
+    <p:sldId id="282" r:id="rId15"/>
+    <p:sldId id="268" r:id="rId16"/>
+    <p:sldId id="269" r:id="rId17"/>
+    <p:sldId id="270" r:id="rId18"/>
+    <p:sldId id="271" r:id="rId19"/>
+    <p:sldId id="272" r:id="rId20"/>
+    <p:sldId id="273" r:id="rId21"/>
+    <p:sldId id="274" r:id="rId22"/>
+    <p:sldId id="275" r:id="rId23"/>
+    <p:sldId id="276" r:id="rId24"/>
+    <p:sldId id="277" r:id="rId25"/>
+    <p:sldId id="279" r:id="rId26"/>
+    <p:sldId id="278" r:id="rId27"/>
+    <p:sldId id="280" r:id="rId28"/>
   </p:sldIdLst>
   <p:sldSz cx="12192000" cy="6858000"/>
   <p:notesSz cx="6858000" cy="9144000"/>
@@ -472,7 +474,7 @@
             <a:fld id="{5923F103-BC34-4FE4-A40E-EDDEECFDA5D0}" type="datetimeFigureOut">
               <a:rPr lang="en-US" dirty="0"/>
               <a:pPr/>
-              <a:t>6/18/2014</a:t>
+              <a:t>6/20/2014</a:t>
             </a:fld>
             <a:endParaRPr lang="en-US" dirty="0"/>
           </a:p>
@@ -1560,7 +1562,7 @@
           <a:p>
             <a:fld id="{923A1CC3-2375-41D4-9E03-427CAF2A4C1A}" type="datetimeFigureOut">
               <a:rPr lang="en-US" dirty="0"/>
-              <a:t>6/18/2014</a:t>
+              <a:t>6/20/2014</a:t>
             </a:fld>
             <a:endParaRPr lang="en-US" dirty="0"/>
           </a:p>
@@ -2540,7 +2542,7 @@
           <a:p>
             <a:fld id="{AFF16868-8199-4C2C-A5B1-63AEE139F88E}" type="datetimeFigureOut">
               <a:rPr lang="en-US" dirty="0"/>
-              <a:t>6/18/2014</a:t>
+              <a:t>6/20/2014</a:t>
             </a:fld>
             <a:endParaRPr lang="en-US" dirty="0"/>
           </a:p>
@@ -3674,7 +3676,7 @@
           <a:p>
             <a:fld id="{AAD9FF7F-6988-44CC-821B-644E70CD2F73}" type="datetimeFigureOut">
               <a:rPr lang="en-US" dirty="0"/>
-              <a:t>6/18/2014</a:t>
+              <a:t>6/20/2014</a:t>
             </a:fld>
             <a:endParaRPr lang="en-US" dirty="0"/>
           </a:p>
@@ -4707,7 +4709,7 @@
           <a:p>
             <a:fld id="{5C12C299-16B2-4475-990D-751901EACC14}" type="datetimeFigureOut">
               <a:rPr lang="en-US" dirty="0"/>
-              <a:t>6/18/2014</a:t>
+              <a:t>6/20/2014</a:t>
             </a:fld>
             <a:endParaRPr lang="en-US" dirty="0"/>
           </a:p>
@@ -5367,7 +5369,7 @@
           <a:p>
             <a:fld id="{9FE86839-B9D8-4651-8783-F325ECE74E65}" type="datetimeFigureOut">
               <a:rPr lang="en-US" dirty="0"/>
-              <a:t>6/18/2014</a:t>
+              <a:t>6/20/2014</a:t>
             </a:fld>
             <a:endParaRPr lang="en-US" dirty="0"/>
           </a:p>
@@ -6228,7 +6230,7 @@
           <a:p>
             <a:fld id="{FD484F64-32F6-45C5-931F-ADC1662401D0}" type="datetimeFigureOut">
               <a:rPr lang="en-US" dirty="0"/>
-              <a:t>6/18/2014</a:t>
+              <a:t>6/20/2014</a:t>
             </a:fld>
             <a:endParaRPr lang="en-US" dirty="0"/>
           </a:p>
@@ -6418,7 +6420,7 @@
           <a:p>
             <a:fld id="{53086D93-FCAC-47E0-A2EE-787E62CA814C}" type="datetimeFigureOut">
               <a:rPr lang="en-US" dirty="0"/>
-              <a:t>6/18/2014</a:t>
+              <a:t>6/20/2014</a:t>
             </a:fld>
             <a:endParaRPr lang="en-US" dirty="0"/>
           </a:p>
@@ -7390,7 +7392,7 @@
           <a:p>
             <a:fld id="{CDA879A6-0FD0-4734-A311-86BFCA472E6E}" type="datetimeFigureOut">
               <a:rPr lang="en-US" dirty="0"/>
-              <a:t>6/18/2014</a:t>
+              <a:t>6/20/2014</a:t>
             </a:fld>
             <a:endParaRPr lang="en-US" dirty="0"/>
           </a:p>
@@ -7601,7 +7603,7 @@
           <a:p>
             <a:fld id="{19C9CA7B-DFD4-44B5-8C60-D14B8CD1FB59}" type="datetimeFigureOut">
               <a:rPr lang="en-US" dirty="0"/>
-              <a:t>6/18/2014</a:t>
+              <a:t>6/20/2014</a:t>
             </a:fld>
             <a:endParaRPr lang="en-US" dirty="0"/>
           </a:p>
@@ -8635,7 +8637,7 @@
           <a:p>
             <a:fld id="{F34E6425-0181-43F2-84FC-787E803FD2F8}" type="datetimeFigureOut">
               <a:rPr lang="en-US" dirty="0"/>
-              <a:t>6/18/2014</a:t>
+              <a:t>6/20/2014</a:t>
             </a:fld>
             <a:endParaRPr lang="en-US" dirty="0"/>
           </a:p>
@@ -8907,7 +8909,7 @@
           <a:p>
             <a:fld id="{3BDB8791-F1B0-41E7-B7FD-A781E65C4266}" type="datetimeFigureOut">
               <a:rPr lang="en-US" dirty="0"/>
-              <a:t>6/18/2014</a:t>
+              <a:t>6/20/2014</a:t>
             </a:fld>
             <a:endParaRPr lang="en-US" dirty="0"/>
           </a:p>
@@ -9317,7 +9319,7 @@
           <a:p>
             <a:fld id="{5FDD63B2-E120-4ED8-B27B-C685F510A5FE}" type="datetimeFigureOut">
               <a:rPr lang="en-US" dirty="0"/>
-              <a:t>6/18/2014</a:t>
+              <a:t>6/20/2014</a:t>
             </a:fld>
             <a:endParaRPr lang="en-US" dirty="0"/>
           </a:p>
@@ -9444,7 +9446,7 @@
           <a:p>
             <a:fld id="{7AA18ACC-A947-437B-A130-35BD54FDF1E9}" type="datetimeFigureOut">
               <a:rPr lang="en-US" dirty="0"/>
-              <a:t>6/18/2014</a:t>
+              <a:t>6/20/2014</a:t>
             </a:fld>
             <a:endParaRPr lang="en-US" dirty="0"/>
           </a:p>
@@ -9539,7 +9541,7 @@
           <a:p>
             <a:fld id="{7C8D7E02-BCB8-4D50-A234-369438C08659}" type="datetimeFigureOut">
               <a:rPr lang="en-US" dirty="0"/>
-              <a:t>6/18/2014</a:t>
+              <a:t>6/20/2014</a:t>
             </a:fld>
             <a:endParaRPr lang="en-US" dirty="0"/>
           </a:p>
@@ -10620,7 +10622,7 @@
           <a:p>
             <a:fld id="{76E86A4C-8E40-4F87-A4F0-01A0687C5742}" type="datetimeFigureOut">
               <a:rPr lang="en-US" dirty="0"/>
-              <a:t>6/18/2014</a:t>
+              <a:t>6/20/2014</a:t>
             </a:fld>
             <a:endParaRPr lang="en-US" dirty="0"/>
           </a:p>
@@ -11728,7 +11730,7 @@
           <a:p>
             <a:fld id="{35E72C73-2D91-4E12-BA25-F0AA0C03599B}" type="datetimeFigureOut">
               <a:rPr lang="en-US" dirty="0"/>
-              <a:t>6/18/2014</a:t>
+              <a:t>6/20/2014</a:t>
             </a:fld>
             <a:endParaRPr lang="en-US" dirty="0"/>
           </a:p>
@@ -12725,7 +12727,7 @@
           <a:p>
             <a:fld id="{2BE451C3-0FF4-47C4-B829-773ADF60F88C}" type="datetimeFigureOut">
               <a:rPr lang="en-US" dirty="0"/>
-              <a:t>6/18/2014</a:t>
+              <a:t>6/20/2014</a:t>
             </a:fld>
             <a:endParaRPr lang="en-US" dirty="0"/>
           </a:p>
@@ -13413,7 +13415,7 @@
       </p:grpSpPr>
       <p:sp>
         <p:nvSpPr>
-          <p:cNvPr id="6" name="Title 5"/>
+          <p:cNvPr id="2" name="Title 1"/>
           <p:cNvSpPr>
             <a:spLocks noGrp="1"/>
           </p:cNvSpPr>
@@ -13428,7 +13430,7 @@
           <a:p>
             <a:r>
               <a:rPr lang="en-GB" dirty="0" smtClean="0"/>
-              <a:t>Argumentation Logic Toolkit – Plan</a:t>
+              <a:t>The Point of it All</a:t>
             </a:r>
             <a:endParaRPr lang="en-US" dirty="0"/>
           </a:p>
@@ -13436,7 +13438,7 @@
       </p:sp>
       <p:sp>
         <p:nvSpPr>
-          <p:cNvPr id="5" name="Text Placeholder 4"/>
+          <p:cNvPr id="3" name="Content Placeholder 2"/>
           <p:cNvSpPr>
             <a:spLocks noGrp="1"/>
           </p:cNvSpPr>
@@ -13451,60 +13453,7 @@
           <a:p>
             <a:r>
               <a:rPr lang="en-GB" dirty="0" smtClean="0"/>
-              <a:t>Step 1: Generic Theorem </a:t>
-            </a:r>
-            <a:r>
-              <a:rPr lang="en-GB" dirty="0" err="1" smtClean="0"/>
-              <a:t>Prover</a:t>
-            </a:r>
-            <a:endParaRPr lang="en-GB" dirty="0" smtClean="0"/>
-          </a:p>
-          <a:p>
-            <a:r>
-              <a:rPr lang="en-GB" dirty="0" smtClean="0"/>
-              <a:t>Step 2: Theorem </a:t>
-            </a:r>
-            <a:r>
-              <a:rPr lang="en-GB" dirty="0" err="1" smtClean="0"/>
-              <a:t>Prover</a:t>
-            </a:r>
-            <a:r>
-              <a:rPr lang="en-GB" dirty="0" smtClean="0"/>
-              <a:t> fit for purpose</a:t>
-            </a:r>
-          </a:p>
-          <a:p>
-            <a:r>
-              <a:rPr lang="en-GB" dirty="0" smtClean="0"/>
-              <a:t>Step 3: Genuine Absurdity Property check</a:t>
-            </a:r>
-          </a:p>
-          <a:p>
-            <a:r>
-              <a:rPr lang="en-GB" dirty="0" smtClean="0"/>
-              <a:t>Step 4: Visualize GAP Proofs</a:t>
-            </a:r>
-          </a:p>
-          <a:p>
-            <a:r>
-              <a:rPr lang="en-GB" dirty="0" smtClean="0"/>
-              <a:t>Step 5: Convert non-GAP to GAP Proofs</a:t>
-            </a:r>
-          </a:p>
-          <a:p>
-            <a:r>
-              <a:rPr lang="en-GB" dirty="0" smtClean="0"/>
-              <a:t>Step 6: Introduce Disjunction and Implication</a:t>
-            </a:r>
-          </a:p>
-          <a:p>
-            <a:r>
-              <a:rPr lang="en-GB" dirty="0" smtClean="0"/>
-              <a:t>Step 7: Venture into </a:t>
-            </a:r>
-            <a:r>
-              <a:rPr lang="en-GB" dirty="0" err="1" smtClean="0"/>
-              <a:t>Paraconsistency</a:t>
+              <a:t>GAP ↔ NACC (for consistent theories)</a:t>
             </a:r>
             <a:endParaRPr lang="en-US" dirty="0"/>
           </a:p>
@@ -13513,7 +13462,7 @@
     </p:spTree>
     <p:extLst>
       <p:ext uri="{BB962C8B-B14F-4D97-AF65-F5344CB8AC3E}">
-        <p14:creationId xmlns:p14="http://schemas.microsoft.com/office/powerpoint/2010/main" val="3524301658"/>
+        <p14:creationId xmlns:p14="http://schemas.microsoft.com/office/powerpoint/2010/main" val="3882039320"/>
       </p:ext>
     </p:extLst>
   </p:cSld>
@@ -13549,7 +13498,7 @@
       </p:grpSpPr>
       <p:sp>
         <p:nvSpPr>
-          <p:cNvPr id="2" name="Title 1"/>
+          <p:cNvPr id="6" name="Title 5"/>
           <p:cNvSpPr>
             <a:spLocks noGrp="1"/>
           </p:cNvSpPr>
@@ -13572,84 +13521,107 @@
       </p:sp>
       <p:sp>
         <p:nvSpPr>
-          <p:cNvPr id="3" name="Content Placeholder 2"/>
+          <p:cNvPr id="5" name="Text Placeholder 4"/>
           <p:cNvSpPr>
             <a:spLocks noGrp="1"/>
           </p:cNvSpPr>
           <p:nvPr>
-            <p:ph idx="1"/>
+            <p:ph sz="half" idx="1"/>
           </p:nvPr>
         </p:nvSpPr>
         <p:spPr/>
         <p:txBody>
-          <a:bodyPr/>
+          <a:bodyPr>
+            <a:normAutofit lnSpcReduction="10000"/>
+          </a:bodyPr>
           <a:lstStyle/>
           <a:p>
             <a:r>
-              <a:rPr lang="en-GB" dirty="0"/>
+              <a:rPr lang="en-GB" dirty="0" smtClean="0"/>
               <a:t>Step 1: Generic Theorem </a:t>
             </a:r>
             <a:r>
-              <a:rPr lang="en-GB" dirty="0" err="1"/>
+              <a:rPr lang="en-GB" dirty="0" err="1" smtClean="0"/>
               <a:t>Prover</a:t>
             </a:r>
-            <a:endParaRPr lang="en-GB" dirty="0"/>
-          </a:p>
-          <a:p>
-            <a:r>
-              <a:rPr lang="en-GB" dirty="0"/>
+            <a:endParaRPr lang="en-GB" dirty="0" smtClean="0"/>
+          </a:p>
+          <a:p>
+            <a:r>
+              <a:rPr lang="en-GB" dirty="0" smtClean="0"/>
               <a:t>Step 2: Theorem </a:t>
             </a:r>
             <a:r>
-              <a:rPr lang="en-GB" dirty="0" err="1"/>
+              <a:rPr lang="en-GB" dirty="0" err="1" smtClean="0"/>
               <a:t>Prover</a:t>
             </a:r>
             <a:r>
-              <a:rPr lang="en-GB" dirty="0"/>
+              <a:rPr lang="en-GB" dirty="0" smtClean="0"/>
               <a:t> fit for purpose</a:t>
             </a:r>
           </a:p>
           <a:p>
             <a:r>
-              <a:rPr lang="en-GB" dirty="0"/>
+              <a:rPr lang="en-GB" dirty="0" smtClean="0"/>
               <a:t>Step 3: Genuine Absurdity Property check</a:t>
             </a:r>
           </a:p>
           <a:p>
             <a:r>
-              <a:rPr lang="en-GB" dirty="0"/>
+              <a:rPr lang="en-GB" dirty="0" smtClean="0"/>
               <a:t>Step 4: Visualize GAP Proofs</a:t>
             </a:r>
           </a:p>
           <a:p>
             <a:r>
-              <a:rPr lang="en-GB" strike="sngStrike" dirty="0"/>
+              <a:rPr lang="en-GB" dirty="0" smtClean="0"/>
               <a:t>Step 5: Convert non-GAP to GAP Proofs</a:t>
             </a:r>
           </a:p>
           <a:p>
             <a:r>
-              <a:rPr lang="en-GB" strike="sngStrike" dirty="0"/>
+              <a:rPr lang="en-GB" dirty="0" smtClean="0"/>
               <a:t>Step 6: Introduce Disjunction and Implication</a:t>
             </a:r>
           </a:p>
           <a:p>
             <a:r>
-              <a:rPr lang="en-GB" strike="sngStrike" dirty="0"/>
+              <a:rPr lang="en-GB" dirty="0" smtClean="0"/>
               <a:t>Step 7: Venture into </a:t>
             </a:r>
             <a:r>
-              <a:rPr lang="en-GB" strike="sngStrike" dirty="0" err="1" smtClean="0"/>
+              <a:rPr lang="en-GB" dirty="0" err="1" smtClean="0"/>
               <a:t>Paraconsistency</a:t>
             </a:r>
-            <a:endParaRPr lang="en-US" strike="sngStrike" dirty="0"/>
+            <a:endParaRPr lang="en-US" dirty="0"/>
+          </a:p>
+        </p:txBody>
+      </p:sp>
+      <p:sp>
+        <p:nvSpPr>
+          <p:cNvPr id="2" name="Content Placeholder 1"/>
+          <p:cNvSpPr>
+            <a:spLocks noGrp="1"/>
+          </p:cNvSpPr>
+          <p:nvPr>
+            <p:ph sz="half" idx="2"/>
+          </p:nvPr>
+        </p:nvSpPr>
+        <p:spPr/>
+        <p:txBody>
+          <a:bodyPr>
+            <a:normAutofit lnSpcReduction="10000"/>
+          </a:bodyPr>
+          <a:lstStyle/>
+          <a:p>
+            <a:endParaRPr lang="en-US"/>
           </a:p>
         </p:txBody>
       </p:sp>
     </p:spTree>
     <p:extLst>
       <p:ext uri="{BB962C8B-B14F-4D97-AF65-F5344CB8AC3E}">
-        <p14:creationId xmlns:p14="http://schemas.microsoft.com/office/powerpoint/2010/main" val="1763630168"/>
+        <p14:creationId xmlns:p14="http://schemas.microsoft.com/office/powerpoint/2010/main" val="3524301658"/>
       </p:ext>
     </p:extLst>
   </p:cSld>
@@ -13713,13 +13685,13 @@
             <a:spLocks noGrp="1"/>
           </p:cNvSpPr>
           <p:nvPr>
-            <p:ph idx="1"/>
+            <p:ph sz="half" idx="1"/>
           </p:nvPr>
         </p:nvSpPr>
         <p:spPr/>
         <p:txBody>
           <a:bodyPr>
-            <a:normAutofit/>
+            <a:normAutofit lnSpcReduction="10000"/>
           </a:bodyPr>
           <a:lstStyle/>
           <a:p>
@@ -13728,17 +13700,10 @@
               <a:t>Step 1: Generic Theorem </a:t>
             </a:r>
             <a:r>
-              <a:rPr lang="en-GB" dirty="0" err="1" smtClean="0"/>
+              <a:rPr lang="en-GB" dirty="0" err="1"/>
               <a:t>Prover</a:t>
             </a:r>
-            <a:endParaRPr lang="en-GB" dirty="0" smtClean="0"/>
-          </a:p>
-          <a:p>
-            <a:r>
-              <a:rPr lang="en-GB" b="1" dirty="0" smtClean="0"/>
-              <a:t>Step 1+: Proof Builder</a:t>
-            </a:r>
-            <a:endParaRPr lang="en-GB" b="1" dirty="0"/>
+            <a:endParaRPr lang="en-GB" dirty="0"/>
           </a:p>
           <a:p>
             <a:r>
@@ -13757,50 +13722,65 @@
           <a:p>
             <a:r>
               <a:rPr lang="en-GB" dirty="0"/>
-              <a:t>Step 3: Genuine Absurdity Property </a:t>
-            </a:r>
-            <a:r>
-              <a:rPr lang="en-GB" dirty="0" smtClean="0"/>
-              <a:t>check</a:t>
-            </a:r>
-          </a:p>
-          <a:p>
-            <a:r>
-              <a:rPr lang="en-GB" b="1" dirty="0" smtClean="0"/>
-              <a:t>Step 3+: Extended Genuine Absurdity Property</a:t>
-            </a:r>
-            <a:endParaRPr lang="en-GB" b="1" dirty="0"/>
+              <a:t>Step 3: Genuine Absurdity Property check</a:t>
+            </a:r>
           </a:p>
           <a:p>
             <a:r>
               <a:rPr lang="en-GB" dirty="0"/>
-              <a:t>Step 4: Visualize GAP </a:t>
-            </a:r>
-            <a:r>
-              <a:rPr lang="en-GB" dirty="0" smtClean="0"/>
-              <a:t>Proofs</a:t>
-            </a:r>
-          </a:p>
-          <a:p>
-            <a:r>
-              <a:rPr lang="en-GB" b="1" dirty="0" smtClean="0"/>
-              <a:t>Step 4+: Extract Proofs from Arguments</a:t>
-            </a:r>
-            <a:endParaRPr lang="en-GB" b="1" dirty="0"/>
-          </a:p>
-          <a:p>
-            <a:r>
-              <a:rPr lang="en-GB" b="1" dirty="0" smtClean="0"/>
-              <a:t>Step 4++: Argument Builder</a:t>
-            </a:r>
-            <a:endParaRPr lang="en-US" b="1" dirty="0"/>
+              <a:t>Step 4: Visualize GAP Proofs</a:t>
+            </a:r>
+          </a:p>
+          <a:p>
+            <a:r>
+              <a:rPr lang="en-GB" strike="sngStrike" dirty="0"/>
+              <a:t>Step 5: Convert non-GAP to GAP Proofs</a:t>
+            </a:r>
+          </a:p>
+          <a:p>
+            <a:r>
+              <a:rPr lang="en-GB" strike="sngStrike" dirty="0"/>
+              <a:t>Step 6: Introduce Disjunction and Implication</a:t>
+            </a:r>
+          </a:p>
+          <a:p>
+            <a:r>
+              <a:rPr lang="en-GB" strike="sngStrike" dirty="0"/>
+              <a:t>Step 7: Venture into </a:t>
+            </a:r>
+            <a:r>
+              <a:rPr lang="en-GB" strike="sngStrike" dirty="0" err="1" smtClean="0"/>
+              <a:t>Paraconsistency</a:t>
+            </a:r>
+            <a:endParaRPr lang="en-US" strike="sngStrike" dirty="0"/>
+          </a:p>
+        </p:txBody>
+      </p:sp>
+      <p:sp>
+        <p:nvSpPr>
+          <p:cNvPr id="4" name="Content Placeholder 3"/>
+          <p:cNvSpPr>
+            <a:spLocks noGrp="1"/>
+          </p:cNvSpPr>
+          <p:nvPr>
+            <p:ph sz="half" idx="2"/>
+          </p:nvPr>
+        </p:nvSpPr>
+        <p:spPr/>
+        <p:txBody>
+          <a:bodyPr>
+            <a:normAutofit lnSpcReduction="10000"/>
+          </a:bodyPr>
+          <a:lstStyle/>
+          <a:p>
+            <a:endParaRPr lang="en-US"/>
           </a:p>
         </p:txBody>
       </p:sp>
     </p:spTree>
     <p:extLst>
       <p:ext uri="{BB962C8B-B14F-4D97-AF65-F5344CB8AC3E}">
-        <p14:creationId xmlns:p14="http://schemas.microsoft.com/office/powerpoint/2010/main" val="1382299492"/>
+        <p14:creationId xmlns:p14="http://schemas.microsoft.com/office/powerpoint/2010/main" val="1763630168"/>
       </p:ext>
     </p:extLst>
   </p:cSld>
@@ -13851,6 +13831,301 @@
           <a:p>
             <a:r>
               <a:rPr lang="en-GB" dirty="0" smtClean="0"/>
+              <a:t>Argumentation Logic Toolkit – Plan</a:t>
+            </a:r>
+            <a:endParaRPr lang="en-US" dirty="0"/>
+          </a:p>
+        </p:txBody>
+      </p:sp>
+      <p:sp>
+        <p:nvSpPr>
+          <p:cNvPr id="3" name="Content Placeholder 2"/>
+          <p:cNvSpPr>
+            <a:spLocks noGrp="1"/>
+          </p:cNvSpPr>
+          <p:nvPr>
+            <p:ph sz="half" idx="1"/>
+          </p:nvPr>
+        </p:nvSpPr>
+        <p:spPr/>
+        <p:txBody>
+          <a:bodyPr>
+            <a:normAutofit lnSpcReduction="10000"/>
+          </a:bodyPr>
+          <a:lstStyle/>
+          <a:p>
+            <a:r>
+              <a:rPr lang="en-GB" dirty="0"/>
+              <a:t>Step 1: Generic Theorem </a:t>
+            </a:r>
+            <a:r>
+              <a:rPr lang="en-GB" dirty="0" err="1" smtClean="0"/>
+              <a:t>Prover</a:t>
+            </a:r>
+            <a:endParaRPr lang="en-GB" dirty="0" smtClean="0"/>
+          </a:p>
+          <a:p>
+            <a:r>
+              <a:rPr lang="en-GB" dirty="0" smtClean="0"/>
+              <a:t>Step </a:t>
+            </a:r>
+            <a:r>
+              <a:rPr lang="en-GB" dirty="0"/>
+              <a:t>2: Theorem </a:t>
+            </a:r>
+            <a:r>
+              <a:rPr lang="en-GB" dirty="0" err="1"/>
+              <a:t>Prover</a:t>
+            </a:r>
+            <a:r>
+              <a:rPr lang="en-GB" dirty="0"/>
+              <a:t> fit for purpose</a:t>
+            </a:r>
+          </a:p>
+          <a:p>
+            <a:r>
+              <a:rPr lang="en-GB" dirty="0"/>
+              <a:t>Step 3: Genuine Absurdity Property </a:t>
+            </a:r>
+            <a:r>
+              <a:rPr lang="en-GB" dirty="0" smtClean="0"/>
+              <a:t>check</a:t>
+            </a:r>
+          </a:p>
+          <a:p>
+            <a:r>
+              <a:rPr lang="en-GB" dirty="0" smtClean="0"/>
+              <a:t>Step </a:t>
+            </a:r>
+            <a:r>
+              <a:rPr lang="en-GB" dirty="0"/>
+              <a:t>4: Visualize GAP </a:t>
+            </a:r>
+            <a:r>
+              <a:rPr lang="en-GB" dirty="0" smtClean="0"/>
+              <a:t>Proofs</a:t>
+            </a:r>
+          </a:p>
+          <a:p>
+            <a:r>
+              <a:rPr lang="en-GB" strike="sngStrike" dirty="0" smtClean="0"/>
+              <a:t>Step </a:t>
+            </a:r>
+            <a:r>
+              <a:rPr lang="en-GB" strike="sngStrike" dirty="0"/>
+              <a:t>5: Convert non-GAP to GAP Proofs</a:t>
+            </a:r>
+          </a:p>
+          <a:p>
+            <a:r>
+              <a:rPr lang="en-GB" strike="sngStrike" dirty="0"/>
+              <a:t>Step 6: Introduce Disjunction and Implication</a:t>
+            </a:r>
+          </a:p>
+          <a:p>
+            <a:r>
+              <a:rPr lang="en-GB" strike="sngStrike" dirty="0"/>
+              <a:t>Step 7: Venture into </a:t>
+            </a:r>
+            <a:r>
+              <a:rPr lang="en-GB" strike="sngStrike" dirty="0" err="1"/>
+              <a:t>Paraconsistency</a:t>
+            </a:r>
+            <a:endParaRPr lang="en-US" strike="sngStrike" dirty="0"/>
+          </a:p>
+          <a:p>
+            <a:endParaRPr lang="en-US" b="1" dirty="0"/>
+          </a:p>
+        </p:txBody>
+      </p:sp>
+      <p:sp>
+        <p:nvSpPr>
+          <p:cNvPr id="4" name="Content Placeholder 3"/>
+          <p:cNvSpPr>
+            <a:spLocks noGrp="1"/>
+          </p:cNvSpPr>
+          <p:nvPr>
+            <p:ph sz="half" idx="2"/>
+          </p:nvPr>
+        </p:nvSpPr>
+        <p:spPr/>
+        <p:txBody>
+          <a:bodyPr>
+            <a:normAutofit lnSpcReduction="10000"/>
+          </a:bodyPr>
+          <a:lstStyle/>
+          <a:p>
+            <a:r>
+              <a:rPr lang="en-GB" b="1" dirty="0"/>
+              <a:t>Step 1+: Proof Builder</a:t>
+            </a:r>
+          </a:p>
+          <a:p>
+            <a:r>
+              <a:rPr lang="en-GB" b="1" dirty="0"/>
+              <a:t>Step 3+: Extended Genuine Absurdity Property</a:t>
+            </a:r>
+          </a:p>
+          <a:p>
+            <a:r>
+              <a:rPr lang="en-GB" b="1" dirty="0"/>
+              <a:t>Step 4+: Extract Proofs from Arguments</a:t>
+            </a:r>
+          </a:p>
+          <a:p>
+            <a:r>
+              <a:rPr lang="en-GB" b="1" dirty="0"/>
+              <a:t>Step 4++: Argument Builder</a:t>
+            </a:r>
+          </a:p>
+          <a:p>
+            <a:endParaRPr lang="en-US" dirty="0"/>
+          </a:p>
+        </p:txBody>
+      </p:sp>
+    </p:spTree>
+    <p:extLst>
+      <p:ext uri="{BB962C8B-B14F-4D97-AF65-F5344CB8AC3E}">
+        <p14:creationId xmlns:p14="http://schemas.microsoft.com/office/powerpoint/2010/main" val="1382299492"/>
+      </p:ext>
+    </p:extLst>
+  </p:cSld>
+  <p:clrMapOvr>
+    <a:masterClrMapping/>
+  </p:clrMapOvr>
+  <p:timing>
+    <p:tnLst>
+      <p:par>
+        <p:cTn id="1" dur="indefinite" restart="never" nodeType="tmRoot"/>
+      </p:par>
+    </p:tnLst>
+  </p:timing>
+</p:sld>
+</file>
+
+<file path=ppt/slides/slide14.xml><?xml version="1.0" encoding="utf-8"?>
+<p:sld xmlns:a="http://schemas.openxmlformats.org/drawingml/2006/main" xmlns:r="http://schemas.openxmlformats.org/officeDocument/2006/relationships" xmlns:p="http://schemas.openxmlformats.org/presentationml/2006/main">
+  <p:cSld>
+    <p:spTree>
+      <p:nvGrpSpPr>
+        <p:cNvPr id="1" name=""/>
+        <p:cNvGrpSpPr/>
+        <p:nvPr/>
+      </p:nvGrpSpPr>
+      <p:grpSpPr>
+        <a:xfrm>
+          <a:off x="0" y="0"/>
+          <a:ext cx="0" cy="0"/>
+          <a:chOff x="0" y="0"/>
+          <a:chExt cx="0" cy="0"/>
+        </a:xfrm>
+      </p:grpSpPr>
+      <p:sp>
+        <p:nvSpPr>
+          <p:cNvPr id="5" name="Title 4"/>
+          <p:cNvSpPr>
+            <a:spLocks noGrp="1"/>
+          </p:cNvSpPr>
+          <p:nvPr>
+            <p:ph type="title"/>
+          </p:nvPr>
+        </p:nvSpPr>
+        <p:spPr/>
+        <p:txBody>
+          <a:bodyPr/>
+          <a:lstStyle/>
+          <a:p>
+            <a:r>
+              <a:rPr lang="en-GB" dirty="0" smtClean="0"/>
+              <a:t>Flowchart</a:t>
+            </a:r>
+            <a:endParaRPr lang="en-US" dirty="0"/>
+          </a:p>
+        </p:txBody>
+      </p:sp>
+      <p:pic>
+        <p:nvPicPr>
+          <p:cNvPr id="7" name="Content Placeholder 6"/>
+          <p:cNvPicPr>
+            <a:picLocks noGrp="1" noChangeAspect="1"/>
+          </p:cNvPicPr>
+          <p:nvPr>
+            <p:ph idx="1"/>
+          </p:nvPr>
+        </p:nvPicPr>
+        <p:blipFill>
+          <a:blip r:embed="rId2">
+            <a:extLst>
+              <a:ext uri="{28A0092B-C50C-407E-A947-70E740481C1C}">
+                <a14:useLocalDpi xmlns:a14="http://schemas.microsoft.com/office/drawing/2010/main" val="0"/>
+              </a:ext>
+            </a:extLst>
+          </a:blip>
+          <a:stretch>
+            <a:fillRect/>
+          </a:stretch>
+        </p:blipFill>
+        <p:spPr>
+          <a:xfrm>
+            <a:off x="2364809" y="2603500"/>
+            <a:ext cx="6406695" cy="3416300"/>
+          </a:xfrm>
+        </p:spPr>
+      </p:pic>
+    </p:spTree>
+    <p:extLst>
+      <p:ext uri="{BB962C8B-B14F-4D97-AF65-F5344CB8AC3E}">
+        <p14:creationId xmlns:p14="http://schemas.microsoft.com/office/powerpoint/2010/main" val="4063018443"/>
+      </p:ext>
+    </p:extLst>
+  </p:cSld>
+  <p:clrMapOvr>
+    <a:masterClrMapping/>
+  </p:clrMapOvr>
+  <p:timing>
+    <p:tnLst>
+      <p:par>
+        <p:cTn id="1" dur="indefinite" restart="never" nodeType="tmRoot"/>
+      </p:par>
+    </p:tnLst>
+  </p:timing>
+</p:sld>
+</file>
+
+<file path=ppt/slides/slide15.xml><?xml version="1.0" encoding="utf-8"?>
+<p:sld xmlns:a="http://schemas.openxmlformats.org/drawingml/2006/main" xmlns:r="http://schemas.openxmlformats.org/officeDocument/2006/relationships" xmlns:p="http://schemas.openxmlformats.org/presentationml/2006/main">
+  <p:cSld>
+    <p:spTree>
+      <p:nvGrpSpPr>
+        <p:cNvPr id="1" name=""/>
+        <p:cNvGrpSpPr/>
+        <p:nvPr/>
+      </p:nvGrpSpPr>
+      <p:grpSpPr>
+        <a:xfrm>
+          <a:off x="0" y="0"/>
+          <a:ext cx="0" cy="0"/>
+          <a:chOff x="0" y="0"/>
+          <a:chExt cx="0" cy="0"/>
+        </a:xfrm>
+      </p:grpSpPr>
+      <p:sp>
+        <p:nvSpPr>
+          <p:cNvPr id="2" name="Title 1"/>
+          <p:cNvSpPr>
+            <a:spLocks noGrp="1"/>
+          </p:cNvSpPr>
+          <p:nvPr>
+            <p:ph type="title"/>
+          </p:nvPr>
+        </p:nvSpPr>
+        <p:spPr/>
+        <p:txBody>
+          <a:bodyPr/>
+          <a:lstStyle/>
+          <a:p>
+            <a:r>
+              <a:rPr lang="en-GB" dirty="0" smtClean="0"/>
               <a:t>Solution Architecture</a:t>
             </a:r>
             <a:endParaRPr lang="en-US" dirty="0"/>
@@ -13963,7 +14238,7 @@
 </p:sld>
 </file>
 
-<file path=ppt/slides/slide14.xml><?xml version="1.0" encoding="utf-8"?>
+<file path=ppt/slides/slide16.xml><?xml version="1.0" encoding="utf-8"?>
 <p:sld xmlns:a="http://schemas.openxmlformats.org/drawingml/2006/main" xmlns:r="http://schemas.openxmlformats.org/officeDocument/2006/relationships" xmlns:p="http://schemas.openxmlformats.org/presentationml/2006/main">
   <p:cSld>
     <p:spTree>
@@ -14176,7 +14451,7 @@
 </p:sld>
 </file>
 
-<file path=ppt/slides/slide15.xml><?xml version="1.0" encoding="utf-8"?>
+<file path=ppt/slides/slide17.xml><?xml version="1.0" encoding="utf-8"?>
 <p:sld xmlns:a="http://schemas.openxmlformats.org/drawingml/2006/main" xmlns:r="http://schemas.openxmlformats.org/officeDocument/2006/relationships" xmlns:p="http://schemas.openxmlformats.org/presentationml/2006/main">
   <p:cSld>
     <p:spTree>
@@ -14278,7 +14553,7 @@
 </p:sld>
 </file>
 
-<file path=ppt/slides/slide16.xml><?xml version="1.0" encoding="utf-8"?>
+<file path=ppt/slides/slide18.xml><?xml version="1.0" encoding="utf-8"?>
 <p:sld xmlns:a="http://schemas.openxmlformats.org/drawingml/2006/main" xmlns:r="http://schemas.openxmlformats.org/officeDocument/2006/relationships" xmlns:p="http://schemas.openxmlformats.org/presentationml/2006/main">
   <p:cSld>
     <p:spTree>
@@ -14405,7 +14680,7 @@
 </p:sld>
 </file>
 
-<file path=ppt/slides/slide17.xml><?xml version="1.0" encoding="utf-8"?>
+<file path=ppt/slides/slide19.xml><?xml version="1.0" encoding="utf-8"?>
 <p:sld xmlns:a="http://schemas.openxmlformats.org/drawingml/2006/main" xmlns:r="http://schemas.openxmlformats.org/officeDocument/2006/relationships" xmlns:p="http://schemas.openxmlformats.org/presentationml/2006/main">
   <p:cSld>
     <p:spTree>
@@ -14881,394 +15156,6 @@
 </p:sld>
 </file>
 
-<file path=ppt/slides/slide18.xml><?xml version="1.0" encoding="utf-8"?>
-<p:sld xmlns:a="http://schemas.openxmlformats.org/drawingml/2006/main" xmlns:r="http://schemas.openxmlformats.org/officeDocument/2006/relationships" xmlns:p="http://schemas.openxmlformats.org/presentationml/2006/main">
-  <p:cSld>
-    <p:spTree>
-      <p:nvGrpSpPr>
-        <p:cNvPr id="1" name=""/>
-        <p:cNvGrpSpPr/>
-        <p:nvPr/>
-      </p:nvGrpSpPr>
-      <p:grpSpPr>
-        <a:xfrm>
-          <a:off x="0" y="0"/>
-          <a:ext cx="0" cy="0"/>
-          <a:chOff x="0" y="0"/>
-          <a:chExt cx="0" cy="0"/>
-        </a:xfrm>
-      </p:grpSpPr>
-      <p:sp>
-        <p:nvSpPr>
-          <p:cNvPr id="2" name="Title 1"/>
-          <p:cNvSpPr>
-            <a:spLocks noGrp="1"/>
-          </p:cNvSpPr>
-          <p:nvPr>
-            <p:ph type="title"/>
-          </p:nvPr>
-        </p:nvSpPr>
-        <p:spPr/>
-        <p:txBody>
-          <a:bodyPr/>
-          <a:lstStyle/>
-          <a:p>
-            <a:r>
-              <a:rPr lang="en-GB" dirty="0" smtClean="0"/>
-              <a:t>Step 4: Visualizing GAP Proofs</a:t>
-            </a:r>
-            <a:endParaRPr lang="en-US" dirty="0"/>
-          </a:p>
-        </p:txBody>
-      </p:sp>
-      <p:sp>
-        <p:nvSpPr>
-          <p:cNvPr id="5" name="Content Placeholder 4"/>
-          <p:cNvSpPr>
-            <a:spLocks noGrp="1"/>
-          </p:cNvSpPr>
-          <p:nvPr>
-            <p:ph sz="half" idx="1"/>
-          </p:nvPr>
-        </p:nvSpPr>
-        <p:spPr/>
-        <p:txBody>
-          <a:bodyPr>
-            <a:normAutofit fontScale="92500" lnSpcReduction="10000"/>
-          </a:bodyPr>
-          <a:lstStyle/>
-          <a:p>
-            <a:r>
-              <a:rPr lang="en-GB" dirty="0" smtClean="0"/>
-              <a:t>Mapping</a:t>
-            </a:r>
-          </a:p>
-          <a:p>
-            <a:pPr lvl="1"/>
-            <a:r>
-              <a:rPr lang="en-GB" dirty="0" smtClean="0"/>
-              <a:t>Hypothesis ↔ Defence</a:t>
-            </a:r>
-          </a:p>
-          <a:p>
-            <a:pPr lvl="1"/>
-            <a:r>
-              <a:rPr lang="en-GB" dirty="0" smtClean="0"/>
-              <a:t>Contradiction ↔ Attack</a:t>
-            </a:r>
-          </a:p>
-          <a:p>
-            <a:r>
-              <a:rPr lang="en-GB" dirty="0" smtClean="0"/>
-              <a:t>Eliminates shortcuts by ironing out proofs when converting to arguments</a:t>
-            </a:r>
-          </a:p>
-          <a:p>
-            <a:r>
-              <a:rPr lang="en-GB" dirty="0" smtClean="0"/>
-              <a:t>Correctness</a:t>
-            </a:r>
-          </a:p>
-          <a:p>
-            <a:pPr lvl="1"/>
-            <a:r>
-              <a:rPr lang="en-GB" dirty="0" smtClean="0"/>
-              <a:t>Looks great after 3 glasses of wine</a:t>
-            </a:r>
-          </a:p>
-          <a:p>
-            <a:pPr lvl="1"/>
-            <a:r>
-              <a:rPr lang="en-GB" dirty="0" smtClean="0"/>
-              <a:t>Manual testing</a:t>
-            </a:r>
-          </a:p>
-          <a:p>
-            <a:r>
-              <a:rPr lang="en-GB" dirty="0" smtClean="0"/>
-              <a:t>Future work</a:t>
-            </a:r>
-          </a:p>
-          <a:p>
-            <a:pPr lvl="1"/>
-            <a:r>
-              <a:rPr lang="en-GB" dirty="0" smtClean="0"/>
-              <a:t>Option to retain information on shortcuts</a:t>
-            </a:r>
-            <a:endParaRPr lang="en-US" dirty="0"/>
-          </a:p>
-        </p:txBody>
-      </p:sp>
-      <p:pic>
-        <p:nvPicPr>
-          <p:cNvPr id="3" name="Content Placeholder 2"/>
-          <p:cNvPicPr>
-            <a:picLocks noGrp="1" noChangeAspect="1"/>
-          </p:cNvPicPr>
-          <p:nvPr>
-            <p:ph sz="half" idx="2"/>
-          </p:nvPr>
-        </p:nvPicPr>
-        <p:blipFill>
-          <a:blip r:embed="rId2"/>
-          <a:stretch>
-            <a:fillRect/>
-          </a:stretch>
-        </p:blipFill>
-        <p:spPr>
-          <a:xfrm>
-            <a:off x="6340519" y="2603500"/>
-            <a:ext cx="2667271" cy="3416300"/>
-          </a:xfrm>
-          <a:prstGeom prst="rect">
-            <a:avLst/>
-          </a:prstGeom>
-        </p:spPr>
-      </p:pic>
-      <p:pic>
-        <p:nvPicPr>
-          <p:cNvPr id="7" name="Content Placeholder 7"/>
-          <p:cNvPicPr>
-            <a:picLocks noChangeAspect="1"/>
-          </p:cNvPicPr>
-          <p:nvPr/>
-        </p:nvPicPr>
-        <p:blipFill rotWithShape="1">
-          <a:blip r:embed="rId3"/>
-          <a:srcRect l="49604" t="13673" r="29262" b="17446"/>
-          <a:stretch/>
-        </p:blipFill>
-        <p:spPr>
-          <a:xfrm>
-            <a:off x="8974062" y="2477514"/>
-            <a:ext cx="1950182" cy="3575331"/>
-          </a:xfrm>
-          <a:prstGeom prst="rect">
-            <a:avLst/>
-          </a:prstGeom>
-        </p:spPr>
-      </p:pic>
-    </p:spTree>
-    <p:extLst>
-      <p:ext uri="{BB962C8B-B14F-4D97-AF65-F5344CB8AC3E}">
-        <p14:creationId xmlns:p14="http://schemas.microsoft.com/office/powerpoint/2010/main" val="1344408602"/>
-      </p:ext>
-    </p:extLst>
-  </p:cSld>
-  <p:clrMapOvr>
-    <a:masterClrMapping/>
-  </p:clrMapOvr>
-  <p:timing>
-    <p:tnLst>
-      <p:par>
-        <p:cTn id="1" dur="indefinite" restart="never" nodeType="tmRoot"/>
-      </p:par>
-    </p:tnLst>
-  </p:timing>
-</p:sld>
-</file>
-
-<file path=ppt/slides/slide19.xml><?xml version="1.0" encoding="utf-8"?>
-<p:sld xmlns:a="http://schemas.openxmlformats.org/drawingml/2006/main" xmlns:r="http://schemas.openxmlformats.org/officeDocument/2006/relationships" xmlns:p="http://schemas.openxmlformats.org/presentationml/2006/main">
-  <p:cSld>
-    <p:spTree>
-      <p:nvGrpSpPr>
-        <p:cNvPr id="1" name=""/>
-        <p:cNvGrpSpPr/>
-        <p:nvPr/>
-      </p:nvGrpSpPr>
-      <p:grpSpPr>
-        <a:xfrm>
-          <a:off x="0" y="0"/>
-          <a:ext cx="0" cy="0"/>
-          <a:chOff x="0" y="0"/>
-          <a:chExt cx="0" cy="0"/>
-        </a:xfrm>
-      </p:grpSpPr>
-      <p:sp>
-        <p:nvSpPr>
-          <p:cNvPr id="2" name="Title 1"/>
-          <p:cNvSpPr>
-            <a:spLocks noGrp="1"/>
-          </p:cNvSpPr>
-          <p:nvPr>
-            <p:ph type="title"/>
-          </p:nvPr>
-        </p:nvSpPr>
-        <p:spPr/>
-        <p:txBody>
-          <a:bodyPr/>
-          <a:lstStyle/>
-          <a:p>
-            <a:r>
-              <a:rPr lang="en-GB" dirty="0" smtClean="0"/>
-              <a:t>Step 4+: Extract Proofs from Arguments</a:t>
-            </a:r>
-            <a:endParaRPr lang="en-US" dirty="0"/>
-          </a:p>
-        </p:txBody>
-      </p:sp>
-      <p:sp>
-        <p:nvSpPr>
-          <p:cNvPr id="3" name="Content Placeholder 2"/>
-          <p:cNvSpPr>
-            <a:spLocks noGrp="1"/>
-          </p:cNvSpPr>
-          <p:nvPr>
-            <p:ph sz="half" idx="1"/>
-          </p:nvPr>
-        </p:nvSpPr>
-        <p:spPr/>
-        <p:txBody>
-          <a:bodyPr>
-            <a:normAutofit lnSpcReduction="10000"/>
-          </a:bodyPr>
-          <a:lstStyle/>
-          <a:p>
-            <a:r>
-              <a:rPr lang="en-GB" dirty="0" smtClean="0"/>
-              <a:t>Acts as inverse of Step 4</a:t>
-            </a:r>
-          </a:p>
-          <a:p>
-            <a:r>
-              <a:rPr lang="en-GB" dirty="0" smtClean="0"/>
-              <a:t>Makes use of established mapping</a:t>
-            </a:r>
-          </a:p>
-          <a:p>
-            <a:r>
-              <a:rPr lang="en-GB" dirty="0" smtClean="0"/>
-              <a:t>Uses theorem </a:t>
-            </a:r>
-            <a:r>
-              <a:rPr lang="en-GB" dirty="0" err="1" smtClean="0"/>
-              <a:t>prover</a:t>
-            </a:r>
-            <a:r>
-              <a:rPr lang="en-GB" dirty="0" smtClean="0"/>
-              <a:t> to build proofs</a:t>
-            </a:r>
-          </a:p>
-          <a:p>
-            <a:r>
-              <a:rPr lang="en-GB" dirty="0" smtClean="0"/>
-              <a:t>Guides theorem </a:t>
-            </a:r>
-            <a:r>
-              <a:rPr lang="en-GB" dirty="0" err="1" smtClean="0"/>
-              <a:t>prover</a:t>
-            </a:r>
-            <a:r>
-              <a:rPr lang="en-GB" dirty="0" smtClean="0"/>
-              <a:t> by building proofs bottom up</a:t>
-            </a:r>
-          </a:p>
-          <a:p>
-            <a:r>
-              <a:rPr lang="en-GB" dirty="0" smtClean="0"/>
-              <a:t>Correctness</a:t>
-            </a:r>
-          </a:p>
-          <a:p>
-            <a:pPr lvl="1"/>
-            <a:r>
-              <a:rPr lang="en-GB" dirty="0" smtClean="0"/>
-              <a:t>Manual testing</a:t>
-            </a:r>
-          </a:p>
-          <a:p>
-            <a:r>
-              <a:rPr lang="en-GB" dirty="0" smtClean="0"/>
-              <a:t>Future work</a:t>
-            </a:r>
-          </a:p>
-          <a:p>
-            <a:pPr lvl="1"/>
-            <a:r>
-              <a:rPr lang="en-GB" dirty="0" smtClean="0"/>
-              <a:t>Identify common </a:t>
-            </a:r>
-            <a:r>
-              <a:rPr lang="en-GB" dirty="0" err="1" smtClean="0"/>
-              <a:t>subtrees</a:t>
-            </a:r>
-            <a:r>
-              <a:rPr lang="en-GB" dirty="0" smtClean="0"/>
-              <a:t> and produce shortcuts</a:t>
-            </a:r>
-          </a:p>
-        </p:txBody>
-      </p:sp>
-      <p:pic>
-        <p:nvPicPr>
-          <p:cNvPr id="6" name="Content Placeholder 2"/>
-          <p:cNvPicPr>
-            <a:picLocks noGrp="1" noChangeAspect="1"/>
-          </p:cNvPicPr>
-          <p:nvPr>
-            <p:ph sz="half" idx="2"/>
-          </p:nvPr>
-        </p:nvPicPr>
-        <p:blipFill>
-          <a:blip r:embed="rId2"/>
-          <a:stretch>
-            <a:fillRect/>
-          </a:stretch>
-        </p:blipFill>
-        <p:spPr>
-          <a:xfrm>
-            <a:off x="8290700" y="2603500"/>
-            <a:ext cx="2667271" cy="3416300"/>
-          </a:xfrm>
-          <a:prstGeom prst="rect">
-            <a:avLst/>
-          </a:prstGeom>
-        </p:spPr>
-      </p:pic>
-      <p:pic>
-        <p:nvPicPr>
-          <p:cNvPr id="7" name="Content Placeholder 7"/>
-          <p:cNvPicPr>
-            <a:picLocks noChangeAspect="1"/>
-          </p:cNvPicPr>
-          <p:nvPr/>
-        </p:nvPicPr>
-        <p:blipFill rotWithShape="1">
-          <a:blip r:embed="rId3"/>
-          <a:srcRect l="49604" t="13673" r="29262" b="17446"/>
-          <a:stretch/>
-        </p:blipFill>
-        <p:spPr>
-          <a:xfrm>
-            <a:off x="6263230" y="2444469"/>
-            <a:ext cx="1950182" cy="3575331"/>
-          </a:xfrm>
-          <a:prstGeom prst="rect">
-            <a:avLst/>
-          </a:prstGeom>
-        </p:spPr>
-      </p:pic>
-    </p:spTree>
-    <p:extLst>
-      <p:ext uri="{BB962C8B-B14F-4D97-AF65-F5344CB8AC3E}">
-        <p14:creationId xmlns:p14="http://schemas.microsoft.com/office/powerpoint/2010/main" val="1805319185"/>
-      </p:ext>
-    </p:extLst>
-  </p:cSld>
-  <p:clrMapOvr>
-    <a:masterClrMapping/>
-  </p:clrMapOvr>
-  <p:timing>
-    <p:tnLst>
-      <p:par>
-        <p:cTn id="1" dur="indefinite" restart="never" nodeType="tmRoot"/>
-      </p:par>
-    </p:tnLst>
-  </p:timing>
-</p:sld>
-</file>
-
 <file path=ppt/slides/slide2.xml><?xml version="1.0" encoding="utf-8"?>
 <p:sld xmlns:a="http://schemas.openxmlformats.org/drawingml/2006/main" xmlns:r="http://schemas.openxmlformats.org/officeDocument/2006/relationships" xmlns:p="http://schemas.openxmlformats.org/presentationml/2006/main">
   <p:cSld>
@@ -15455,7 +15342,7 @@
           <a:p>
             <a:r>
               <a:rPr lang="en-GB" dirty="0" smtClean="0"/>
-              <a:t>Step 4++: Argument Builder</a:t>
+              <a:t>Step 4: Visualizing GAP Proofs</a:t>
             </a:r>
             <a:endParaRPr lang="en-US" dirty="0"/>
           </a:p>
@@ -15468,49 +15355,39 @@
             <a:spLocks noGrp="1"/>
           </p:cNvSpPr>
           <p:nvPr>
-            <p:ph idx="1"/>
+            <p:ph sz="half" idx="1"/>
           </p:nvPr>
         </p:nvSpPr>
         <p:spPr/>
         <p:txBody>
-          <a:bodyPr/>
+          <a:bodyPr>
+            <a:normAutofit fontScale="92500" lnSpcReduction="10000"/>
+          </a:bodyPr>
           <a:lstStyle/>
           <a:p>
             <a:r>
               <a:rPr lang="en-GB" dirty="0" smtClean="0"/>
-              <a:t>Complements Proof Builder</a:t>
-            </a:r>
-          </a:p>
-          <a:p>
+              <a:t>Mapping</a:t>
+            </a:r>
+          </a:p>
+          <a:p>
+            <a:pPr lvl="1"/>
             <a:r>
               <a:rPr lang="en-GB" dirty="0" smtClean="0"/>
-              <a:t>Allows construction of arguments following NACC</a:t>
-            </a:r>
-          </a:p>
-          <a:p>
+              <a:t>Hypothesis ↔ Defence</a:t>
+            </a:r>
+          </a:p>
+          <a:p>
+            <a:pPr lvl="1"/>
             <a:r>
               <a:rPr lang="en-GB" dirty="0" smtClean="0"/>
-              <a:t>Plays like a mini-game between user (opponent) and computer (proponent)</a:t>
+              <a:t>Contradiction ↔ Attack</a:t>
             </a:r>
           </a:p>
           <a:p>
             <a:r>
               <a:rPr lang="en-GB" dirty="0" smtClean="0"/>
-              <a:t>Uses theorem </a:t>
-            </a:r>
-            <a:r>
-              <a:rPr lang="en-GB" dirty="0" err="1" smtClean="0"/>
-              <a:t>prover</a:t>
-            </a:r>
-            <a:r>
-              <a:rPr lang="en-GB" dirty="0" smtClean="0"/>
-              <a:t> to check attacks suggested by user</a:t>
-            </a:r>
-          </a:p>
-          <a:p>
-            <a:r>
-              <a:rPr lang="en-GB" dirty="0" smtClean="0"/>
-              <a:t>Allows an argument data entry point to the system</a:t>
+              <a:t>Eliminates shortcuts by ironing out proofs when converting to arguments</a:t>
             </a:r>
           </a:p>
           <a:p>
@@ -15523,16 +15400,85 @@
             <a:pPr lvl="1"/>
             <a:r>
               <a:rPr lang="en-GB" dirty="0" smtClean="0"/>
+              <a:t>Looks great after 3 glasses of wine</a:t>
+            </a:r>
+          </a:p>
+          <a:p>
+            <a:pPr lvl="1"/>
+            <a:r>
+              <a:rPr lang="en-GB" dirty="0" smtClean="0"/>
               <a:t>Manual testing</a:t>
+            </a:r>
+          </a:p>
+          <a:p>
+            <a:r>
+              <a:rPr lang="en-GB" dirty="0" smtClean="0"/>
+              <a:t>Future work</a:t>
+            </a:r>
+          </a:p>
+          <a:p>
+            <a:pPr lvl="1"/>
+            <a:r>
+              <a:rPr lang="en-GB" dirty="0" smtClean="0"/>
+              <a:t>Option to retain information on shortcuts</a:t>
             </a:r>
             <a:endParaRPr lang="en-US" dirty="0"/>
           </a:p>
         </p:txBody>
       </p:sp>
+      <p:pic>
+        <p:nvPicPr>
+          <p:cNvPr id="3" name="Content Placeholder 2"/>
+          <p:cNvPicPr>
+            <a:picLocks noGrp="1" noChangeAspect="1"/>
+          </p:cNvPicPr>
+          <p:nvPr>
+            <p:ph sz="half" idx="2"/>
+          </p:nvPr>
+        </p:nvPicPr>
+        <p:blipFill>
+          <a:blip r:embed="rId2"/>
+          <a:stretch>
+            <a:fillRect/>
+          </a:stretch>
+        </p:blipFill>
+        <p:spPr>
+          <a:xfrm>
+            <a:off x="6340519" y="2603500"/>
+            <a:ext cx="2667271" cy="3416300"/>
+          </a:xfrm>
+          <a:prstGeom prst="rect">
+            <a:avLst/>
+          </a:prstGeom>
+        </p:spPr>
+      </p:pic>
+      <p:pic>
+        <p:nvPicPr>
+          <p:cNvPr id="7" name="Content Placeholder 7"/>
+          <p:cNvPicPr>
+            <a:picLocks noChangeAspect="1"/>
+          </p:cNvPicPr>
+          <p:nvPr/>
+        </p:nvPicPr>
+        <p:blipFill rotWithShape="1">
+          <a:blip r:embed="rId3"/>
+          <a:srcRect l="49604" t="13673" r="29262" b="17446"/>
+          <a:stretch/>
+        </p:blipFill>
+        <p:spPr>
+          <a:xfrm>
+            <a:off x="8974062" y="2477514"/>
+            <a:ext cx="1950182" cy="3575331"/>
+          </a:xfrm>
+          <a:prstGeom prst="rect">
+            <a:avLst/>
+          </a:prstGeom>
+        </p:spPr>
+      </p:pic>
     </p:spTree>
     <p:extLst>
       <p:ext uri="{BB962C8B-B14F-4D97-AF65-F5344CB8AC3E}">
-        <p14:creationId xmlns:p14="http://schemas.microsoft.com/office/powerpoint/2010/main" val="519456292"/>
+        <p14:creationId xmlns:p14="http://schemas.microsoft.com/office/powerpoint/2010/main" val="1344408602"/>
       </p:ext>
     </p:extLst>
   </p:cSld>
@@ -15583,7 +15529,7 @@
           <a:p>
             <a:r>
               <a:rPr lang="en-GB" dirty="0" smtClean="0"/>
-              <a:t>Complete Ecosystem</a:t>
+              <a:t>Step 4+: Extract Proofs from Arguments</a:t>
             </a:r>
             <a:endParaRPr lang="en-US" dirty="0"/>
           </a:p>
@@ -15591,390 +15537,149 @@
       </p:sp>
       <p:sp>
         <p:nvSpPr>
-          <p:cNvPr id="4" name="Rounded Rectangle 3"/>
-          <p:cNvSpPr/>
-          <p:nvPr/>
+          <p:cNvPr id="3" name="Content Placeholder 2"/>
+          <p:cNvSpPr>
+            <a:spLocks noGrp="1"/>
+          </p:cNvSpPr>
+          <p:nvPr>
+            <p:ph sz="half" idx="1"/>
+          </p:nvPr>
         </p:nvSpPr>
+        <p:spPr/>
+        <p:txBody>
+          <a:bodyPr>
+            <a:normAutofit lnSpcReduction="10000"/>
+          </a:bodyPr>
+          <a:lstStyle/>
+          <a:p>
+            <a:r>
+              <a:rPr lang="en-GB" dirty="0" smtClean="0"/>
+              <a:t>Acts as inverse of Step 4</a:t>
+            </a:r>
+          </a:p>
+          <a:p>
+            <a:r>
+              <a:rPr lang="en-GB" dirty="0" smtClean="0"/>
+              <a:t>Makes use of established mapping</a:t>
+            </a:r>
+          </a:p>
+          <a:p>
+            <a:r>
+              <a:rPr lang="en-GB" dirty="0" smtClean="0"/>
+              <a:t>Uses theorem </a:t>
+            </a:r>
+            <a:r>
+              <a:rPr lang="en-GB" dirty="0" err="1" smtClean="0"/>
+              <a:t>prover</a:t>
+            </a:r>
+            <a:r>
+              <a:rPr lang="en-GB" dirty="0" smtClean="0"/>
+              <a:t> to build proofs</a:t>
+            </a:r>
+          </a:p>
+          <a:p>
+            <a:r>
+              <a:rPr lang="en-GB" dirty="0" smtClean="0"/>
+              <a:t>Guides theorem </a:t>
+            </a:r>
+            <a:r>
+              <a:rPr lang="en-GB" dirty="0" err="1" smtClean="0"/>
+              <a:t>prover</a:t>
+            </a:r>
+            <a:r>
+              <a:rPr lang="en-GB" dirty="0" smtClean="0"/>
+              <a:t> by building proofs bottom up</a:t>
+            </a:r>
+          </a:p>
+          <a:p>
+            <a:r>
+              <a:rPr lang="en-GB" dirty="0" smtClean="0"/>
+              <a:t>Correctness</a:t>
+            </a:r>
+          </a:p>
+          <a:p>
+            <a:pPr lvl="1"/>
+            <a:r>
+              <a:rPr lang="en-GB" dirty="0" smtClean="0"/>
+              <a:t>Manual testing</a:t>
+            </a:r>
+          </a:p>
+          <a:p>
+            <a:r>
+              <a:rPr lang="en-GB" dirty="0" smtClean="0"/>
+              <a:t>Future work</a:t>
+            </a:r>
+          </a:p>
+          <a:p>
+            <a:pPr lvl="1"/>
+            <a:r>
+              <a:rPr lang="en-GB" dirty="0" smtClean="0"/>
+              <a:t>Identify common </a:t>
+            </a:r>
+            <a:r>
+              <a:rPr lang="en-GB" dirty="0" err="1" smtClean="0"/>
+              <a:t>subtrees</a:t>
+            </a:r>
+            <a:r>
+              <a:rPr lang="en-GB" dirty="0" smtClean="0"/>
+              <a:t> and produce shortcuts</a:t>
+            </a:r>
+          </a:p>
+        </p:txBody>
+      </p:sp>
+      <p:pic>
+        <p:nvPicPr>
+          <p:cNvPr id="6" name="Content Placeholder 2"/>
+          <p:cNvPicPr>
+            <a:picLocks noGrp="1" noChangeAspect="1"/>
+          </p:cNvPicPr>
+          <p:nvPr>
+            <p:ph sz="half" idx="2"/>
+          </p:nvPr>
+        </p:nvPicPr>
+        <p:blipFill>
+          <a:blip r:embed="rId2"/>
+          <a:stretch>
+            <a:fillRect/>
+          </a:stretch>
+        </p:blipFill>
         <p:spPr>
           <a:xfrm>
-            <a:off x="1488936" y="5850539"/>
-            <a:ext cx="1398574" cy="914400"/>
+            <a:off x="8290700" y="2603500"/>
+            <a:ext cx="2667271" cy="3416300"/>
           </a:xfrm>
-          <a:prstGeom prst="roundRect">
+          <a:prstGeom prst="rect">
             <a:avLst/>
           </a:prstGeom>
         </p:spPr>
-        <p:style>
-          <a:lnRef idx="0">
-            <a:schemeClr val="accent1"/>
-          </a:lnRef>
-          <a:fillRef idx="3">
-            <a:schemeClr val="accent1"/>
-          </a:fillRef>
-          <a:effectRef idx="3">
-            <a:schemeClr val="accent1"/>
-          </a:effectRef>
-          <a:fontRef idx="minor">
-            <a:schemeClr val="lt1"/>
-          </a:fontRef>
-        </p:style>
-        <p:txBody>
-          <a:bodyPr rtlCol="0" anchor="ctr"/>
-          <a:lstStyle/>
-          <a:p>
-            <a:pPr algn="ctr"/>
-            <a:r>
-              <a:rPr lang="en-GB" dirty="0" smtClean="0"/>
-              <a:t>GAP Proof</a:t>
-            </a:r>
-            <a:endParaRPr lang="en-US" dirty="0"/>
-          </a:p>
-        </p:txBody>
-      </p:sp>
-      <p:sp>
-        <p:nvSpPr>
-          <p:cNvPr id="5" name="Rounded Rectangle 4"/>
-          <p:cNvSpPr/>
+      </p:pic>
+      <p:pic>
+        <p:nvPicPr>
+          <p:cNvPr id="7" name="Content Placeholder 7"/>
+          <p:cNvPicPr>
+            <a:picLocks noChangeAspect="1"/>
+          </p:cNvPicPr>
           <p:nvPr/>
-        </p:nvSpPr>
+        </p:nvPicPr>
+        <p:blipFill rotWithShape="1">
+          <a:blip r:embed="rId3"/>
+          <a:srcRect l="49604" t="13673" r="29262" b="17446"/>
+          <a:stretch/>
+        </p:blipFill>
         <p:spPr>
           <a:xfrm>
-            <a:off x="6222776" y="5850539"/>
-            <a:ext cx="1398574" cy="914400"/>
+            <a:off x="6263230" y="2444469"/>
+            <a:ext cx="1950182" cy="3575331"/>
           </a:xfrm>
-          <a:prstGeom prst="roundRect">
+          <a:prstGeom prst="rect">
             <a:avLst/>
           </a:prstGeom>
         </p:spPr>
-        <p:style>
-          <a:lnRef idx="0">
-            <a:schemeClr val="accent1"/>
-          </a:lnRef>
-          <a:fillRef idx="3">
-            <a:schemeClr val="accent1"/>
-          </a:fillRef>
-          <a:effectRef idx="3">
-            <a:schemeClr val="accent1"/>
-          </a:effectRef>
-          <a:fontRef idx="minor">
-            <a:schemeClr val="lt1"/>
-          </a:fontRef>
-        </p:style>
-        <p:txBody>
-          <a:bodyPr rtlCol="0" anchor="ctr"/>
-          <a:lstStyle/>
-          <a:p>
-            <a:pPr algn="ctr"/>
-            <a:r>
-              <a:rPr lang="en-GB" dirty="0" smtClean="0"/>
-              <a:t>Argument</a:t>
-            </a:r>
-            <a:endParaRPr lang="en-US" dirty="0"/>
-          </a:p>
-        </p:txBody>
-      </p:sp>
-      <p:sp>
-        <p:nvSpPr>
-          <p:cNvPr id="6" name="Rounded Rectangle 5"/>
-          <p:cNvSpPr/>
-          <p:nvPr/>
-        </p:nvSpPr>
-        <p:spPr>
-          <a:xfrm>
-            <a:off x="1488936" y="2182888"/>
-            <a:ext cx="1398574" cy="914400"/>
-          </a:xfrm>
-          <a:prstGeom prst="roundRect">
-            <a:avLst/>
-          </a:prstGeom>
-        </p:spPr>
-        <p:style>
-          <a:lnRef idx="0">
-            <a:schemeClr val="accent1"/>
-          </a:lnRef>
-          <a:fillRef idx="3">
-            <a:schemeClr val="accent1"/>
-          </a:fillRef>
-          <a:effectRef idx="3">
-            <a:schemeClr val="accent1"/>
-          </a:effectRef>
-          <a:fontRef idx="minor">
-            <a:schemeClr val="lt1"/>
-          </a:fontRef>
-        </p:style>
-        <p:txBody>
-          <a:bodyPr rtlCol="0" anchor="ctr"/>
-          <a:lstStyle/>
-          <a:p>
-            <a:pPr algn="ctr"/>
-            <a:r>
-              <a:rPr lang="en-GB" dirty="0" smtClean="0"/>
-              <a:t>Proof</a:t>
-            </a:r>
-            <a:endParaRPr lang="en-US" dirty="0"/>
-          </a:p>
-        </p:txBody>
-      </p:sp>
-      <p:sp>
-        <p:nvSpPr>
-          <p:cNvPr id="7" name="Right Arrow 6"/>
-          <p:cNvSpPr/>
-          <p:nvPr/>
-        </p:nvSpPr>
-        <p:spPr>
-          <a:xfrm>
-            <a:off x="2887510" y="5850538"/>
-            <a:ext cx="3335266" cy="445065"/>
-          </a:xfrm>
-          <a:prstGeom prst="rightArrow">
-            <a:avLst/>
-          </a:prstGeom>
-        </p:spPr>
-        <p:style>
-          <a:lnRef idx="0">
-            <a:schemeClr val="accent1"/>
-          </a:lnRef>
-          <a:fillRef idx="1003">
-            <a:schemeClr val="dk2"/>
-          </a:fillRef>
-          <a:effectRef idx="3">
-            <a:schemeClr val="accent1"/>
-          </a:effectRef>
-          <a:fontRef idx="minor">
-            <a:schemeClr val="lt1"/>
-          </a:fontRef>
-        </p:style>
-        <p:txBody>
-          <a:bodyPr rtlCol="0" anchor="ctr"/>
-          <a:lstStyle/>
-          <a:p>
-            <a:pPr algn="ctr"/>
-            <a:r>
-              <a:rPr lang="en-GB" dirty="0" smtClean="0"/>
-              <a:t>Step 4: Visualizer</a:t>
-            </a:r>
-            <a:endParaRPr lang="en-US" dirty="0"/>
-          </a:p>
-        </p:txBody>
-      </p:sp>
-      <p:sp>
-        <p:nvSpPr>
-          <p:cNvPr id="8" name="Right Arrow 7"/>
-          <p:cNvSpPr/>
-          <p:nvPr/>
-        </p:nvSpPr>
-        <p:spPr>
-          <a:xfrm flipH="1">
-            <a:off x="2887510" y="2196252"/>
-            <a:ext cx="3335266" cy="445065"/>
-          </a:xfrm>
-          <a:prstGeom prst="rightArrow">
-            <a:avLst/>
-          </a:prstGeom>
-        </p:spPr>
-        <p:style>
-          <a:lnRef idx="0">
-            <a:schemeClr val="accent1"/>
-          </a:lnRef>
-          <a:fillRef idx="1003">
-            <a:schemeClr val="dk2"/>
-          </a:fillRef>
-          <a:effectRef idx="3">
-            <a:schemeClr val="accent1"/>
-          </a:effectRef>
-          <a:fontRef idx="minor">
-            <a:schemeClr val="lt1"/>
-          </a:fontRef>
-        </p:style>
-        <p:txBody>
-          <a:bodyPr rtlCol="0" anchor="ctr"/>
-          <a:lstStyle/>
-          <a:p>
-            <a:pPr algn="ctr"/>
-            <a:r>
-              <a:rPr lang="en-GB" dirty="0" smtClean="0"/>
-              <a:t>Step 1&amp;2: Theorem </a:t>
-            </a:r>
-            <a:r>
-              <a:rPr lang="en-GB" dirty="0" err="1" smtClean="0"/>
-              <a:t>Prover</a:t>
-            </a:r>
-            <a:endParaRPr lang="en-US" dirty="0"/>
-          </a:p>
-        </p:txBody>
-      </p:sp>
-      <p:sp>
-        <p:nvSpPr>
-          <p:cNvPr id="9" name="Right Arrow 8"/>
-          <p:cNvSpPr/>
-          <p:nvPr/>
-        </p:nvSpPr>
-        <p:spPr>
-          <a:xfrm rot="5400000">
-            <a:off x="816625" y="4255001"/>
-            <a:ext cx="2743195" cy="445065"/>
-          </a:xfrm>
-          <a:prstGeom prst="rightArrow">
-            <a:avLst/>
-          </a:prstGeom>
-        </p:spPr>
-        <p:style>
-          <a:lnRef idx="0">
-            <a:schemeClr val="accent1"/>
-          </a:lnRef>
-          <a:fillRef idx="1003">
-            <a:schemeClr val="dk2"/>
-          </a:fillRef>
-          <a:effectRef idx="3">
-            <a:schemeClr val="accent1"/>
-          </a:effectRef>
-          <a:fontRef idx="minor">
-            <a:schemeClr val="lt1"/>
-          </a:fontRef>
-        </p:style>
-        <p:txBody>
-          <a:bodyPr rtlCol="0" anchor="ctr"/>
-          <a:lstStyle/>
-          <a:p>
-            <a:pPr algn="ctr"/>
-            <a:r>
-              <a:rPr lang="en-GB" dirty="0" smtClean="0"/>
-              <a:t>Step 3(+): GAP Check</a:t>
-            </a:r>
-            <a:endParaRPr lang="en-US" dirty="0"/>
-          </a:p>
-        </p:txBody>
-      </p:sp>
-      <p:sp>
-        <p:nvSpPr>
-          <p:cNvPr id="10" name="Right Arrow 9"/>
-          <p:cNvSpPr/>
-          <p:nvPr/>
-        </p:nvSpPr>
-        <p:spPr>
-          <a:xfrm flipH="1">
-            <a:off x="2887510" y="6295603"/>
-            <a:ext cx="3335266" cy="445065"/>
-          </a:xfrm>
-          <a:prstGeom prst="rightArrow">
-            <a:avLst/>
-          </a:prstGeom>
-        </p:spPr>
-        <p:style>
-          <a:lnRef idx="0">
-            <a:schemeClr val="accent1"/>
-          </a:lnRef>
-          <a:fillRef idx="1003">
-            <a:schemeClr val="dk2"/>
-          </a:fillRef>
-          <a:effectRef idx="3">
-            <a:schemeClr val="accent1"/>
-          </a:effectRef>
-          <a:fontRef idx="minor">
-            <a:schemeClr val="lt1"/>
-          </a:fontRef>
-        </p:style>
-        <p:txBody>
-          <a:bodyPr rtlCol="0" anchor="ctr"/>
-          <a:lstStyle/>
-          <a:p>
-            <a:pPr algn="ctr"/>
-            <a:r>
-              <a:rPr lang="en-GB" dirty="0" smtClean="0"/>
-              <a:t>Step 4+: Proof Extractor</a:t>
-            </a:r>
-            <a:endParaRPr lang="en-US" dirty="0"/>
-          </a:p>
-        </p:txBody>
-      </p:sp>
-      <p:sp>
-        <p:nvSpPr>
-          <p:cNvPr id="11" name="Right Arrow 10"/>
-          <p:cNvSpPr/>
-          <p:nvPr/>
-        </p:nvSpPr>
-        <p:spPr>
-          <a:xfrm flipH="1">
-            <a:off x="7621350" y="6085206"/>
-            <a:ext cx="3335266" cy="445065"/>
-          </a:xfrm>
-          <a:prstGeom prst="rightArrow">
-            <a:avLst/>
-          </a:prstGeom>
-        </p:spPr>
-        <p:style>
-          <a:lnRef idx="0">
-            <a:schemeClr val="accent1"/>
-          </a:lnRef>
-          <a:fillRef idx="1003">
-            <a:schemeClr val="dk2"/>
-          </a:fillRef>
-          <a:effectRef idx="3">
-            <a:schemeClr val="accent1"/>
-          </a:effectRef>
-          <a:fontRef idx="minor">
-            <a:schemeClr val="lt1"/>
-          </a:fontRef>
-        </p:style>
-        <p:txBody>
-          <a:bodyPr rtlCol="0" anchor="ctr"/>
-          <a:lstStyle/>
-          <a:p>
-            <a:pPr algn="ctr"/>
-            <a:r>
-              <a:rPr lang="en-GB" dirty="0" smtClean="0"/>
-              <a:t>Step 4++: Argument Builder</a:t>
-            </a:r>
-            <a:endParaRPr lang="en-US" dirty="0"/>
-          </a:p>
-        </p:txBody>
-      </p:sp>
-      <p:sp>
-        <p:nvSpPr>
-          <p:cNvPr id="12" name="Right Arrow 11"/>
-          <p:cNvSpPr/>
-          <p:nvPr/>
-        </p:nvSpPr>
-        <p:spPr>
-          <a:xfrm flipH="1">
-            <a:off x="2887510" y="2653631"/>
-            <a:ext cx="3335266" cy="445065"/>
-          </a:xfrm>
-          <a:prstGeom prst="rightArrow">
-            <a:avLst/>
-          </a:prstGeom>
-        </p:spPr>
-        <p:style>
-          <a:lnRef idx="0">
-            <a:schemeClr val="accent1"/>
-          </a:lnRef>
-          <a:fillRef idx="1003">
-            <a:schemeClr val="dk2"/>
-          </a:fillRef>
-          <a:effectRef idx="3">
-            <a:schemeClr val="accent1"/>
-          </a:effectRef>
-          <a:fontRef idx="minor">
-            <a:schemeClr val="lt1"/>
-          </a:fontRef>
-        </p:style>
-        <p:txBody>
-          <a:bodyPr rtlCol="0" anchor="ctr"/>
-          <a:lstStyle/>
-          <a:p>
-            <a:pPr algn="ctr"/>
-            <a:r>
-              <a:rPr lang="en-GB" dirty="0" smtClean="0"/>
-              <a:t>Step 1+: Proof Builder</a:t>
-            </a:r>
-            <a:endParaRPr lang="en-US" dirty="0"/>
-          </a:p>
-        </p:txBody>
-      </p:sp>
+      </p:pic>
     </p:spTree>
     <p:extLst>
       <p:ext uri="{BB962C8B-B14F-4D97-AF65-F5344CB8AC3E}">
-        <p14:creationId xmlns:p14="http://schemas.microsoft.com/office/powerpoint/2010/main" val="2853275077"/>
+        <p14:creationId xmlns:p14="http://schemas.microsoft.com/office/powerpoint/2010/main" val="1805319185"/>
       </p:ext>
     </p:extLst>
   </p:cSld>
@@ -16025,7 +15730,7 @@
           <a:p>
             <a:r>
               <a:rPr lang="en-GB" dirty="0" smtClean="0"/>
-              <a:t>Contributions</a:t>
+              <a:t>Step 4++: Argument Builder</a:t>
             </a:r>
             <a:endParaRPr lang="en-US" dirty="0"/>
           </a:p>
@@ -16033,7 +15738,7 @@
       </p:sp>
       <p:sp>
         <p:nvSpPr>
-          <p:cNvPr id="3" name="Content Placeholder 2"/>
+          <p:cNvPr id="5" name="Content Placeholder 4"/>
           <p:cNvSpPr>
             <a:spLocks noGrp="1"/>
           </p:cNvSpPr>
@@ -16043,79 +15748,57 @@
         </p:nvSpPr>
         <p:spPr/>
         <p:txBody>
-          <a:bodyPr>
-            <a:normAutofit fontScale="92500" lnSpcReduction="10000"/>
-          </a:bodyPr>
+          <a:bodyPr/>
           <a:lstStyle/>
           <a:p>
             <a:r>
               <a:rPr lang="en-GB" dirty="0" smtClean="0"/>
-              <a:t>Built toolkit to aid exploration of Argumentation Logic which contains</a:t>
-            </a:r>
-          </a:p>
-          <a:p>
-            <a:pPr lvl="1"/>
+              <a:t>Complements Proof Builder</a:t>
+            </a:r>
+          </a:p>
+          <a:p>
             <a:r>
               <a:rPr lang="en-GB" dirty="0" smtClean="0"/>
-              <a:t>Theorem </a:t>
+              <a:t>Allows construction of arguments following NACC</a:t>
+            </a:r>
+          </a:p>
+          <a:p>
+            <a:r>
+              <a:rPr lang="en-GB" dirty="0" smtClean="0"/>
+              <a:t>Plays like a mini-game between user (opponent) and computer (proponent)</a:t>
+            </a:r>
+          </a:p>
+          <a:p>
+            <a:r>
+              <a:rPr lang="en-GB" dirty="0" smtClean="0"/>
+              <a:t>Uses theorem </a:t>
             </a:r>
             <a:r>
               <a:rPr lang="en-GB" dirty="0" err="1" smtClean="0"/>
               <a:t>prover</a:t>
             </a:r>
-            <a:endParaRPr lang="en-GB" dirty="0" smtClean="0"/>
+            <a:r>
+              <a:rPr lang="en-GB" dirty="0" smtClean="0"/>
+              <a:t> to check attacks suggested by user</a:t>
+            </a:r>
+          </a:p>
+          <a:p>
+            <a:r>
+              <a:rPr lang="en-GB" dirty="0" smtClean="0"/>
+              <a:t>Allows an argument data entry point to the system</a:t>
+            </a:r>
+          </a:p>
+          <a:p>
+            <a:r>
+              <a:rPr lang="en-GB" dirty="0" smtClean="0"/>
+              <a:t>Correctness</a:t>
+            </a:r>
           </a:p>
           <a:p>
             <a:pPr lvl="1"/>
             <a:r>
               <a:rPr lang="en-GB" dirty="0" smtClean="0"/>
-              <a:t>Proof builder</a:t>
-            </a:r>
-          </a:p>
-          <a:p>
-            <a:pPr lvl="1"/>
-            <a:r>
-              <a:rPr lang="en-GB" dirty="0" smtClean="0"/>
-              <a:t>(Extended) GAP checker</a:t>
-            </a:r>
-          </a:p>
-          <a:p>
-            <a:pPr lvl="1"/>
-            <a:r>
-              <a:rPr lang="en-GB" dirty="0" smtClean="0"/>
-              <a:t>Visualizer and extractor</a:t>
-            </a:r>
-          </a:p>
-          <a:p>
-            <a:pPr lvl="1"/>
-            <a:r>
-              <a:rPr lang="en-GB" dirty="0" smtClean="0"/>
-              <a:t>Argument builder</a:t>
-            </a:r>
-          </a:p>
-          <a:p>
-            <a:pPr lvl="1"/>
-            <a:r>
-              <a:rPr lang="en-GB" dirty="0" smtClean="0"/>
-              <a:t>Graphical User Interface</a:t>
-            </a:r>
-          </a:p>
-          <a:p>
-            <a:r>
-              <a:rPr lang="en-GB" dirty="0" smtClean="0"/>
-              <a:t>Extended the Genuine Absurdity Property to handle proofs with shortcuts</a:t>
-            </a:r>
-          </a:p>
-          <a:p>
-            <a:r>
-              <a:rPr lang="en-GB" dirty="0" smtClean="0"/>
-              <a:t>Devised an algorithm for converting GAP proofs to arguments</a:t>
-            </a:r>
-          </a:p>
-          <a:p>
-            <a:r>
-              <a:rPr lang="en-GB" dirty="0" smtClean="0"/>
-              <a:t>Devised an algorithm for converting arguments to proofs</a:t>
+              <a:t>Manual testing</a:t>
             </a:r>
             <a:endParaRPr lang="en-US" dirty="0"/>
           </a:p>
@@ -16124,7 +15807,7 @@
     </p:spTree>
     <p:extLst>
       <p:ext uri="{BB962C8B-B14F-4D97-AF65-F5344CB8AC3E}">
-        <p14:creationId xmlns:p14="http://schemas.microsoft.com/office/powerpoint/2010/main" val="2177436208"/>
+        <p14:creationId xmlns:p14="http://schemas.microsoft.com/office/powerpoint/2010/main" val="519456292"/>
       </p:ext>
     </p:extLst>
   </p:cSld>
@@ -16175,7 +15858,7 @@
           <a:p>
             <a:r>
               <a:rPr lang="en-GB" dirty="0" smtClean="0"/>
-              <a:t>Future Work</a:t>
+              <a:t>Complete Ecosystem</a:t>
             </a:r>
             <a:endParaRPr lang="en-US" dirty="0"/>
           </a:p>
@@ -16183,61 +15866,390 @@
       </p:sp>
       <p:sp>
         <p:nvSpPr>
-          <p:cNvPr id="3" name="Content Placeholder 2"/>
-          <p:cNvSpPr>
-            <a:spLocks noGrp="1"/>
-          </p:cNvSpPr>
-          <p:nvPr>
-            <p:ph idx="1"/>
-          </p:nvPr>
+          <p:cNvPr id="4" name="Rounded Rectangle 3"/>
+          <p:cNvSpPr/>
+          <p:nvPr/>
         </p:nvSpPr>
-        <p:spPr/>
+        <p:spPr>
+          <a:xfrm>
+            <a:off x="1488936" y="5850539"/>
+            <a:ext cx="1398574" cy="914400"/>
+          </a:xfrm>
+          <a:prstGeom prst="roundRect">
+            <a:avLst/>
+          </a:prstGeom>
+        </p:spPr>
+        <p:style>
+          <a:lnRef idx="0">
+            <a:schemeClr val="accent1"/>
+          </a:lnRef>
+          <a:fillRef idx="3">
+            <a:schemeClr val="accent1"/>
+          </a:fillRef>
+          <a:effectRef idx="3">
+            <a:schemeClr val="accent1"/>
+          </a:effectRef>
+          <a:fontRef idx="minor">
+            <a:schemeClr val="lt1"/>
+          </a:fontRef>
+        </p:style>
         <p:txBody>
-          <a:bodyPr/>
+          <a:bodyPr rtlCol="0" anchor="ctr"/>
           <a:lstStyle/>
           <a:p>
+            <a:pPr algn="ctr"/>
             <a:r>
               <a:rPr lang="en-GB" dirty="0" smtClean="0"/>
-              <a:t>Improve theorem prove</a:t>
-            </a:r>
-            <a:r>
-              <a:rPr lang="en-US" dirty="0" smtClean="0"/>
-              <a:t>r</a:t>
-            </a:r>
-          </a:p>
-          <a:p>
+              <a:t>GAP Proof</a:t>
+            </a:r>
+            <a:endParaRPr lang="en-US" dirty="0"/>
+          </a:p>
+        </p:txBody>
+      </p:sp>
+      <p:sp>
+        <p:nvSpPr>
+          <p:cNvPr id="5" name="Rounded Rectangle 4"/>
+          <p:cNvSpPr/>
+          <p:nvPr/>
+        </p:nvSpPr>
+        <p:spPr>
+          <a:xfrm>
+            <a:off x="6222776" y="5850539"/>
+            <a:ext cx="1398574" cy="914400"/>
+          </a:xfrm>
+          <a:prstGeom prst="roundRect">
+            <a:avLst/>
+          </a:prstGeom>
+        </p:spPr>
+        <p:style>
+          <a:lnRef idx="0">
+            <a:schemeClr val="accent1"/>
+          </a:lnRef>
+          <a:fillRef idx="3">
+            <a:schemeClr val="accent1"/>
+          </a:fillRef>
+          <a:effectRef idx="3">
+            <a:schemeClr val="accent1"/>
+          </a:effectRef>
+          <a:fontRef idx="minor">
+            <a:schemeClr val="lt1"/>
+          </a:fontRef>
+        </p:style>
+        <p:txBody>
+          <a:bodyPr rtlCol="0" anchor="ctr"/>
+          <a:lstStyle/>
+          <a:p>
+            <a:pPr algn="ctr"/>
             <a:r>
               <a:rPr lang="en-GB" dirty="0" smtClean="0"/>
-              <a:t>Convert non-GAP proofs to GAP (Step 5)</a:t>
-            </a:r>
-            <a:endParaRPr lang="en-US" dirty="0" smtClean="0"/>
-          </a:p>
-          <a:p>
+              <a:t>Argument</a:t>
+            </a:r>
+            <a:endParaRPr lang="en-US" dirty="0"/>
+          </a:p>
+        </p:txBody>
+      </p:sp>
+      <p:sp>
+        <p:nvSpPr>
+          <p:cNvPr id="6" name="Rounded Rectangle 5"/>
+          <p:cNvSpPr/>
+          <p:nvPr/>
+        </p:nvSpPr>
+        <p:spPr>
+          <a:xfrm>
+            <a:off x="1488936" y="2182888"/>
+            <a:ext cx="1398574" cy="914400"/>
+          </a:xfrm>
+          <a:prstGeom prst="roundRect">
+            <a:avLst/>
+          </a:prstGeom>
+        </p:spPr>
+        <p:style>
+          <a:lnRef idx="0">
+            <a:schemeClr val="accent1"/>
+          </a:lnRef>
+          <a:fillRef idx="3">
+            <a:schemeClr val="accent1"/>
+          </a:fillRef>
+          <a:effectRef idx="3">
+            <a:schemeClr val="accent1"/>
+          </a:effectRef>
+          <a:fontRef idx="minor">
+            <a:schemeClr val="lt1"/>
+          </a:fontRef>
+        </p:style>
+        <p:txBody>
+          <a:bodyPr rtlCol="0" anchor="ctr"/>
+          <a:lstStyle/>
+          <a:p>
+            <a:pPr algn="ctr"/>
             <a:r>
               <a:rPr lang="en-GB" dirty="0" smtClean="0"/>
-              <a:t>Re-introduce disjunction (Step 6)</a:t>
-            </a:r>
-          </a:p>
-          <a:p>
+              <a:t>Proof</a:t>
+            </a:r>
+            <a:endParaRPr lang="en-US" dirty="0"/>
+          </a:p>
+        </p:txBody>
+      </p:sp>
+      <p:sp>
+        <p:nvSpPr>
+          <p:cNvPr id="7" name="Right Arrow 6"/>
+          <p:cNvSpPr/>
+          <p:nvPr/>
+        </p:nvSpPr>
+        <p:spPr>
+          <a:xfrm>
+            <a:off x="2887510" y="5850538"/>
+            <a:ext cx="3335266" cy="445065"/>
+          </a:xfrm>
+          <a:prstGeom prst="rightArrow">
+            <a:avLst/>
+          </a:prstGeom>
+        </p:spPr>
+        <p:style>
+          <a:lnRef idx="0">
+            <a:schemeClr val="accent1"/>
+          </a:lnRef>
+          <a:fillRef idx="1003">
+            <a:schemeClr val="dk2"/>
+          </a:fillRef>
+          <a:effectRef idx="3">
+            <a:schemeClr val="accent1"/>
+          </a:effectRef>
+          <a:fontRef idx="minor">
+            <a:schemeClr val="lt1"/>
+          </a:fontRef>
+        </p:style>
+        <p:txBody>
+          <a:bodyPr rtlCol="0" anchor="ctr"/>
+          <a:lstStyle/>
+          <a:p>
+            <a:pPr algn="ctr"/>
             <a:r>
               <a:rPr lang="en-GB" dirty="0" smtClean="0"/>
-              <a:t>Look into </a:t>
+              <a:t>Step 4: Visualizer</a:t>
+            </a:r>
+            <a:endParaRPr lang="en-US" dirty="0"/>
+          </a:p>
+        </p:txBody>
+      </p:sp>
+      <p:sp>
+        <p:nvSpPr>
+          <p:cNvPr id="8" name="Right Arrow 7"/>
+          <p:cNvSpPr/>
+          <p:nvPr/>
+        </p:nvSpPr>
+        <p:spPr>
+          <a:xfrm flipH="1">
+            <a:off x="2887510" y="2196252"/>
+            <a:ext cx="3335266" cy="445065"/>
+          </a:xfrm>
+          <a:prstGeom prst="rightArrow">
+            <a:avLst/>
+          </a:prstGeom>
+        </p:spPr>
+        <p:style>
+          <a:lnRef idx="0">
+            <a:schemeClr val="accent1"/>
+          </a:lnRef>
+          <a:fillRef idx="1003">
+            <a:schemeClr val="dk2"/>
+          </a:fillRef>
+          <a:effectRef idx="3">
+            <a:schemeClr val="accent1"/>
+          </a:effectRef>
+          <a:fontRef idx="minor">
+            <a:schemeClr val="lt1"/>
+          </a:fontRef>
+        </p:style>
+        <p:txBody>
+          <a:bodyPr rtlCol="0" anchor="ctr"/>
+          <a:lstStyle/>
+          <a:p>
+            <a:pPr algn="ctr"/>
+            <a:r>
+              <a:rPr lang="en-GB" dirty="0" smtClean="0"/>
+              <a:t>Step 1&amp;2: Theorem </a:t>
             </a:r>
             <a:r>
               <a:rPr lang="en-GB" dirty="0" err="1" smtClean="0"/>
-              <a:t>paraconsistency</a:t>
-            </a:r>
+              <a:t>Prover</a:t>
+            </a:r>
+            <a:endParaRPr lang="en-US" dirty="0"/>
+          </a:p>
+        </p:txBody>
+      </p:sp>
+      <p:sp>
+        <p:nvSpPr>
+          <p:cNvPr id="9" name="Right Arrow 8"/>
+          <p:cNvSpPr/>
+          <p:nvPr/>
+        </p:nvSpPr>
+        <p:spPr>
+          <a:xfrm rot="5400000">
+            <a:off x="816625" y="4255001"/>
+            <a:ext cx="2743195" cy="445065"/>
+          </a:xfrm>
+          <a:prstGeom prst="rightArrow">
+            <a:avLst/>
+          </a:prstGeom>
+        </p:spPr>
+        <p:style>
+          <a:lnRef idx="0">
+            <a:schemeClr val="accent1"/>
+          </a:lnRef>
+          <a:fillRef idx="1003">
+            <a:schemeClr val="dk2"/>
+          </a:fillRef>
+          <a:effectRef idx="3">
+            <a:schemeClr val="accent1"/>
+          </a:effectRef>
+          <a:fontRef idx="minor">
+            <a:schemeClr val="lt1"/>
+          </a:fontRef>
+        </p:style>
+        <p:txBody>
+          <a:bodyPr rtlCol="0" anchor="ctr"/>
+          <a:lstStyle/>
+          <a:p>
+            <a:pPr algn="ctr"/>
             <a:r>
               <a:rPr lang="en-GB" dirty="0" smtClean="0"/>
-              <a:t> (Step 7) and extend toolkit to handle it</a:t>
-            </a:r>
+              <a:t>Step 3(+): GAP Check</a:t>
+            </a:r>
+            <a:endParaRPr lang="en-US" dirty="0"/>
+          </a:p>
+        </p:txBody>
+      </p:sp>
+      <p:sp>
+        <p:nvSpPr>
+          <p:cNvPr id="10" name="Right Arrow 9"/>
+          <p:cNvSpPr/>
+          <p:nvPr/>
+        </p:nvSpPr>
+        <p:spPr>
+          <a:xfrm flipH="1">
+            <a:off x="2887510" y="6295603"/>
+            <a:ext cx="3335266" cy="445065"/>
+          </a:xfrm>
+          <a:prstGeom prst="rightArrow">
+            <a:avLst/>
+          </a:prstGeom>
+        </p:spPr>
+        <p:style>
+          <a:lnRef idx="0">
+            <a:schemeClr val="accent1"/>
+          </a:lnRef>
+          <a:fillRef idx="1003">
+            <a:schemeClr val="dk2"/>
+          </a:fillRef>
+          <a:effectRef idx="3">
+            <a:schemeClr val="accent1"/>
+          </a:effectRef>
+          <a:fontRef idx="minor">
+            <a:schemeClr val="lt1"/>
+          </a:fontRef>
+        </p:style>
+        <p:txBody>
+          <a:bodyPr rtlCol="0" anchor="ctr"/>
+          <a:lstStyle/>
+          <a:p>
+            <a:pPr algn="ctr"/>
+            <a:r>
+              <a:rPr lang="en-GB" dirty="0" smtClean="0"/>
+              <a:t>Step 4+: Proof Extractor</a:t>
+            </a:r>
+            <a:endParaRPr lang="en-US" dirty="0"/>
+          </a:p>
+        </p:txBody>
+      </p:sp>
+      <p:sp>
+        <p:nvSpPr>
+          <p:cNvPr id="11" name="Right Arrow 10"/>
+          <p:cNvSpPr/>
+          <p:nvPr/>
+        </p:nvSpPr>
+        <p:spPr>
+          <a:xfrm flipH="1">
+            <a:off x="7621350" y="6085206"/>
+            <a:ext cx="3335266" cy="445065"/>
+          </a:xfrm>
+          <a:prstGeom prst="rightArrow">
+            <a:avLst/>
+          </a:prstGeom>
+        </p:spPr>
+        <p:style>
+          <a:lnRef idx="0">
+            <a:schemeClr val="accent1"/>
+          </a:lnRef>
+          <a:fillRef idx="1003">
+            <a:schemeClr val="dk2"/>
+          </a:fillRef>
+          <a:effectRef idx="3">
+            <a:schemeClr val="accent1"/>
+          </a:effectRef>
+          <a:fontRef idx="minor">
+            <a:schemeClr val="lt1"/>
+          </a:fontRef>
+        </p:style>
+        <p:txBody>
+          <a:bodyPr rtlCol="0" anchor="ctr"/>
+          <a:lstStyle/>
+          <a:p>
+            <a:pPr algn="ctr"/>
+            <a:r>
+              <a:rPr lang="en-GB" dirty="0" smtClean="0"/>
+              <a:t>Step 4++: Argument Builder</a:t>
+            </a:r>
+            <a:endParaRPr lang="en-US" dirty="0"/>
+          </a:p>
+        </p:txBody>
+      </p:sp>
+      <p:sp>
+        <p:nvSpPr>
+          <p:cNvPr id="12" name="Right Arrow 11"/>
+          <p:cNvSpPr/>
+          <p:nvPr/>
+        </p:nvSpPr>
+        <p:spPr>
+          <a:xfrm flipH="1">
+            <a:off x="2887510" y="2653631"/>
+            <a:ext cx="3335266" cy="445065"/>
+          </a:xfrm>
+          <a:prstGeom prst="rightArrow">
+            <a:avLst/>
+          </a:prstGeom>
+        </p:spPr>
+        <p:style>
+          <a:lnRef idx="0">
+            <a:schemeClr val="accent1"/>
+          </a:lnRef>
+          <a:fillRef idx="1003">
+            <a:schemeClr val="dk2"/>
+          </a:fillRef>
+          <a:effectRef idx="3">
+            <a:schemeClr val="accent1"/>
+          </a:effectRef>
+          <a:fontRef idx="minor">
+            <a:schemeClr val="lt1"/>
+          </a:fontRef>
+        </p:style>
+        <p:txBody>
+          <a:bodyPr rtlCol="0" anchor="ctr"/>
+          <a:lstStyle/>
+          <a:p>
+            <a:pPr algn="ctr"/>
+            <a:r>
+              <a:rPr lang="en-GB" dirty="0" smtClean="0"/>
+              <a:t>Step 1+: Proof Builder</a:t>
+            </a:r>
+            <a:endParaRPr lang="en-US" dirty="0"/>
           </a:p>
         </p:txBody>
       </p:sp>
     </p:spTree>
     <p:extLst>
       <p:ext uri="{BB962C8B-B14F-4D97-AF65-F5344CB8AC3E}">
-        <p14:creationId xmlns:p14="http://schemas.microsoft.com/office/powerpoint/2010/main" val="4134236253"/>
+        <p14:creationId xmlns:p14="http://schemas.microsoft.com/office/powerpoint/2010/main" val="2853275077"/>
       </p:ext>
     </p:extLst>
   </p:cSld>
@@ -16288,7 +16300,7 @@
           <a:p>
             <a:r>
               <a:rPr lang="en-GB" dirty="0" smtClean="0"/>
-              <a:t>Thank you for watching!</a:t>
+              <a:t>Contributions</a:t>
             </a:r>
             <a:endParaRPr lang="en-US" dirty="0"/>
           </a:p>
@@ -16306,79 +16318,80 @@
         </p:nvSpPr>
         <p:spPr/>
         <p:txBody>
-          <a:bodyPr/>
+          <a:bodyPr>
+            <a:normAutofit fontScale="92500" lnSpcReduction="10000"/>
+          </a:bodyPr>
           <a:lstStyle/>
           <a:p>
             <a:r>
               <a:rPr lang="en-GB" dirty="0" smtClean="0"/>
-              <a:t>I will happily answer any questions you may have!</a:t>
-            </a:r>
-          </a:p>
-          <a:p>
+              <a:t>Built toolkit to aid exploration of Argumentation Logic which contains</a:t>
+            </a:r>
+          </a:p>
+          <a:p>
+            <a:pPr lvl="1"/>
             <a:r>
               <a:rPr lang="en-GB" dirty="0" smtClean="0"/>
-              <a:t>Many thanks to</a:t>
-            </a:r>
+              <a:t>Theorem </a:t>
+            </a:r>
+            <a:r>
+              <a:rPr lang="en-GB" dirty="0" err="1" smtClean="0"/>
+              <a:t>prover</a:t>
+            </a:r>
+            <a:endParaRPr lang="en-GB" dirty="0" smtClean="0"/>
           </a:p>
           <a:p>
             <a:pPr lvl="1"/>
             <a:r>
-              <a:rPr lang="en-GB" dirty="0" err="1" smtClean="0"/>
-              <a:t>Dr.</a:t>
-            </a:r>
-            <a:r>
               <a:rPr lang="en-GB" dirty="0" smtClean="0"/>
-              <a:t> </a:t>
-            </a:r>
-            <a:r>
-              <a:rPr lang="en-GB" dirty="0" err="1" smtClean="0"/>
-              <a:t>Krysia</a:t>
-            </a:r>
+              <a:t>Proof builder</a:t>
+            </a:r>
+          </a:p>
+          <a:p>
+            <a:pPr lvl="1"/>
             <a:r>
               <a:rPr lang="en-GB" dirty="0" smtClean="0"/>
-              <a:t> </a:t>
-            </a:r>
-            <a:r>
-              <a:rPr lang="en-GB" dirty="0" err="1" smtClean="0"/>
-              <a:t>Broda</a:t>
-            </a:r>
-            <a:endParaRPr lang="en-GB" dirty="0" smtClean="0"/>
+              <a:t>(Extended) GAP checker</a:t>
+            </a:r>
           </a:p>
           <a:p>
             <a:pPr lvl="1"/>
             <a:r>
-              <a:rPr lang="en-GB" dirty="0" err="1" smtClean="0"/>
-              <a:t>Dr.</a:t>
-            </a:r>
-            <a:r>
               <a:rPr lang="en-GB" dirty="0" smtClean="0"/>
-              <a:t> Francesca Toni</a:t>
+              <a:t>Visualizer and extractor</a:t>
             </a:r>
           </a:p>
           <a:p>
             <a:pPr lvl="1"/>
             <a:r>
               <a:rPr lang="en-GB" dirty="0" smtClean="0"/>
-              <a:t>Claudia Schulz</a:t>
+              <a:t>Argument builder</a:t>
             </a:r>
           </a:p>
           <a:p>
             <a:pPr lvl="1"/>
             <a:r>
               <a:rPr lang="en-GB" dirty="0" smtClean="0"/>
-              <a:t>Professor </a:t>
-            </a:r>
-            <a:r>
-              <a:rPr lang="en-GB" dirty="0" err="1" smtClean="0"/>
-              <a:t>Antonis</a:t>
-            </a:r>
+              <a:t>Graphical User Interface</a:t>
+            </a:r>
+          </a:p>
+          <a:p>
             <a:r>
               <a:rPr lang="en-GB" dirty="0" smtClean="0"/>
-              <a:t> C. Kakas</a:t>
-            </a:r>
-          </a:p>
-          <a:p>
-            <a:pPr lvl="1"/>
+              <a:t>Extended the Genuine Absurdity Property to handle proofs with shortcuts</a:t>
+            </a:r>
+          </a:p>
+          <a:p>
+            <a:r>
+              <a:rPr lang="en-GB" dirty="0" smtClean="0"/>
+              <a:t>Devised an algorithm for converting GAP proofs to arguments</a:t>
+            </a:r>
+          </a:p>
+          <a:p>
+            <a:r>
+              <a:rPr lang="en-GB" dirty="0" smtClean="0"/>
+              <a:t>Devised an algorithm for converting arguments to proofs</a:t>
+            </a:r>
             <a:endParaRPr lang="en-US" dirty="0"/>
           </a:p>
         </p:txBody>
@@ -16386,7 +16399,7 @@
     </p:spTree>
     <p:extLst>
       <p:ext uri="{BB962C8B-B14F-4D97-AF65-F5344CB8AC3E}">
-        <p14:creationId xmlns:p14="http://schemas.microsoft.com/office/powerpoint/2010/main" val="1289982312"/>
+        <p14:creationId xmlns:p14="http://schemas.microsoft.com/office/powerpoint/2010/main" val="2177436208"/>
       </p:ext>
     </p:extLst>
   </p:cSld>
@@ -16437,14 +16450,276 @@
           <a:p>
             <a:r>
               <a:rPr lang="en-GB" dirty="0" smtClean="0"/>
-              <a:t>Some Theorems and Lemmas</a:t>
+              <a:t>Future Work</a:t>
             </a:r>
             <a:endParaRPr lang="en-US" dirty="0"/>
           </a:p>
         </p:txBody>
       </p:sp>
-      <mc:AlternateContent xmlns:mc="http://schemas.openxmlformats.org/markup-compatibility/2006">
-        <mc:Choice xmlns:a14="http://schemas.microsoft.com/office/drawing/2010/main" Requires="a14">
+      <p:sp>
+        <p:nvSpPr>
+          <p:cNvPr id="3" name="Content Placeholder 2"/>
+          <p:cNvSpPr>
+            <a:spLocks noGrp="1"/>
+          </p:cNvSpPr>
+          <p:nvPr>
+            <p:ph idx="1"/>
+          </p:nvPr>
+        </p:nvSpPr>
+        <p:spPr/>
+        <p:txBody>
+          <a:bodyPr/>
+          <a:lstStyle/>
+          <a:p>
+            <a:r>
+              <a:rPr lang="en-GB" dirty="0" smtClean="0"/>
+              <a:t>Improve theorem prove</a:t>
+            </a:r>
+            <a:r>
+              <a:rPr lang="en-US" dirty="0" smtClean="0"/>
+              <a:t>r</a:t>
+            </a:r>
+          </a:p>
+          <a:p>
+            <a:r>
+              <a:rPr lang="en-GB" dirty="0" smtClean="0"/>
+              <a:t>Convert non-GAP proofs to GAP (Step 5)</a:t>
+            </a:r>
+            <a:endParaRPr lang="en-US" dirty="0" smtClean="0"/>
+          </a:p>
+          <a:p>
+            <a:r>
+              <a:rPr lang="en-GB" dirty="0" smtClean="0"/>
+              <a:t>Re-introduce disjunction (Step 6)</a:t>
+            </a:r>
+          </a:p>
+          <a:p>
+            <a:r>
+              <a:rPr lang="en-GB" dirty="0" smtClean="0"/>
+              <a:t>Look into </a:t>
+            </a:r>
+            <a:r>
+              <a:rPr lang="en-GB" dirty="0" err="1" smtClean="0"/>
+              <a:t>paraconsistency</a:t>
+            </a:r>
+            <a:r>
+              <a:rPr lang="en-GB" dirty="0" smtClean="0"/>
+              <a:t> (Step 7) and extend toolkit to handle it</a:t>
+            </a:r>
+          </a:p>
+        </p:txBody>
+      </p:sp>
+    </p:spTree>
+    <p:extLst>
+      <p:ext uri="{BB962C8B-B14F-4D97-AF65-F5344CB8AC3E}">
+        <p14:creationId xmlns:p14="http://schemas.microsoft.com/office/powerpoint/2010/main" val="4134236253"/>
+      </p:ext>
+    </p:extLst>
+  </p:cSld>
+  <p:clrMapOvr>
+    <a:masterClrMapping/>
+  </p:clrMapOvr>
+  <p:timing>
+    <p:tnLst>
+      <p:par>
+        <p:cTn id="1" dur="indefinite" restart="never" nodeType="tmRoot"/>
+      </p:par>
+    </p:tnLst>
+  </p:timing>
+</p:sld>
+</file>
+
+<file path=ppt/slides/slide26.xml><?xml version="1.0" encoding="utf-8"?>
+<p:sld xmlns:a="http://schemas.openxmlformats.org/drawingml/2006/main" xmlns:r="http://schemas.openxmlformats.org/officeDocument/2006/relationships" xmlns:p="http://schemas.openxmlformats.org/presentationml/2006/main">
+  <p:cSld>
+    <p:spTree>
+      <p:nvGrpSpPr>
+        <p:cNvPr id="1" name=""/>
+        <p:cNvGrpSpPr/>
+        <p:nvPr/>
+      </p:nvGrpSpPr>
+      <p:grpSpPr>
+        <a:xfrm>
+          <a:off x="0" y="0"/>
+          <a:ext cx="0" cy="0"/>
+          <a:chOff x="0" y="0"/>
+          <a:chExt cx="0" cy="0"/>
+        </a:xfrm>
+      </p:grpSpPr>
+      <p:sp>
+        <p:nvSpPr>
+          <p:cNvPr id="2" name="Title 1"/>
+          <p:cNvSpPr>
+            <a:spLocks noGrp="1"/>
+          </p:cNvSpPr>
+          <p:nvPr>
+            <p:ph type="title"/>
+          </p:nvPr>
+        </p:nvSpPr>
+        <p:spPr/>
+        <p:txBody>
+          <a:bodyPr/>
+          <a:lstStyle/>
+          <a:p>
+            <a:r>
+              <a:rPr lang="en-GB" dirty="0" smtClean="0"/>
+              <a:t>Thank you for watching!</a:t>
+            </a:r>
+            <a:endParaRPr lang="en-US" dirty="0"/>
+          </a:p>
+        </p:txBody>
+      </p:sp>
+      <p:sp>
+        <p:nvSpPr>
+          <p:cNvPr id="3" name="Content Placeholder 2"/>
+          <p:cNvSpPr>
+            <a:spLocks noGrp="1"/>
+          </p:cNvSpPr>
+          <p:nvPr>
+            <p:ph idx="1"/>
+          </p:nvPr>
+        </p:nvSpPr>
+        <p:spPr/>
+        <p:txBody>
+          <a:bodyPr/>
+          <a:lstStyle/>
+          <a:p>
+            <a:r>
+              <a:rPr lang="en-GB" dirty="0" smtClean="0"/>
+              <a:t>I will happily answer any questions you may have!</a:t>
+            </a:r>
+          </a:p>
+          <a:p>
+            <a:r>
+              <a:rPr lang="en-GB" dirty="0" smtClean="0"/>
+              <a:t>Many thanks to</a:t>
+            </a:r>
+          </a:p>
+          <a:p>
+            <a:pPr lvl="1"/>
+            <a:r>
+              <a:rPr lang="en-GB" dirty="0" err="1" smtClean="0"/>
+              <a:t>Dr.</a:t>
+            </a:r>
+            <a:r>
+              <a:rPr lang="en-GB" dirty="0" smtClean="0"/>
+              <a:t> </a:t>
+            </a:r>
+            <a:r>
+              <a:rPr lang="en-GB" dirty="0" err="1" smtClean="0"/>
+              <a:t>Krysia</a:t>
+            </a:r>
+            <a:r>
+              <a:rPr lang="en-GB" dirty="0" smtClean="0"/>
+              <a:t> </a:t>
+            </a:r>
+            <a:r>
+              <a:rPr lang="en-GB" dirty="0" err="1" smtClean="0"/>
+              <a:t>Broda</a:t>
+            </a:r>
+            <a:endParaRPr lang="en-GB" dirty="0" smtClean="0"/>
+          </a:p>
+          <a:p>
+            <a:pPr lvl="1"/>
+            <a:r>
+              <a:rPr lang="en-GB" dirty="0" err="1" smtClean="0"/>
+              <a:t>Dr.</a:t>
+            </a:r>
+            <a:r>
+              <a:rPr lang="en-GB" dirty="0" smtClean="0"/>
+              <a:t> Francesca Toni</a:t>
+            </a:r>
+          </a:p>
+          <a:p>
+            <a:pPr lvl="1"/>
+            <a:r>
+              <a:rPr lang="en-GB" dirty="0" smtClean="0"/>
+              <a:t>Claudia Schulz</a:t>
+            </a:r>
+          </a:p>
+          <a:p>
+            <a:pPr lvl="1"/>
+            <a:r>
+              <a:rPr lang="en-GB" dirty="0" smtClean="0"/>
+              <a:t>Professor </a:t>
+            </a:r>
+            <a:r>
+              <a:rPr lang="en-GB" dirty="0" err="1" smtClean="0"/>
+              <a:t>Antonis</a:t>
+            </a:r>
+            <a:r>
+              <a:rPr lang="en-GB" dirty="0" smtClean="0"/>
+              <a:t> C. Kakas</a:t>
+            </a:r>
+          </a:p>
+          <a:p>
+            <a:pPr lvl="1"/>
+            <a:endParaRPr lang="en-US" dirty="0"/>
+          </a:p>
+        </p:txBody>
+      </p:sp>
+    </p:spTree>
+    <p:extLst>
+      <p:ext uri="{BB962C8B-B14F-4D97-AF65-F5344CB8AC3E}">
+        <p14:creationId xmlns:p14="http://schemas.microsoft.com/office/powerpoint/2010/main" val="1289982312"/>
+      </p:ext>
+    </p:extLst>
+  </p:cSld>
+  <p:clrMapOvr>
+    <a:masterClrMapping/>
+  </p:clrMapOvr>
+  <p:timing>
+    <p:tnLst>
+      <p:par>
+        <p:cTn id="1" dur="indefinite" restart="never" nodeType="tmRoot"/>
+      </p:par>
+    </p:tnLst>
+  </p:timing>
+</p:sld>
+</file>
+
+<file path=ppt/slides/slide27.xml><?xml version="1.0" encoding="utf-8"?>
+<p:sld xmlns:a="http://schemas.openxmlformats.org/drawingml/2006/main" xmlns:r="http://schemas.openxmlformats.org/officeDocument/2006/relationships" xmlns:p="http://schemas.openxmlformats.org/presentationml/2006/main">
+  <p:cSld>
+    <p:spTree>
+      <p:nvGrpSpPr>
+        <p:cNvPr id="1" name=""/>
+        <p:cNvGrpSpPr/>
+        <p:nvPr/>
+      </p:nvGrpSpPr>
+      <p:grpSpPr>
+        <a:xfrm>
+          <a:off x="0" y="0"/>
+          <a:ext cx="0" cy="0"/>
+          <a:chOff x="0" y="0"/>
+          <a:chExt cx="0" cy="0"/>
+        </a:xfrm>
+      </p:grpSpPr>
+      <p:sp>
+        <p:nvSpPr>
+          <p:cNvPr id="2" name="Title 1"/>
+          <p:cNvSpPr>
+            <a:spLocks noGrp="1"/>
+          </p:cNvSpPr>
+          <p:nvPr>
+            <p:ph type="title"/>
+          </p:nvPr>
+        </p:nvSpPr>
+        <p:spPr/>
+        <p:txBody>
+          <a:bodyPr/>
+          <a:lstStyle/>
+          <a:p>
+            <a:r>
+              <a:rPr lang="en-GB" dirty="0" smtClean="0"/>
+              <a:t>Some Theorems and Lemmas</a:t>
+            </a:r>
+            <a:endParaRPr lang="en-US" dirty="0"/>
+          </a:p>
+        </p:txBody>
+      </p:sp>
+      <mc:AlternateContent xmlns:mc="http://schemas.openxmlformats.org/markup-compatibility/2006" xmlns:a14="http://schemas.microsoft.com/office/drawing/2010/main">
+        <mc:Choice Requires="a14">
           <p:sp>
             <p:nvSpPr>
               <p:cNvPr id="3" name="Content Placeholder 2"/>
@@ -16759,7 +17034,7 @@
             </p:txBody>
           </p:sp>
         </mc:Choice>
-        <mc:Fallback>
+        <mc:Fallback xmlns="">
           <p:sp>
             <p:nvSpPr>
               <p:cNvPr id="3" name="Content Placeholder 2"/>
@@ -16803,6 +17078,13 @@
   <p:clrMapOvr>
     <a:masterClrMapping/>
   </p:clrMapOvr>
+  <p:timing>
+    <p:tnLst>
+      <p:par>
+        <p:cTn id="1" dur="indefinite" restart="never" nodeType="tmRoot"/>
+      </p:par>
+    </p:tnLst>
+  </p:timing>
 </p:sld>
 </file>
 
@@ -16979,8 +17261,8 @@
           </a:p>
         </p:txBody>
       </p:sp>
-      <mc:AlternateContent xmlns:mc="http://schemas.openxmlformats.org/markup-compatibility/2006">
-        <mc:Choice xmlns:a14="http://schemas.microsoft.com/office/drawing/2010/main" Requires="a14">
+      <mc:AlternateContent xmlns:mc="http://schemas.openxmlformats.org/markup-compatibility/2006" xmlns:a14="http://schemas.microsoft.com/office/drawing/2010/main">
+        <mc:Choice Requires="a14">
           <p:sp>
             <p:nvSpPr>
               <p:cNvPr id="3" name="Content Placeholder 2"/>
@@ -17070,11 +17352,7 @@
                 </a:r>
                 <a:r>
                   <a:rPr lang="en-GB" dirty="0" smtClean="0"/>
-                  <a:t> </a:t>
-                </a:r>
-                <a:r>
-                  <a:rPr lang="en-GB" dirty="0" smtClean="0"/>
-                  <a:t>ad Absurdum (“Not Introduction”) Rule</a:t>
+                  <a:t> ad Absurdum (“Not Introduction”) Rule</a:t>
                 </a:r>
               </a:p>
               <a:p>
@@ -17157,7 +17435,7 @@
             </p:txBody>
           </p:sp>
         </mc:Choice>
-        <mc:Fallback>
+        <mc:Fallback xmlns="">
           <p:sp>
             <p:nvSpPr>
               <p:cNvPr id="3" name="Content Placeholder 2"/>
@@ -18683,8 +18961,8 @@
           </a:p>
         </p:txBody>
       </p:sp>
-      <mc:AlternateContent xmlns:mc="http://schemas.openxmlformats.org/markup-compatibility/2006">
-        <mc:Choice xmlns:a14="http://schemas.microsoft.com/office/drawing/2010/main" Requires="a14">
+      <mc:AlternateContent xmlns:mc="http://schemas.openxmlformats.org/markup-compatibility/2006" xmlns:a14="http://schemas.microsoft.com/office/drawing/2010/main">
+        <mc:Choice Requires="a14">
           <p:sp>
             <p:nvSpPr>
               <p:cNvPr id="3" name="Content Placeholder 2"/>
@@ -19229,7 +19507,7 @@
             </p:txBody>
           </p:sp>
         </mc:Choice>
-        <mc:Fallback>
+        <mc:Fallback xmlns="">
           <p:sp>
             <p:nvSpPr>
               <p:cNvPr id="3" name="Content Placeholder 2"/>
@@ -19317,43 +19595,252 @@
           <a:p>
             <a:r>
               <a:rPr lang="en-GB" dirty="0" smtClean="0"/>
-              <a:t>The Point of it All</a:t>
+              <a:t>Non-Acceptability Semantics Example</a:t>
             </a:r>
             <a:endParaRPr lang="en-US" dirty="0"/>
           </a:p>
         </p:txBody>
       </p:sp>
-      <p:sp>
-        <p:nvSpPr>
-          <p:cNvPr id="3" name="Content Placeholder 2"/>
-          <p:cNvSpPr>
-            <a:spLocks noGrp="1"/>
-          </p:cNvSpPr>
+      <mc:AlternateContent xmlns:mc="http://schemas.openxmlformats.org/markup-compatibility/2006">
+        <mc:Choice xmlns:a14="http://schemas.microsoft.com/office/drawing/2010/main" Requires="a14">
+          <p:sp>
+            <p:nvSpPr>
+              <p:cNvPr id="4" name="Content Placeholder 3"/>
+              <p:cNvSpPr>
+                <a:spLocks noGrp="1"/>
+              </p:cNvSpPr>
+              <p:nvPr>
+                <p:ph sz="half" idx="1"/>
+              </p:nvPr>
+            </p:nvSpPr>
+            <p:spPr/>
+            <p:txBody>
+              <a:bodyPr/>
+              <a:lstStyle/>
+              <a:p>
+                <a:r>
+                  <a:rPr lang="en-GB" dirty="0" smtClean="0"/>
+                  <a:t>Assume theory </a:t>
+                </a:r>
+                <a14:m>
+                  <m:oMath xmlns:m="http://schemas.openxmlformats.org/officeDocument/2006/math">
+                    <m:r>
+                      <a:rPr lang="en-GB" b="0" i="1" smtClean="0">
+                        <a:latin typeface="Cambria Math" panose="02040503050406030204" pitchFamily="18" charset="0"/>
+                      </a:rPr>
+                      <m:t>{¬</m:t>
+                    </m:r>
+                    <m:d>
+                      <m:dPr>
+                        <m:ctrlPr>
+                          <a:rPr lang="en-GB" b="0" i="1" smtClean="0">
+                            <a:latin typeface="Cambria Math" panose="02040503050406030204" pitchFamily="18" charset="0"/>
+                          </a:rPr>
+                        </m:ctrlPr>
+                      </m:dPr>
+                      <m:e>
+                        <m:r>
+                          <a:rPr lang="en-GB" b="0" i="1" smtClean="0">
+                            <a:latin typeface="Cambria Math" panose="02040503050406030204" pitchFamily="18" charset="0"/>
+                          </a:rPr>
+                          <m:t>𝛽</m:t>
+                        </m:r>
+                        <m:r>
+                          <a:rPr lang="en-GB" b="0" i="1" smtClean="0">
+                            <a:latin typeface="Cambria Math" panose="02040503050406030204" pitchFamily="18" charset="0"/>
+                          </a:rPr>
+                          <m:t>∧</m:t>
+                        </m:r>
+                        <m:r>
+                          <a:rPr lang="en-GB" b="0" i="1" smtClean="0">
+                            <a:latin typeface="Cambria Math" panose="02040503050406030204" pitchFamily="18" charset="0"/>
+                          </a:rPr>
+                          <m:t>𝛼</m:t>
+                        </m:r>
+                      </m:e>
+                    </m:d>
+                    <m:r>
+                      <a:rPr lang="en-GB" b="0" i="1" smtClean="0">
+                        <a:latin typeface="Cambria Math" panose="02040503050406030204" pitchFamily="18" charset="0"/>
+                      </a:rPr>
+                      <m:t>, ¬</m:t>
+                    </m:r>
+                    <m:d>
+                      <m:dPr>
+                        <m:ctrlPr>
+                          <a:rPr lang="en-GB" b="0" i="1" smtClean="0">
+                            <a:latin typeface="Cambria Math" panose="02040503050406030204" pitchFamily="18" charset="0"/>
+                          </a:rPr>
+                        </m:ctrlPr>
+                      </m:dPr>
+                      <m:e>
+                        <m:r>
+                          <a:rPr lang="en-GB" b="0" i="1" smtClean="0">
+                            <a:latin typeface="Cambria Math" panose="02040503050406030204" pitchFamily="18" charset="0"/>
+                          </a:rPr>
+                          <m:t>¬</m:t>
+                        </m:r>
+                        <m:r>
+                          <a:rPr lang="en-GB" b="0" i="1" smtClean="0">
+                            <a:latin typeface="Cambria Math" panose="02040503050406030204" pitchFamily="18" charset="0"/>
+                          </a:rPr>
+                          <m:t>𝛽</m:t>
+                        </m:r>
+                        <m:r>
+                          <a:rPr lang="en-GB" b="0" i="1" smtClean="0">
+                            <a:latin typeface="Cambria Math" panose="02040503050406030204" pitchFamily="18" charset="0"/>
+                          </a:rPr>
+                          <m:t>∧</m:t>
+                        </m:r>
+                        <m:r>
+                          <a:rPr lang="en-GB" b="0" i="1" smtClean="0">
+                            <a:latin typeface="Cambria Math" panose="02040503050406030204" pitchFamily="18" charset="0"/>
+                          </a:rPr>
+                          <m:t>𝛾</m:t>
+                        </m:r>
+                      </m:e>
+                    </m:d>
+                    <m:r>
+                      <a:rPr lang="en-GB" b="0" i="1" smtClean="0">
+                        <a:latin typeface="Cambria Math" panose="02040503050406030204" pitchFamily="18" charset="0"/>
+                      </a:rPr>
+                      <m:t>, ¬</m:t>
+                    </m:r>
+                    <m:d>
+                      <m:dPr>
+                        <m:ctrlPr>
+                          <a:rPr lang="en-GB" b="0" i="1" smtClean="0">
+                            <a:latin typeface="Cambria Math" panose="02040503050406030204" pitchFamily="18" charset="0"/>
+                          </a:rPr>
+                        </m:ctrlPr>
+                      </m:dPr>
+                      <m:e>
+                        <m:r>
+                          <a:rPr lang="en-GB" b="0" i="1" smtClean="0">
+                            <a:latin typeface="Cambria Math" panose="02040503050406030204" pitchFamily="18" charset="0"/>
+                          </a:rPr>
+                          <m:t>𝛼</m:t>
+                        </m:r>
+                        <m:r>
+                          <a:rPr lang="en-GB" b="0" i="1" smtClean="0">
+                            <a:latin typeface="Cambria Math" panose="02040503050406030204" pitchFamily="18" charset="0"/>
+                          </a:rPr>
+                          <m:t>∧¬</m:t>
+                        </m:r>
+                        <m:r>
+                          <a:rPr lang="en-GB" b="0" i="1" smtClean="0">
+                            <a:latin typeface="Cambria Math" panose="02040503050406030204" pitchFamily="18" charset="0"/>
+                          </a:rPr>
+                          <m:t>𝛽</m:t>
+                        </m:r>
+                        <m:r>
+                          <a:rPr lang="en-GB" b="0" i="1" smtClean="0">
+                            <a:latin typeface="Cambria Math" panose="02040503050406030204" pitchFamily="18" charset="0"/>
+                          </a:rPr>
+                          <m:t>∧¬</m:t>
+                        </m:r>
+                        <m:r>
+                          <a:rPr lang="en-GB" b="0" i="1" smtClean="0">
+                            <a:latin typeface="Cambria Math" panose="02040503050406030204" pitchFamily="18" charset="0"/>
+                          </a:rPr>
+                          <m:t>𝛾</m:t>
+                        </m:r>
+                      </m:e>
+                    </m:d>
+                    <m:r>
+                      <a:rPr lang="en-GB" b="0" i="1" smtClean="0">
+                        <a:latin typeface="Cambria Math" panose="02040503050406030204" pitchFamily="18" charset="0"/>
+                      </a:rPr>
+                      <m:t>}</m:t>
+                    </m:r>
+                  </m:oMath>
+                </a14:m>
+                <a:endParaRPr lang="en-US" dirty="0" smtClean="0"/>
+              </a:p>
+              <a:p>
+                <a:r>
+                  <a:rPr lang="en-GB" dirty="0" smtClean="0"/>
+                  <a:t>We will try to prove the non-acceptability of </a:t>
+                </a:r>
+                <a14:m>
+                  <m:oMath xmlns:m="http://schemas.openxmlformats.org/officeDocument/2006/math">
+                    <m:r>
+                      <a:rPr lang="en-GB" b="0" i="1" smtClean="0">
+                        <a:latin typeface="Cambria Math" panose="02040503050406030204" pitchFamily="18" charset="0"/>
+                      </a:rPr>
+                      <m:t>𝛼</m:t>
+                    </m:r>
+                  </m:oMath>
+                </a14:m>
+                <a:endParaRPr lang="en-US" dirty="0"/>
+              </a:p>
+            </p:txBody>
+          </p:sp>
+        </mc:Choice>
+        <mc:Fallback>
+          <p:sp>
+            <p:nvSpPr>
+              <p:cNvPr id="4" name="Content Placeholder 3"/>
+              <p:cNvSpPr>
+                <a:spLocks noGrp="1" noRot="1" noChangeAspect="1" noMove="1" noResize="1" noEditPoints="1" noAdjustHandles="1" noChangeArrowheads="1" noChangeShapeType="1" noTextEdit="1"/>
+              </p:cNvSpPr>
+              <p:nvPr>
+                <p:ph sz="half" idx="1"/>
+              </p:nvPr>
+            </p:nvSpPr>
+            <p:spPr>
+              <a:blipFill rotWithShape="0">
+                <a:blip r:embed="rId2"/>
+                <a:stretch>
+                  <a:fillRect l="-253" t="-12656"/>
+                </a:stretch>
+              </a:blipFill>
+            </p:spPr>
+            <p:txBody>
+              <a:bodyPr/>
+              <a:lstStyle/>
+              <a:p>
+                <a:r>
+                  <a:rPr lang="en-US">
+                    <a:noFill/>
+                  </a:rPr>
+                  <a:t> </a:t>
+                </a:r>
+              </a:p>
+            </p:txBody>
+          </p:sp>
+        </mc:Fallback>
+      </mc:AlternateContent>
+      <p:pic>
+        <p:nvPicPr>
+          <p:cNvPr id="6" name="Content Placeholder 5"/>
+          <p:cNvPicPr>
+            <a:picLocks noGrp="1" noChangeAspect="1"/>
+          </p:cNvPicPr>
           <p:nvPr>
-            <p:ph idx="1"/>
+            <p:ph sz="half" idx="2"/>
           </p:nvPr>
-        </p:nvSpPr>
-        <p:spPr/>
-        <p:txBody>
-          <a:bodyPr/>
-          <a:lstStyle/>
-          <a:p>
-            <a:r>
-              <a:rPr lang="en-GB" dirty="0" smtClean="0"/>
-              <a:t>GAP ↔ </a:t>
-            </a:r>
-            <a:r>
-              <a:rPr lang="en-GB" dirty="0" smtClean="0"/>
-              <a:t>NACC (for consistent theories)</a:t>
-            </a:r>
-            <a:endParaRPr lang="en-US" dirty="0"/>
-          </a:p>
-        </p:txBody>
-      </p:sp>
+        </p:nvPicPr>
+        <p:blipFill>
+          <a:blip r:embed="rId3"/>
+          <a:stretch>
+            <a:fillRect/>
+          </a:stretch>
+        </p:blipFill>
+        <p:spPr>
+          <a:xfrm>
+            <a:off x="7689730" y="2603500"/>
+            <a:ext cx="1862378" cy="3416300"/>
+          </a:xfrm>
+          <a:prstGeom prst="rect">
+            <a:avLst/>
+          </a:prstGeom>
+        </p:spPr>
+      </p:pic>
     </p:spTree>
     <p:extLst>
       <p:ext uri="{BB962C8B-B14F-4D97-AF65-F5344CB8AC3E}">
-        <p14:creationId xmlns:p14="http://schemas.microsoft.com/office/powerpoint/2010/main" val="3882039320"/>
+        <p14:creationId xmlns:p14="http://schemas.microsoft.com/office/powerpoint/2010/main" val="1021157963"/>
       </p:ext>
     </p:extLst>
   </p:cSld>

</xml_diff>

<commit_message>
minor update to presentation
</commit_message>
<xml_diff>
--- a/Presentation/AL Toolkit.pptx
+++ b/Presentation/AL Toolkit.pptx
@@ -16,14 +16,14 @@
     <p:sldId id="281" r:id="rId10"/>
     <p:sldId id="264" r:id="rId11"/>
     <p:sldId id="265" r:id="rId12"/>
-    <p:sldId id="266" r:id="rId13"/>
-    <p:sldId id="267" r:id="rId14"/>
-    <p:sldId id="282" r:id="rId15"/>
-    <p:sldId id="268" r:id="rId16"/>
-    <p:sldId id="269" r:id="rId17"/>
-    <p:sldId id="270" r:id="rId18"/>
-    <p:sldId id="271" r:id="rId19"/>
-    <p:sldId id="272" r:id="rId20"/>
+    <p:sldId id="267" r:id="rId13"/>
+    <p:sldId id="282" r:id="rId14"/>
+    <p:sldId id="268" r:id="rId15"/>
+    <p:sldId id="269" r:id="rId16"/>
+    <p:sldId id="270" r:id="rId17"/>
+    <p:sldId id="271" r:id="rId18"/>
+    <p:sldId id="272" r:id="rId19"/>
+    <p:sldId id="283" r:id="rId20"/>
     <p:sldId id="273" r:id="rId21"/>
     <p:sldId id="274" r:id="rId22"/>
     <p:sldId id="275" r:id="rId23"/>
@@ -474,7 +474,7 @@
             <a:fld id="{5923F103-BC34-4FE4-A40E-EDDEECFDA5D0}" type="datetimeFigureOut">
               <a:rPr lang="en-US" dirty="0"/>
               <a:pPr/>
-              <a:t>6/20/2014</a:t>
+              <a:t>6/21/2014</a:t>
             </a:fld>
             <a:endParaRPr lang="en-US" dirty="0"/>
           </a:p>
@@ -1562,7 +1562,7 @@
           <a:p>
             <a:fld id="{923A1CC3-2375-41D4-9E03-427CAF2A4C1A}" type="datetimeFigureOut">
               <a:rPr lang="en-US" dirty="0"/>
-              <a:t>6/20/2014</a:t>
+              <a:t>6/21/2014</a:t>
             </a:fld>
             <a:endParaRPr lang="en-US" dirty="0"/>
           </a:p>
@@ -2542,7 +2542,7 @@
           <a:p>
             <a:fld id="{AFF16868-8199-4C2C-A5B1-63AEE139F88E}" type="datetimeFigureOut">
               <a:rPr lang="en-US" dirty="0"/>
-              <a:t>6/20/2014</a:t>
+              <a:t>6/21/2014</a:t>
             </a:fld>
             <a:endParaRPr lang="en-US" dirty="0"/>
           </a:p>
@@ -3676,7 +3676,7 @@
           <a:p>
             <a:fld id="{AAD9FF7F-6988-44CC-821B-644E70CD2F73}" type="datetimeFigureOut">
               <a:rPr lang="en-US" dirty="0"/>
-              <a:t>6/20/2014</a:t>
+              <a:t>6/21/2014</a:t>
             </a:fld>
             <a:endParaRPr lang="en-US" dirty="0"/>
           </a:p>
@@ -4709,7 +4709,7 @@
           <a:p>
             <a:fld id="{5C12C299-16B2-4475-990D-751901EACC14}" type="datetimeFigureOut">
               <a:rPr lang="en-US" dirty="0"/>
-              <a:t>6/20/2014</a:t>
+              <a:t>6/21/2014</a:t>
             </a:fld>
             <a:endParaRPr lang="en-US" dirty="0"/>
           </a:p>
@@ -5369,7 +5369,7 @@
           <a:p>
             <a:fld id="{9FE86839-B9D8-4651-8783-F325ECE74E65}" type="datetimeFigureOut">
               <a:rPr lang="en-US" dirty="0"/>
-              <a:t>6/20/2014</a:t>
+              <a:t>6/21/2014</a:t>
             </a:fld>
             <a:endParaRPr lang="en-US" dirty="0"/>
           </a:p>
@@ -6230,7 +6230,7 @@
           <a:p>
             <a:fld id="{FD484F64-32F6-45C5-931F-ADC1662401D0}" type="datetimeFigureOut">
               <a:rPr lang="en-US" dirty="0"/>
-              <a:t>6/20/2014</a:t>
+              <a:t>6/21/2014</a:t>
             </a:fld>
             <a:endParaRPr lang="en-US" dirty="0"/>
           </a:p>
@@ -6420,7 +6420,7 @@
           <a:p>
             <a:fld id="{53086D93-FCAC-47E0-A2EE-787E62CA814C}" type="datetimeFigureOut">
               <a:rPr lang="en-US" dirty="0"/>
-              <a:t>6/20/2014</a:t>
+              <a:t>6/21/2014</a:t>
             </a:fld>
             <a:endParaRPr lang="en-US" dirty="0"/>
           </a:p>
@@ -7392,7 +7392,7 @@
           <a:p>
             <a:fld id="{CDA879A6-0FD0-4734-A311-86BFCA472E6E}" type="datetimeFigureOut">
               <a:rPr lang="en-US" dirty="0"/>
-              <a:t>6/20/2014</a:t>
+              <a:t>6/21/2014</a:t>
             </a:fld>
             <a:endParaRPr lang="en-US" dirty="0"/>
           </a:p>
@@ -7603,7 +7603,7 @@
           <a:p>
             <a:fld id="{19C9CA7B-DFD4-44B5-8C60-D14B8CD1FB59}" type="datetimeFigureOut">
               <a:rPr lang="en-US" dirty="0"/>
-              <a:t>6/20/2014</a:t>
+              <a:t>6/21/2014</a:t>
             </a:fld>
             <a:endParaRPr lang="en-US" dirty="0"/>
           </a:p>
@@ -8637,7 +8637,7 @@
           <a:p>
             <a:fld id="{F34E6425-0181-43F2-84FC-787E803FD2F8}" type="datetimeFigureOut">
               <a:rPr lang="en-US" dirty="0"/>
-              <a:t>6/20/2014</a:t>
+              <a:t>6/21/2014</a:t>
             </a:fld>
             <a:endParaRPr lang="en-US" dirty="0"/>
           </a:p>
@@ -8909,7 +8909,7 @@
           <a:p>
             <a:fld id="{3BDB8791-F1B0-41E7-B7FD-A781E65C4266}" type="datetimeFigureOut">
               <a:rPr lang="en-US" dirty="0"/>
-              <a:t>6/20/2014</a:t>
+              <a:t>6/21/2014</a:t>
             </a:fld>
             <a:endParaRPr lang="en-US" dirty="0"/>
           </a:p>
@@ -9319,7 +9319,7 @@
           <a:p>
             <a:fld id="{5FDD63B2-E120-4ED8-B27B-C685F510A5FE}" type="datetimeFigureOut">
               <a:rPr lang="en-US" dirty="0"/>
-              <a:t>6/20/2014</a:t>
+              <a:t>6/21/2014</a:t>
             </a:fld>
             <a:endParaRPr lang="en-US" dirty="0"/>
           </a:p>
@@ -9446,7 +9446,7 @@
           <a:p>
             <a:fld id="{7AA18ACC-A947-437B-A130-35BD54FDF1E9}" type="datetimeFigureOut">
               <a:rPr lang="en-US" dirty="0"/>
-              <a:t>6/20/2014</a:t>
+              <a:t>6/21/2014</a:t>
             </a:fld>
             <a:endParaRPr lang="en-US" dirty="0"/>
           </a:p>
@@ -9541,7 +9541,7 @@
           <a:p>
             <a:fld id="{7C8D7E02-BCB8-4D50-A234-369438C08659}" type="datetimeFigureOut">
               <a:rPr lang="en-US" dirty="0"/>
-              <a:t>6/20/2014</a:t>
+              <a:t>6/21/2014</a:t>
             </a:fld>
             <a:endParaRPr lang="en-US" dirty="0"/>
           </a:p>
@@ -10622,7 +10622,7 @@
           <a:p>
             <a:fld id="{76E86A4C-8E40-4F87-A4F0-01A0687C5742}" type="datetimeFigureOut">
               <a:rPr lang="en-US" dirty="0"/>
-              <a:t>6/20/2014</a:t>
+              <a:t>6/21/2014</a:t>
             </a:fld>
             <a:endParaRPr lang="en-US" dirty="0"/>
           </a:p>
@@ -11730,7 +11730,7 @@
           <a:p>
             <a:fld id="{35E72C73-2D91-4E12-BA25-F0AA0C03599B}" type="datetimeFigureOut">
               <a:rPr lang="en-US" dirty="0"/>
-              <a:t>6/20/2014</a:t>
+              <a:t>6/21/2014</a:t>
             </a:fld>
             <a:endParaRPr lang="en-US" dirty="0"/>
           </a:p>
@@ -12727,7 +12727,7 @@
           <a:p>
             <a:fld id="{2BE451C3-0FF4-47C4-B829-773ADF60F88C}" type="datetimeFigureOut">
               <a:rPr lang="en-US" dirty="0"/>
-              <a:t>6/20/2014</a:t>
+              <a:t>6/21/2014</a:t>
             </a:fld>
             <a:endParaRPr lang="en-US" dirty="0"/>
           </a:p>
@@ -13700,20 +13700,24 @@
               <a:t>Step 1: Generic Theorem </a:t>
             </a:r>
             <a:r>
+              <a:rPr lang="en-GB" dirty="0" err="1" smtClean="0"/>
+              <a:t>Prover</a:t>
+            </a:r>
+            <a:endParaRPr lang="en-GB" dirty="0" smtClean="0"/>
+          </a:p>
+          <a:p>
+            <a:r>
+              <a:rPr lang="en-GB" dirty="0" smtClean="0"/>
+              <a:t>Step </a:t>
+            </a:r>
+            <a:r>
+              <a:rPr lang="en-GB" dirty="0"/>
+              <a:t>2: Theorem </a:t>
+            </a:r>
+            <a:r>
               <a:rPr lang="en-GB" dirty="0" err="1"/>
               <a:t>Prover</a:t>
             </a:r>
-            <a:endParaRPr lang="en-GB" dirty="0"/>
-          </a:p>
-          <a:p>
-            <a:r>
-              <a:rPr lang="en-GB" dirty="0"/>
-              <a:t>Step 2: Theorem </a:t>
-            </a:r>
-            <a:r>
-              <a:rPr lang="en-GB" dirty="0" err="1"/>
-              <a:t>Prover</a:t>
-            </a:r>
             <a:r>
               <a:rPr lang="en-GB" dirty="0"/>
               <a:t> fit for purpose</a:t>
@@ -13722,19 +13726,35 @@
           <a:p>
             <a:r>
               <a:rPr lang="en-GB" dirty="0"/>
-              <a:t>Step 3: Genuine Absurdity Property check</a:t>
-            </a:r>
-          </a:p>
-          <a:p>
+              <a:t>Step 3: Genuine Absurdity Property </a:t>
+            </a:r>
+            <a:r>
+              <a:rPr lang="en-GB" dirty="0" smtClean="0"/>
+              <a:t>check</a:t>
+            </a:r>
+          </a:p>
+          <a:p>
+            <a:r>
+              <a:rPr lang="en-GB" dirty="0" smtClean="0"/>
+              <a:t>Step </a:t>
+            </a:r>
             <a:r>
               <a:rPr lang="en-GB" dirty="0"/>
-              <a:t>Step 4: Visualize GAP Proofs</a:t>
-            </a:r>
-          </a:p>
-          <a:p>
+              <a:t>4: Visualize GAP </a:t>
+            </a:r>
+            <a:r>
+              <a:rPr lang="en-GB" dirty="0" smtClean="0"/>
+              <a:t>Proofs</a:t>
+            </a:r>
+          </a:p>
+          <a:p>
+            <a:r>
+              <a:rPr lang="en-GB" strike="sngStrike" dirty="0" smtClean="0"/>
+              <a:t>Step </a:t>
+            </a:r>
             <a:r>
               <a:rPr lang="en-GB" strike="sngStrike" dirty="0"/>
-              <a:t>Step 5: Convert non-GAP to GAP Proofs</a:t>
+              <a:t>5: Convert non-GAP to GAP Proofs</a:t>
             </a:r>
           </a:p>
           <a:p>
@@ -13749,10 +13769,13 @@
               <a:t>Step 7: Venture into </a:t>
             </a:r>
             <a:r>
-              <a:rPr lang="en-GB" strike="sngStrike" dirty="0" err="1" smtClean="0"/>
+              <a:rPr lang="en-GB" strike="sngStrike" dirty="0" err="1"/>
               <a:t>Paraconsistency</a:t>
             </a:r>
             <a:endParaRPr lang="en-US" strike="sngStrike" dirty="0"/>
+          </a:p>
+          <a:p>
+            <a:endParaRPr lang="en-US" b="1" dirty="0"/>
           </a:p>
         </p:txBody>
       </p:sp>
@@ -13773,14 +13796,38 @@
           </a:bodyPr>
           <a:lstStyle/>
           <a:p>
-            <a:endParaRPr lang="en-US"/>
+            <a:r>
+              <a:rPr lang="en-GB" b="1" dirty="0"/>
+              <a:t>Step 1+: Proof Builder</a:t>
+            </a:r>
+          </a:p>
+          <a:p>
+            <a:r>
+              <a:rPr lang="en-GB" b="1" dirty="0"/>
+              <a:t>Step 3+: Extended Genuine Absurdity Property</a:t>
+            </a:r>
+          </a:p>
+          <a:p>
+            <a:r>
+              <a:rPr lang="en-GB" b="1" dirty="0"/>
+              <a:t>Step 4+: Extract Proofs from Arguments</a:t>
+            </a:r>
+          </a:p>
+          <a:p>
+            <a:r>
+              <a:rPr lang="en-GB" b="1" dirty="0"/>
+              <a:t>Step 4++: Argument Builder</a:t>
+            </a:r>
+          </a:p>
+          <a:p>
+            <a:endParaRPr lang="en-US" dirty="0"/>
           </a:p>
         </p:txBody>
       </p:sp>
     </p:spTree>
     <p:extLst>
       <p:ext uri="{BB962C8B-B14F-4D97-AF65-F5344CB8AC3E}">
-        <p14:creationId xmlns:p14="http://schemas.microsoft.com/office/powerpoint/2010/main" val="1763630168"/>
+        <p14:creationId xmlns:p14="http://schemas.microsoft.com/office/powerpoint/2010/main" val="1382299492"/>
       </p:ext>
     </p:extLst>
   </p:cSld>
@@ -13816,7 +13863,7 @@
       </p:grpSpPr>
       <p:sp>
         <p:nvSpPr>
-          <p:cNvPr id="2" name="Title 1"/>
+          <p:cNvPr id="5" name="Title 4"/>
           <p:cNvSpPr>
             <a:spLocks noGrp="1"/>
           </p:cNvSpPr>
@@ -13831,162 +13878,45 @@
           <a:p>
             <a:r>
               <a:rPr lang="en-GB" dirty="0" smtClean="0"/>
-              <a:t>Argumentation Logic Toolkit – Plan</a:t>
+              <a:t>Flowchart</a:t>
             </a:r>
             <a:endParaRPr lang="en-US" dirty="0"/>
           </a:p>
         </p:txBody>
       </p:sp>
-      <p:sp>
-        <p:nvSpPr>
-          <p:cNvPr id="3" name="Content Placeholder 2"/>
-          <p:cNvSpPr>
-            <a:spLocks noGrp="1"/>
-          </p:cNvSpPr>
+      <p:pic>
+        <p:nvPicPr>
+          <p:cNvPr id="7" name="Content Placeholder 6"/>
+          <p:cNvPicPr>
+            <a:picLocks noGrp="1" noChangeAspect="1"/>
+          </p:cNvPicPr>
           <p:nvPr>
-            <p:ph sz="half" idx="1"/>
+            <p:ph idx="1"/>
           </p:nvPr>
-        </p:nvSpPr>
-        <p:spPr/>
-        <p:txBody>
-          <a:bodyPr>
-            <a:normAutofit lnSpcReduction="10000"/>
-          </a:bodyPr>
-          <a:lstStyle/>
-          <a:p>
-            <a:r>
-              <a:rPr lang="en-GB" dirty="0"/>
-              <a:t>Step 1: Generic Theorem </a:t>
-            </a:r>
-            <a:r>
-              <a:rPr lang="en-GB" dirty="0" err="1" smtClean="0"/>
-              <a:t>Prover</a:t>
-            </a:r>
-            <a:endParaRPr lang="en-GB" dirty="0" smtClean="0"/>
-          </a:p>
-          <a:p>
-            <a:r>
-              <a:rPr lang="en-GB" dirty="0" smtClean="0"/>
-              <a:t>Step </a:t>
-            </a:r>
-            <a:r>
-              <a:rPr lang="en-GB" dirty="0"/>
-              <a:t>2: Theorem </a:t>
-            </a:r>
-            <a:r>
-              <a:rPr lang="en-GB" dirty="0" err="1"/>
-              <a:t>Prover</a:t>
-            </a:r>
-            <a:r>
-              <a:rPr lang="en-GB" dirty="0"/>
-              <a:t> fit for purpose</a:t>
-            </a:r>
-          </a:p>
-          <a:p>
-            <a:r>
-              <a:rPr lang="en-GB" dirty="0"/>
-              <a:t>Step 3: Genuine Absurdity Property </a:t>
-            </a:r>
-            <a:r>
-              <a:rPr lang="en-GB" dirty="0" smtClean="0"/>
-              <a:t>check</a:t>
-            </a:r>
-          </a:p>
-          <a:p>
-            <a:r>
-              <a:rPr lang="en-GB" dirty="0" smtClean="0"/>
-              <a:t>Step </a:t>
-            </a:r>
-            <a:r>
-              <a:rPr lang="en-GB" dirty="0"/>
-              <a:t>4: Visualize GAP </a:t>
-            </a:r>
-            <a:r>
-              <a:rPr lang="en-GB" dirty="0" smtClean="0"/>
-              <a:t>Proofs</a:t>
-            </a:r>
-          </a:p>
-          <a:p>
-            <a:r>
-              <a:rPr lang="en-GB" strike="sngStrike" dirty="0" smtClean="0"/>
-              <a:t>Step </a:t>
-            </a:r>
-            <a:r>
-              <a:rPr lang="en-GB" strike="sngStrike" dirty="0"/>
-              <a:t>5: Convert non-GAP to GAP Proofs</a:t>
-            </a:r>
-          </a:p>
-          <a:p>
-            <a:r>
-              <a:rPr lang="en-GB" strike="sngStrike" dirty="0"/>
-              <a:t>Step 6: Introduce Disjunction and Implication</a:t>
-            </a:r>
-          </a:p>
-          <a:p>
-            <a:r>
-              <a:rPr lang="en-GB" strike="sngStrike" dirty="0"/>
-              <a:t>Step 7: Venture into </a:t>
-            </a:r>
-            <a:r>
-              <a:rPr lang="en-GB" strike="sngStrike" dirty="0" err="1"/>
-              <a:t>Paraconsistency</a:t>
-            </a:r>
-            <a:endParaRPr lang="en-US" strike="sngStrike" dirty="0"/>
-          </a:p>
-          <a:p>
-            <a:endParaRPr lang="en-US" b="1" dirty="0"/>
-          </a:p>
-        </p:txBody>
-      </p:sp>
-      <p:sp>
-        <p:nvSpPr>
-          <p:cNvPr id="4" name="Content Placeholder 3"/>
-          <p:cNvSpPr>
-            <a:spLocks noGrp="1"/>
-          </p:cNvSpPr>
-          <p:nvPr>
-            <p:ph sz="half" idx="2"/>
-          </p:nvPr>
-        </p:nvSpPr>
-        <p:spPr/>
-        <p:txBody>
-          <a:bodyPr>
-            <a:normAutofit lnSpcReduction="10000"/>
-          </a:bodyPr>
-          <a:lstStyle/>
-          <a:p>
-            <a:r>
-              <a:rPr lang="en-GB" b="1" dirty="0"/>
-              <a:t>Step 1+: Proof Builder</a:t>
-            </a:r>
-          </a:p>
-          <a:p>
-            <a:r>
-              <a:rPr lang="en-GB" b="1" dirty="0"/>
-              <a:t>Step 3+: Extended Genuine Absurdity Property</a:t>
-            </a:r>
-          </a:p>
-          <a:p>
-            <a:r>
-              <a:rPr lang="en-GB" b="1" dirty="0"/>
-              <a:t>Step 4+: Extract Proofs from Arguments</a:t>
-            </a:r>
-          </a:p>
-          <a:p>
-            <a:r>
-              <a:rPr lang="en-GB" b="1" dirty="0"/>
-              <a:t>Step 4++: Argument Builder</a:t>
-            </a:r>
-          </a:p>
-          <a:p>
-            <a:endParaRPr lang="en-US" dirty="0"/>
-          </a:p>
-        </p:txBody>
-      </p:sp>
+        </p:nvPicPr>
+        <p:blipFill>
+          <a:blip r:embed="rId2">
+            <a:extLst>
+              <a:ext uri="{28A0092B-C50C-407E-A947-70E740481C1C}">
+                <a14:useLocalDpi xmlns:a14="http://schemas.microsoft.com/office/drawing/2010/main" val="0"/>
+              </a:ext>
+            </a:extLst>
+          </a:blip>
+          <a:stretch>
+            <a:fillRect/>
+          </a:stretch>
+        </p:blipFill>
+        <p:spPr>
+          <a:xfrm>
+            <a:off x="1073648" y="2298139"/>
+            <a:ext cx="8270509" cy="4410158"/>
+          </a:xfrm>
+        </p:spPr>
+      </p:pic>
     </p:spTree>
     <p:extLst>
       <p:ext uri="{BB962C8B-B14F-4D97-AF65-F5344CB8AC3E}">
-        <p14:creationId xmlns:p14="http://schemas.microsoft.com/office/powerpoint/2010/main" val="1382299492"/>
+        <p14:creationId xmlns:p14="http://schemas.microsoft.com/office/powerpoint/2010/main" val="4063018443"/>
       </p:ext>
     </p:extLst>
   </p:cSld>
@@ -14022,95 +13952,6 @@
       </p:grpSpPr>
       <p:sp>
         <p:nvSpPr>
-          <p:cNvPr id="5" name="Title 4"/>
-          <p:cNvSpPr>
-            <a:spLocks noGrp="1"/>
-          </p:cNvSpPr>
-          <p:nvPr>
-            <p:ph type="title"/>
-          </p:nvPr>
-        </p:nvSpPr>
-        <p:spPr/>
-        <p:txBody>
-          <a:bodyPr/>
-          <a:lstStyle/>
-          <a:p>
-            <a:r>
-              <a:rPr lang="en-GB" dirty="0" smtClean="0"/>
-              <a:t>Flowchart</a:t>
-            </a:r>
-            <a:endParaRPr lang="en-US" dirty="0"/>
-          </a:p>
-        </p:txBody>
-      </p:sp>
-      <p:pic>
-        <p:nvPicPr>
-          <p:cNvPr id="7" name="Content Placeholder 6"/>
-          <p:cNvPicPr>
-            <a:picLocks noGrp="1" noChangeAspect="1"/>
-          </p:cNvPicPr>
-          <p:nvPr>
-            <p:ph idx="1"/>
-          </p:nvPr>
-        </p:nvPicPr>
-        <p:blipFill>
-          <a:blip r:embed="rId2">
-            <a:extLst>
-              <a:ext uri="{28A0092B-C50C-407E-A947-70E740481C1C}">
-                <a14:useLocalDpi xmlns:a14="http://schemas.microsoft.com/office/drawing/2010/main" val="0"/>
-              </a:ext>
-            </a:extLst>
-          </a:blip>
-          <a:stretch>
-            <a:fillRect/>
-          </a:stretch>
-        </p:blipFill>
-        <p:spPr>
-          <a:xfrm>
-            <a:off x="2364809" y="2603500"/>
-            <a:ext cx="6406695" cy="3416300"/>
-          </a:xfrm>
-        </p:spPr>
-      </p:pic>
-    </p:spTree>
-    <p:extLst>
-      <p:ext uri="{BB962C8B-B14F-4D97-AF65-F5344CB8AC3E}">
-        <p14:creationId xmlns:p14="http://schemas.microsoft.com/office/powerpoint/2010/main" val="4063018443"/>
-      </p:ext>
-    </p:extLst>
-  </p:cSld>
-  <p:clrMapOvr>
-    <a:masterClrMapping/>
-  </p:clrMapOvr>
-  <p:timing>
-    <p:tnLst>
-      <p:par>
-        <p:cTn id="1" dur="indefinite" restart="never" nodeType="tmRoot"/>
-      </p:par>
-    </p:tnLst>
-  </p:timing>
-</p:sld>
-</file>
-
-<file path=ppt/slides/slide15.xml><?xml version="1.0" encoding="utf-8"?>
-<p:sld xmlns:a="http://schemas.openxmlformats.org/drawingml/2006/main" xmlns:r="http://schemas.openxmlformats.org/officeDocument/2006/relationships" xmlns:p="http://schemas.openxmlformats.org/presentationml/2006/main">
-  <p:cSld>
-    <p:spTree>
-      <p:nvGrpSpPr>
-        <p:cNvPr id="1" name=""/>
-        <p:cNvGrpSpPr/>
-        <p:nvPr/>
-      </p:nvGrpSpPr>
-      <p:grpSpPr>
-        <a:xfrm>
-          <a:off x="0" y="0"/>
-          <a:ext cx="0" cy="0"/>
-          <a:chOff x="0" y="0"/>
-          <a:chExt cx="0" cy="0"/>
-        </a:xfrm>
-      </p:grpSpPr>
-      <p:sp>
-        <p:nvSpPr>
           <p:cNvPr id="2" name="Title 1"/>
           <p:cNvSpPr>
             <a:spLocks noGrp="1"/>
@@ -14238,7 +14079,7 @@
 </p:sld>
 </file>
 
-<file path=ppt/slides/slide16.xml><?xml version="1.0" encoding="utf-8"?>
+<file path=ppt/slides/slide15.xml><?xml version="1.0" encoding="utf-8"?>
 <p:sld xmlns:a="http://schemas.openxmlformats.org/drawingml/2006/main" xmlns:r="http://schemas.openxmlformats.org/officeDocument/2006/relationships" xmlns:p="http://schemas.openxmlformats.org/presentationml/2006/main">
   <p:cSld>
     <p:spTree>
@@ -14451,6 +14292,108 @@
 </p:sld>
 </file>
 
+<file path=ppt/slides/slide16.xml><?xml version="1.0" encoding="utf-8"?>
+<p:sld xmlns:a="http://schemas.openxmlformats.org/drawingml/2006/main" xmlns:r="http://schemas.openxmlformats.org/officeDocument/2006/relationships" xmlns:p="http://schemas.openxmlformats.org/presentationml/2006/main">
+  <p:cSld>
+    <p:spTree>
+      <p:nvGrpSpPr>
+        <p:cNvPr id="1" name=""/>
+        <p:cNvGrpSpPr/>
+        <p:nvPr/>
+      </p:nvGrpSpPr>
+      <p:grpSpPr>
+        <a:xfrm>
+          <a:off x="0" y="0"/>
+          <a:ext cx="0" cy="0"/>
+          <a:chOff x="0" y="0"/>
+          <a:chExt cx="0" cy="0"/>
+        </a:xfrm>
+      </p:grpSpPr>
+      <p:sp>
+        <p:nvSpPr>
+          <p:cNvPr id="2" name="Title 1"/>
+          <p:cNvSpPr>
+            <a:spLocks noGrp="1"/>
+          </p:cNvSpPr>
+          <p:nvPr>
+            <p:ph type="title"/>
+          </p:nvPr>
+        </p:nvSpPr>
+        <p:spPr/>
+        <p:txBody>
+          <a:bodyPr/>
+          <a:lstStyle/>
+          <a:p>
+            <a:r>
+              <a:rPr lang="en-GB" dirty="0" smtClean="0"/>
+              <a:t>Step 1+: Proof Builder</a:t>
+            </a:r>
+            <a:endParaRPr lang="en-US" dirty="0"/>
+          </a:p>
+        </p:txBody>
+      </p:sp>
+      <p:sp>
+        <p:nvSpPr>
+          <p:cNvPr id="3" name="Content Placeholder 2"/>
+          <p:cNvSpPr>
+            <a:spLocks noGrp="1"/>
+          </p:cNvSpPr>
+          <p:nvPr>
+            <p:ph idx="1"/>
+          </p:nvPr>
+        </p:nvSpPr>
+        <p:spPr/>
+        <p:txBody>
+          <a:bodyPr/>
+          <a:lstStyle/>
+          <a:p>
+            <a:r>
+              <a:rPr lang="en-GB" dirty="0" smtClean="0"/>
+              <a:t>Allows the user to manually input a proof</a:t>
+            </a:r>
+          </a:p>
+          <a:p>
+            <a:r>
+              <a:rPr lang="en-GB" dirty="0" smtClean="0"/>
+              <a:t>Provides parser and checker that point out mistakes</a:t>
+            </a:r>
+          </a:p>
+          <a:p>
+            <a:r>
+              <a:rPr lang="en-GB" dirty="0" smtClean="0"/>
+              <a:t>Correctness</a:t>
+            </a:r>
+          </a:p>
+          <a:p>
+            <a:pPr lvl="1"/>
+            <a:r>
+              <a:rPr lang="en-GB" dirty="0" smtClean="0"/>
+              <a:t>Manual testing</a:t>
+            </a:r>
+            <a:endParaRPr lang="en-US" dirty="0"/>
+          </a:p>
+        </p:txBody>
+      </p:sp>
+    </p:spTree>
+    <p:extLst>
+      <p:ext uri="{BB962C8B-B14F-4D97-AF65-F5344CB8AC3E}">
+        <p14:creationId xmlns:p14="http://schemas.microsoft.com/office/powerpoint/2010/main" val="3539742373"/>
+      </p:ext>
+    </p:extLst>
+  </p:cSld>
+  <p:clrMapOvr>
+    <a:masterClrMapping/>
+  </p:clrMapOvr>
+  <p:timing>
+    <p:tnLst>
+      <p:par>
+        <p:cTn id="1" dur="indefinite" restart="never" nodeType="tmRoot"/>
+      </p:par>
+    </p:tnLst>
+  </p:timing>
+</p:sld>
+</file>
+
 <file path=ppt/slides/slide17.xml><?xml version="1.0" encoding="utf-8"?>
 <p:sld xmlns:a="http://schemas.openxmlformats.org/drawingml/2006/main" xmlns:r="http://schemas.openxmlformats.org/officeDocument/2006/relationships" xmlns:p="http://schemas.openxmlformats.org/presentationml/2006/main">
   <p:cSld>
@@ -14485,7 +14428,7 @@
           <a:p>
             <a:r>
               <a:rPr lang="en-GB" dirty="0" smtClean="0"/>
-              <a:t>Step 1+: Proof Builder</a:t>
+              <a:t>Step 3: GAP Check</a:t>
             </a:r>
             <a:endParaRPr lang="en-US" dirty="0"/>
           </a:p>
@@ -14508,14 +14451,33 @@
           <a:p>
             <a:r>
               <a:rPr lang="en-GB" dirty="0" smtClean="0"/>
-              <a:t>Allows the user to manually input a proof</a:t>
+              <a:t>Takes a proof as input</a:t>
             </a:r>
           </a:p>
           <a:p>
             <a:r>
               <a:rPr lang="en-GB" dirty="0" smtClean="0"/>
-              <a:t>Provides parser and checker that point out mistakes</a:t>
-            </a:r>
+              <a:t>Uses theorem </a:t>
+            </a:r>
+            <a:r>
+              <a:rPr lang="en-GB" dirty="0" err="1" smtClean="0"/>
+              <a:t>prover</a:t>
+            </a:r>
+            <a:r>
+              <a:rPr lang="en-GB" dirty="0" smtClean="0"/>
+              <a:t> to check whether the proof follows the GAP</a:t>
+            </a:r>
+          </a:p>
+          <a:p>
+            <a:r>
+              <a:rPr lang="en-GB" dirty="0" smtClean="0"/>
+              <a:t>Performance dependent on theorem </a:t>
+            </a:r>
+            <a:r>
+              <a:rPr lang="en-GB" dirty="0" err="1" smtClean="0"/>
+              <a:t>prover</a:t>
+            </a:r>
+            <a:endParaRPr lang="en-GB" dirty="0" smtClean="0"/>
           </a:p>
           <a:p>
             <a:r>
@@ -14527,16 +14489,22 @@
             <a:pPr lvl="1"/>
             <a:r>
               <a:rPr lang="en-GB" dirty="0" smtClean="0"/>
+              <a:t>Unit testing</a:t>
+            </a:r>
+          </a:p>
+          <a:p>
+            <a:pPr lvl="1"/>
+            <a:r>
+              <a:rPr lang="en-GB" dirty="0" smtClean="0"/>
               <a:t>Manual testing</a:t>
             </a:r>
-            <a:endParaRPr lang="en-US" dirty="0"/>
           </a:p>
         </p:txBody>
       </p:sp>
     </p:spTree>
     <p:extLst>
       <p:ext uri="{BB962C8B-B14F-4D97-AF65-F5344CB8AC3E}">
-        <p14:creationId xmlns:p14="http://schemas.microsoft.com/office/powerpoint/2010/main" val="3539742373"/>
+        <p14:creationId xmlns:p14="http://schemas.microsoft.com/office/powerpoint/2010/main" val="2980677482"/>
       </p:ext>
     </p:extLst>
   </p:cSld>
@@ -14587,134 +14555,7 @@
           <a:p>
             <a:r>
               <a:rPr lang="en-GB" dirty="0" smtClean="0"/>
-              <a:t>Step 3: GAP check</a:t>
-            </a:r>
-            <a:endParaRPr lang="en-US" dirty="0"/>
-          </a:p>
-        </p:txBody>
-      </p:sp>
-      <p:sp>
-        <p:nvSpPr>
-          <p:cNvPr id="3" name="Content Placeholder 2"/>
-          <p:cNvSpPr>
-            <a:spLocks noGrp="1"/>
-          </p:cNvSpPr>
-          <p:nvPr>
-            <p:ph idx="1"/>
-          </p:nvPr>
-        </p:nvSpPr>
-        <p:spPr/>
-        <p:txBody>
-          <a:bodyPr/>
-          <a:lstStyle/>
-          <a:p>
-            <a:r>
-              <a:rPr lang="en-GB" dirty="0" smtClean="0"/>
-              <a:t>Takes a proof as input</a:t>
-            </a:r>
-          </a:p>
-          <a:p>
-            <a:r>
-              <a:rPr lang="en-GB" dirty="0" smtClean="0"/>
-              <a:t>Uses theorem </a:t>
-            </a:r>
-            <a:r>
-              <a:rPr lang="en-GB" dirty="0" err="1" smtClean="0"/>
-              <a:t>prover</a:t>
-            </a:r>
-            <a:r>
-              <a:rPr lang="en-GB" dirty="0" smtClean="0"/>
-              <a:t> to check whether the proof follows the GAP</a:t>
-            </a:r>
-          </a:p>
-          <a:p>
-            <a:r>
-              <a:rPr lang="en-GB" dirty="0" smtClean="0"/>
-              <a:t>Performance dependent on theorem </a:t>
-            </a:r>
-            <a:r>
-              <a:rPr lang="en-GB" dirty="0" err="1" smtClean="0"/>
-              <a:t>prover</a:t>
-            </a:r>
-            <a:endParaRPr lang="en-GB" dirty="0" smtClean="0"/>
-          </a:p>
-          <a:p>
-            <a:r>
-              <a:rPr lang="en-GB" dirty="0" smtClean="0"/>
-              <a:t>Correctness</a:t>
-            </a:r>
-          </a:p>
-          <a:p>
-            <a:pPr lvl="1"/>
-            <a:r>
-              <a:rPr lang="en-GB" dirty="0" smtClean="0"/>
-              <a:t>Unit testing</a:t>
-            </a:r>
-          </a:p>
-          <a:p>
-            <a:pPr lvl="1"/>
-            <a:r>
-              <a:rPr lang="en-GB" dirty="0" smtClean="0"/>
-              <a:t>Manual testing</a:t>
-            </a:r>
-          </a:p>
-        </p:txBody>
-      </p:sp>
-    </p:spTree>
-    <p:extLst>
-      <p:ext uri="{BB962C8B-B14F-4D97-AF65-F5344CB8AC3E}">
-        <p14:creationId xmlns:p14="http://schemas.microsoft.com/office/powerpoint/2010/main" val="2980677482"/>
-      </p:ext>
-    </p:extLst>
-  </p:cSld>
-  <p:clrMapOvr>
-    <a:masterClrMapping/>
-  </p:clrMapOvr>
-  <p:timing>
-    <p:tnLst>
-      <p:par>
-        <p:cTn id="1" dur="indefinite" restart="never" nodeType="tmRoot"/>
-      </p:par>
-    </p:tnLst>
-  </p:timing>
-</p:sld>
-</file>
-
-<file path=ppt/slides/slide19.xml><?xml version="1.0" encoding="utf-8"?>
-<p:sld xmlns:a="http://schemas.openxmlformats.org/drawingml/2006/main" xmlns:r="http://schemas.openxmlformats.org/officeDocument/2006/relationships" xmlns:p="http://schemas.openxmlformats.org/presentationml/2006/main">
-  <p:cSld>
-    <p:spTree>
-      <p:nvGrpSpPr>
-        <p:cNvPr id="1" name=""/>
-        <p:cNvGrpSpPr/>
-        <p:nvPr/>
-      </p:nvGrpSpPr>
-      <p:grpSpPr>
-        <a:xfrm>
-          <a:off x="0" y="0"/>
-          <a:ext cx="0" cy="0"/>
-          <a:chOff x="0" y="0"/>
-          <a:chExt cx="0" cy="0"/>
-        </a:xfrm>
-      </p:grpSpPr>
-      <p:sp>
-        <p:nvSpPr>
-          <p:cNvPr id="2" name="Title 1"/>
-          <p:cNvSpPr>
-            <a:spLocks noGrp="1"/>
-          </p:cNvSpPr>
-          <p:nvPr>
-            <p:ph type="title"/>
-          </p:nvPr>
-        </p:nvSpPr>
-        <p:spPr/>
-        <p:txBody>
-          <a:bodyPr/>
-          <a:lstStyle/>
-          <a:p>
-            <a:r>
-              <a:rPr lang="en-GB" dirty="0" smtClean="0"/>
-              <a:t>Step 3+: Extended GAP check</a:t>
+              <a:t>Step 3+: Extended GAP Check</a:t>
             </a:r>
             <a:endParaRPr lang="en-US" dirty="0"/>
           </a:p>
@@ -15156,6 +14997,1440 @@
 </p:sld>
 </file>
 
+<file path=ppt/slides/slide19.xml><?xml version="1.0" encoding="utf-8"?>
+<p:sld xmlns:a="http://schemas.openxmlformats.org/drawingml/2006/main" xmlns:r="http://schemas.openxmlformats.org/officeDocument/2006/relationships" xmlns:p="http://schemas.openxmlformats.org/presentationml/2006/main">
+  <p:cSld>
+    <p:spTree>
+      <p:nvGrpSpPr>
+        <p:cNvPr id="1" name=""/>
+        <p:cNvGrpSpPr/>
+        <p:nvPr/>
+      </p:nvGrpSpPr>
+      <p:grpSpPr>
+        <a:xfrm>
+          <a:off x="0" y="0"/>
+          <a:ext cx="0" cy="0"/>
+          <a:chOff x="0" y="0"/>
+          <a:chExt cx="0" cy="0"/>
+        </a:xfrm>
+      </p:grpSpPr>
+      <p:sp>
+        <p:nvSpPr>
+          <p:cNvPr id="2" name="Title 1"/>
+          <p:cNvSpPr>
+            <a:spLocks noGrp="1"/>
+          </p:cNvSpPr>
+          <p:nvPr>
+            <p:ph type="title"/>
+          </p:nvPr>
+        </p:nvSpPr>
+        <p:spPr/>
+        <p:txBody>
+          <a:bodyPr/>
+          <a:lstStyle/>
+          <a:p>
+            <a:r>
+              <a:rPr lang="en-GB" dirty="0" smtClean="0"/>
+              <a:t>Extended GAP Check Proof Sketch</a:t>
+            </a:r>
+            <a:endParaRPr lang="en-US" dirty="0"/>
+          </a:p>
+        </p:txBody>
+      </p:sp>
+      <mc:AlternateContent xmlns:mc="http://schemas.openxmlformats.org/markup-compatibility/2006" xmlns:a14="http://schemas.microsoft.com/office/drawing/2010/main">
+        <mc:Choice Requires="a14">
+          <p:sp>
+            <p:nvSpPr>
+              <p:cNvPr id="3" name="Content Placeholder 2"/>
+              <p:cNvSpPr>
+                <a:spLocks noGrp="1"/>
+              </p:cNvSpPr>
+              <p:nvPr>
+                <p:ph sz="half" idx="1"/>
+              </p:nvPr>
+            </p:nvSpPr>
+            <p:spPr/>
+            <p:txBody>
+              <a:bodyPr>
+                <a:normAutofit lnSpcReduction="10000"/>
+              </a:bodyPr>
+              <a:lstStyle/>
+              <a:p>
+                <a:r>
+                  <a:rPr lang="en-GB" dirty="0" smtClean="0"/>
+                  <a:t>Case 1: Not referencing sibling derivations</a:t>
+                </a:r>
+              </a:p>
+              <a:p>
+                <a:pPr lvl="1"/>
+                <a:r>
+                  <a:rPr lang="en-GB" dirty="0" smtClean="0"/>
+                  <a:t>Classic GAP</a:t>
+                </a:r>
+              </a:p>
+              <a:p>
+                <a:pPr lvl="2"/>
+                <a:r>
+                  <a:rPr lang="en-GB" dirty="0" smtClean="0"/>
+                  <a:t> </a:t>
+                </a:r>
+                <a14:m>
+                  <m:oMath xmlns:m="http://schemas.openxmlformats.org/officeDocument/2006/math">
+                    <m:r>
+                      <a:rPr lang="en-GB" i="1">
+                        <a:latin typeface="Cambria Math" panose="02040503050406030204" pitchFamily="18" charset="0"/>
+                      </a:rPr>
+                      <m:t>𝑇</m:t>
+                    </m:r>
+                    <m:r>
+                      <a:rPr lang="en-GB" i="1">
+                        <a:latin typeface="Cambria Math" panose="02040503050406030204" pitchFamily="18" charset="0"/>
+                      </a:rPr>
+                      <m:t>∪</m:t>
+                    </m:r>
+                    <m:d>
+                      <m:dPr>
+                        <m:begChr m:val="{"/>
+                        <m:endChr m:val="}"/>
+                        <m:ctrlPr>
+                          <a:rPr lang="en-GB" i="1">
+                            <a:latin typeface="Cambria Math" panose="02040503050406030204" pitchFamily="18" charset="0"/>
+                          </a:rPr>
+                        </m:ctrlPr>
+                      </m:dPr>
+                      <m:e>
+                        <m:sSub>
+                          <m:sSubPr>
+                            <m:ctrlPr>
+                              <a:rPr lang="en-GB" i="1">
+                                <a:latin typeface="Cambria Math" panose="02040503050406030204" pitchFamily="18" charset="0"/>
+                              </a:rPr>
+                            </m:ctrlPr>
+                          </m:sSubPr>
+                          <m:e>
+                            <m:r>
+                              <a:rPr lang="en-GB" i="1">
+                                <a:latin typeface="Cambria Math" panose="02040503050406030204" pitchFamily="18" charset="0"/>
+                              </a:rPr>
+                              <m:t>𝜙</m:t>
+                            </m:r>
+                          </m:e>
+                          <m:sub>
+                            <m:r>
+                              <a:rPr lang="en-GB" i="1">
+                                <a:latin typeface="Cambria Math" panose="02040503050406030204" pitchFamily="18" charset="0"/>
+                              </a:rPr>
+                              <m:t>1</m:t>
+                            </m:r>
+                          </m:sub>
+                        </m:sSub>
+                        <m:r>
+                          <a:rPr lang="en-GB" i="1">
+                            <a:latin typeface="Cambria Math" panose="02040503050406030204" pitchFamily="18" charset="0"/>
+                          </a:rPr>
+                          <m:t>,…,</m:t>
+                        </m:r>
+                        <m:sSub>
+                          <m:sSubPr>
+                            <m:ctrlPr>
+                              <a:rPr lang="en-GB" i="1">
+                                <a:latin typeface="Cambria Math" panose="02040503050406030204" pitchFamily="18" charset="0"/>
+                              </a:rPr>
+                            </m:ctrlPr>
+                          </m:sSubPr>
+                          <m:e>
+                            <m:r>
+                              <a:rPr lang="en-GB" i="1">
+                                <a:latin typeface="Cambria Math" panose="02040503050406030204" pitchFamily="18" charset="0"/>
+                              </a:rPr>
+                              <m:t>𝜙</m:t>
+                            </m:r>
+                          </m:e>
+                          <m:sub>
+                            <m:r>
+                              <a:rPr lang="en-GB" i="1">
+                                <a:latin typeface="Cambria Math" panose="02040503050406030204" pitchFamily="18" charset="0"/>
+                              </a:rPr>
+                              <m:t>𝑘</m:t>
+                            </m:r>
+                          </m:sub>
+                        </m:sSub>
+                      </m:e>
+                    </m:d>
+                    <m:r>
+                      <a:rPr lang="en-GB" i="1">
+                        <a:latin typeface="Cambria Math" panose="02040503050406030204" pitchFamily="18" charset="0"/>
+                      </a:rPr>
+                      <m:t>∪</m:t>
+                    </m:r>
+                    <m:d>
+                      <m:dPr>
+                        <m:begChr m:val="{"/>
+                        <m:endChr m:val="}"/>
+                        <m:ctrlPr>
+                          <a:rPr lang="en-GB" i="1">
+                            <a:latin typeface="Cambria Math" panose="02040503050406030204" pitchFamily="18" charset="0"/>
+                          </a:rPr>
+                        </m:ctrlPr>
+                      </m:dPr>
+                      <m:e>
+                        <m:r>
+                          <a:rPr lang="en-GB" i="1">
+                            <a:latin typeface="Cambria Math" panose="02040503050406030204" pitchFamily="18" charset="0"/>
+                          </a:rPr>
+                          <m:t>¬</m:t>
+                        </m:r>
+                        <m:sSub>
+                          <m:sSubPr>
+                            <m:ctrlPr>
+                              <a:rPr lang="en-GB" i="1">
+                                <a:latin typeface="Cambria Math" panose="02040503050406030204" pitchFamily="18" charset="0"/>
+                              </a:rPr>
+                            </m:ctrlPr>
+                          </m:sSubPr>
+                          <m:e>
+                            <m:r>
+                              <a:rPr lang="en-GB" i="1">
+                                <a:latin typeface="Cambria Math" panose="02040503050406030204" pitchFamily="18" charset="0"/>
+                              </a:rPr>
+                              <m:t>𝜓</m:t>
+                            </m:r>
+                          </m:e>
+                          <m:sub>
+                            <m:r>
+                              <a:rPr lang="en-GB" i="1">
+                                <a:latin typeface="Cambria Math" panose="02040503050406030204" pitchFamily="18" charset="0"/>
+                              </a:rPr>
+                              <m:t>1</m:t>
+                            </m:r>
+                          </m:sub>
+                        </m:sSub>
+                        <m:r>
+                          <a:rPr lang="en-GB" i="1">
+                            <a:latin typeface="Cambria Math" panose="02040503050406030204" pitchFamily="18" charset="0"/>
+                          </a:rPr>
+                          <m:t>,…,¬</m:t>
+                        </m:r>
+                        <m:sSub>
+                          <m:sSubPr>
+                            <m:ctrlPr>
+                              <a:rPr lang="en-GB" i="1">
+                                <a:latin typeface="Cambria Math" panose="02040503050406030204" pitchFamily="18" charset="0"/>
+                              </a:rPr>
+                            </m:ctrlPr>
+                          </m:sSubPr>
+                          <m:e>
+                            <m:r>
+                              <a:rPr lang="en-GB" i="1">
+                                <a:latin typeface="Cambria Math" panose="02040503050406030204" pitchFamily="18" charset="0"/>
+                              </a:rPr>
+                              <m:t>𝜓</m:t>
+                            </m:r>
+                          </m:e>
+                          <m:sub>
+                            <m:r>
+                              <a:rPr lang="en-GB" i="1">
+                                <a:latin typeface="Cambria Math" panose="02040503050406030204" pitchFamily="18" charset="0"/>
+                              </a:rPr>
+                              <m:t>𝑙</m:t>
+                            </m:r>
+                          </m:sub>
+                        </m:sSub>
+                      </m:e>
+                    </m:d>
+                    <m:sSub>
+                      <m:sSubPr>
+                        <m:ctrlPr>
+                          <a:rPr lang="en-GB" i="1">
+                            <a:latin typeface="Cambria Math" panose="02040503050406030204" pitchFamily="18" charset="0"/>
+                          </a:rPr>
+                        </m:ctrlPr>
+                      </m:sSubPr>
+                      <m:e>
+                        <m:r>
+                          <a:rPr lang="en-GB" i="1">
+                            <a:latin typeface="Cambria Math" panose="02040503050406030204" pitchFamily="18" charset="0"/>
+                          </a:rPr>
+                          <m:t>⊬</m:t>
+                        </m:r>
+                      </m:e>
+                      <m:sub>
+                        <m:r>
+                          <a:rPr lang="en-GB" i="1">
+                            <a:latin typeface="Cambria Math" panose="02040503050406030204" pitchFamily="18" charset="0"/>
+                          </a:rPr>
+                          <m:t>𝑀𝑅𝐴</m:t>
+                        </m:r>
+                      </m:sub>
+                    </m:sSub>
+                    <m:r>
+                      <a:rPr lang="en-GB" i="1">
+                        <a:latin typeface="Cambria Math" panose="02040503050406030204" pitchFamily="18" charset="0"/>
+                      </a:rPr>
+                      <m:t>⊥</m:t>
+                    </m:r>
+                  </m:oMath>
+                </a14:m>
+                <a:endParaRPr lang="en-US" dirty="0" smtClean="0"/>
+              </a:p>
+              <a:p>
+                <a:pPr lvl="1"/>
+                <a:r>
+                  <a:rPr lang="en-GB" dirty="0" smtClean="0"/>
+                  <a:t>Extended GAP</a:t>
+                </a:r>
+              </a:p>
+              <a:p>
+                <a:pPr lvl="2"/>
+                <a14:m>
+                  <m:oMath xmlns:m="http://schemas.openxmlformats.org/officeDocument/2006/math">
+                    <m:r>
+                      <a:rPr lang="en-GB" i="1">
+                        <a:latin typeface="Cambria Math" panose="02040503050406030204" pitchFamily="18" charset="0"/>
+                      </a:rPr>
+                      <m:t>𝑇</m:t>
+                    </m:r>
+                    <m:r>
+                      <a:rPr lang="en-GB" i="1">
+                        <a:latin typeface="Cambria Math" panose="02040503050406030204" pitchFamily="18" charset="0"/>
+                      </a:rPr>
+                      <m:t>∪</m:t>
+                    </m:r>
+                    <m:d>
+                      <m:dPr>
+                        <m:begChr m:val="{"/>
+                        <m:endChr m:val="}"/>
+                        <m:ctrlPr>
+                          <a:rPr lang="en-GB" i="1">
+                            <a:latin typeface="Cambria Math" panose="02040503050406030204" pitchFamily="18" charset="0"/>
+                          </a:rPr>
+                        </m:ctrlPr>
+                      </m:dPr>
+                      <m:e>
+                        <m:sSub>
+                          <m:sSubPr>
+                            <m:ctrlPr>
+                              <a:rPr lang="en-GB" i="1">
+                                <a:latin typeface="Cambria Math" panose="02040503050406030204" pitchFamily="18" charset="0"/>
+                              </a:rPr>
+                            </m:ctrlPr>
+                          </m:sSubPr>
+                          <m:e>
+                            <m:r>
+                              <a:rPr lang="en-GB" i="1">
+                                <a:latin typeface="Cambria Math" panose="02040503050406030204" pitchFamily="18" charset="0"/>
+                              </a:rPr>
+                              <m:t>𝜙</m:t>
+                            </m:r>
+                          </m:e>
+                          <m:sub>
+                            <m:r>
+                              <a:rPr lang="en-GB" i="1">
+                                <a:latin typeface="Cambria Math" panose="02040503050406030204" pitchFamily="18" charset="0"/>
+                              </a:rPr>
+                              <m:t>1</m:t>
+                            </m:r>
+                          </m:sub>
+                        </m:sSub>
+                        <m:r>
+                          <a:rPr lang="en-GB" i="1">
+                            <a:latin typeface="Cambria Math" panose="02040503050406030204" pitchFamily="18" charset="0"/>
+                          </a:rPr>
+                          <m:t>,…,</m:t>
+                        </m:r>
+                        <m:sSub>
+                          <m:sSubPr>
+                            <m:ctrlPr>
+                              <a:rPr lang="en-GB" i="1">
+                                <a:latin typeface="Cambria Math" panose="02040503050406030204" pitchFamily="18" charset="0"/>
+                              </a:rPr>
+                            </m:ctrlPr>
+                          </m:sSubPr>
+                          <m:e>
+                            <m:r>
+                              <a:rPr lang="en-GB" i="1">
+                                <a:latin typeface="Cambria Math" panose="02040503050406030204" pitchFamily="18" charset="0"/>
+                              </a:rPr>
+                              <m:t>𝜙</m:t>
+                            </m:r>
+                          </m:e>
+                          <m:sub>
+                            <m:r>
+                              <a:rPr lang="en-GB" i="1">
+                                <a:latin typeface="Cambria Math" panose="02040503050406030204" pitchFamily="18" charset="0"/>
+                              </a:rPr>
+                              <m:t>𝑘</m:t>
+                            </m:r>
+                          </m:sub>
+                        </m:sSub>
+                      </m:e>
+                    </m:d>
+                    <m:r>
+                      <a:rPr lang="en-GB" i="1">
+                        <a:latin typeface="Cambria Math" panose="02040503050406030204" pitchFamily="18" charset="0"/>
+                      </a:rPr>
+                      <m:t>∪</m:t>
+                    </m:r>
+                    <m:d>
+                      <m:dPr>
+                        <m:begChr m:val="{"/>
+                        <m:endChr m:val="}"/>
+                        <m:ctrlPr>
+                          <a:rPr lang="en-GB" i="1">
+                            <a:latin typeface="Cambria Math" panose="02040503050406030204" pitchFamily="18" charset="0"/>
+                          </a:rPr>
+                        </m:ctrlPr>
+                      </m:dPr>
+                      <m:e>
+                        <m:r>
+                          <a:rPr lang="en-GB" i="1">
+                            <a:latin typeface="Cambria Math" panose="02040503050406030204" pitchFamily="18" charset="0"/>
+                          </a:rPr>
+                          <m:t>¬</m:t>
+                        </m:r>
+                        <m:sSub>
+                          <m:sSubPr>
+                            <m:ctrlPr>
+                              <a:rPr lang="en-GB" i="1">
+                                <a:latin typeface="Cambria Math" panose="02040503050406030204" pitchFamily="18" charset="0"/>
+                              </a:rPr>
+                            </m:ctrlPr>
+                          </m:sSubPr>
+                          <m:e>
+                            <m:r>
+                              <a:rPr lang="en-GB" i="1">
+                                <a:latin typeface="Cambria Math" panose="02040503050406030204" pitchFamily="18" charset="0"/>
+                              </a:rPr>
+                              <m:t>𝜓</m:t>
+                            </m:r>
+                          </m:e>
+                          <m:sub>
+                            <m:r>
+                              <a:rPr lang="en-GB" i="1">
+                                <a:latin typeface="Cambria Math" panose="02040503050406030204" pitchFamily="18" charset="0"/>
+                              </a:rPr>
+                              <m:t>1</m:t>
+                            </m:r>
+                          </m:sub>
+                        </m:sSub>
+                        <m:r>
+                          <a:rPr lang="en-GB" i="1">
+                            <a:latin typeface="Cambria Math" panose="02040503050406030204" pitchFamily="18" charset="0"/>
+                          </a:rPr>
+                          <m:t>,…,¬</m:t>
+                        </m:r>
+                        <m:sSub>
+                          <m:sSubPr>
+                            <m:ctrlPr>
+                              <a:rPr lang="en-GB" i="1">
+                                <a:latin typeface="Cambria Math" panose="02040503050406030204" pitchFamily="18" charset="0"/>
+                              </a:rPr>
+                            </m:ctrlPr>
+                          </m:sSubPr>
+                          <m:e>
+                            <m:r>
+                              <a:rPr lang="en-GB" i="1">
+                                <a:latin typeface="Cambria Math" panose="02040503050406030204" pitchFamily="18" charset="0"/>
+                              </a:rPr>
+                              <m:t>𝜓</m:t>
+                            </m:r>
+                          </m:e>
+                          <m:sub>
+                            <m:r>
+                              <a:rPr lang="en-GB" i="1">
+                                <a:latin typeface="Cambria Math" panose="02040503050406030204" pitchFamily="18" charset="0"/>
+                              </a:rPr>
+                              <m:t>𝑙</m:t>
+                            </m:r>
+                          </m:sub>
+                        </m:sSub>
+                      </m:e>
+                    </m:d>
+                    <m:r>
+                      <a:rPr lang="en-GB" i="1">
+                        <a:latin typeface="Cambria Math" panose="02040503050406030204" pitchFamily="18" charset="0"/>
+                      </a:rPr>
+                      <m:t>∪</m:t>
+                    </m:r>
+                    <m:d>
+                      <m:dPr>
+                        <m:begChr m:val="{"/>
+                        <m:endChr m:val="}"/>
+                        <m:ctrlPr>
+                          <a:rPr lang="en-GB" i="1">
+                            <a:latin typeface="Cambria Math" panose="02040503050406030204" pitchFamily="18" charset="0"/>
+                          </a:rPr>
+                        </m:ctrlPr>
+                      </m:dPr>
+                      <m:e>
+                        <m:r>
+                          <a:rPr lang="en-GB" b="0" i="1" smtClean="0">
+                            <a:latin typeface="Cambria Math" panose="02040503050406030204" pitchFamily="18" charset="0"/>
+                          </a:rPr>
+                          <m:t> </m:t>
+                        </m:r>
+                      </m:e>
+                    </m:d>
+                    <m:sSub>
+                      <m:sSubPr>
+                        <m:ctrlPr>
+                          <a:rPr lang="en-GB" i="1">
+                            <a:latin typeface="Cambria Math" panose="02040503050406030204" pitchFamily="18" charset="0"/>
+                          </a:rPr>
+                        </m:ctrlPr>
+                      </m:sSubPr>
+                      <m:e>
+                        <m:r>
+                          <a:rPr lang="en-GB" i="1">
+                            <a:latin typeface="Cambria Math" panose="02040503050406030204" pitchFamily="18" charset="0"/>
+                          </a:rPr>
+                          <m:t>⊬</m:t>
+                        </m:r>
+                      </m:e>
+                      <m:sub>
+                        <m:r>
+                          <a:rPr lang="en-GB" i="1">
+                            <a:latin typeface="Cambria Math" panose="02040503050406030204" pitchFamily="18" charset="0"/>
+                          </a:rPr>
+                          <m:t>𝑀𝑅𝐴</m:t>
+                        </m:r>
+                      </m:sub>
+                    </m:sSub>
+                    <m:r>
+                      <a:rPr lang="en-GB" i="1">
+                        <a:latin typeface="Cambria Math" panose="02040503050406030204" pitchFamily="18" charset="0"/>
+                      </a:rPr>
+                      <m:t>⊥</m:t>
+                    </m:r>
+                  </m:oMath>
+                </a14:m>
+                <a:endParaRPr lang="en-US" dirty="0" smtClean="0"/>
+              </a:p>
+            </p:txBody>
+          </p:sp>
+        </mc:Choice>
+        <mc:Fallback xmlns="">
+          <p:sp>
+            <p:nvSpPr>
+              <p:cNvPr id="3" name="Content Placeholder 2"/>
+              <p:cNvSpPr>
+                <a:spLocks noGrp="1" noRot="1" noChangeAspect="1" noMove="1" noResize="1" noEditPoints="1" noAdjustHandles="1" noChangeArrowheads="1" noChangeShapeType="1" noTextEdit="1"/>
+              </p:cNvSpPr>
+              <p:nvPr>
+                <p:ph sz="half" idx="1"/>
+              </p:nvPr>
+            </p:nvSpPr>
+            <p:spPr>
+              <a:blipFill rotWithShape="0">
+                <a:blip r:embed="rId2"/>
+                <a:stretch>
+                  <a:fillRect l="-253" t="-1783"/>
+                </a:stretch>
+              </a:blipFill>
+            </p:spPr>
+            <p:txBody>
+              <a:bodyPr/>
+              <a:lstStyle/>
+              <a:p>
+                <a:r>
+                  <a:rPr lang="en-US">
+                    <a:noFill/>
+                  </a:rPr>
+                  <a:t> </a:t>
+                </a:r>
+              </a:p>
+            </p:txBody>
+          </p:sp>
+        </mc:Fallback>
+      </mc:AlternateContent>
+      <mc:AlternateContent xmlns:mc="http://schemas.openxmlformats.org/markup-compatibility/2006" xmlns:a14="http://schemas.microsoft.com/office/drawing/2010/main">
+        <mc:Choice Requires="a14">
+          <p:sp>
+            <p:nvSpPr>
+              <p:cNvPr id="4" name="Content Placeholder 3"/>
+              <p:cNvSpPr>
+                <a:spLocks noGrp="1"/>
+              </p:cNvSpPr>
+              <p:nvPr>
+                <p:ph sz="half" idx="2"/>
+              </p:nvPr>
+            </p:nvSpPr>
+            <p:spPr/>
+            <p:txBody>
+              <a:bodyPr>
+                <a:normAutofit lnSpcReduction="10000"/>
+              </a:bodyPr>
+              <a:lstStyle/>
+              <a:p>
+                <a:r>
+                  <a:rPr lang="en-GB" dirty="0" smtClean="0"/>
+                  <a:t>Case 2: Referencing Sibling Derivations</a:t>
+                </a:r>
+              </a:p>
+              <a:p>
+                <a:pPr lvl="1"/>
+                <a:r>
+                  <a:rPr lang="en-GB" dirty="0" smtClean="0"/>
+                  <a:t>Classic GAP</a:t>
+                </a:r>
+              </a:p>
+              <a:p>
+                <a:pPr lvl="2"/>
+                <a:r>
+                  <a:rPr lang="en-GB" dirty="0" smtClean="0"/>
+                  <a:t>Undefined for such proof</a:t>
+                </a:r>
+              </a:p>
+              <a:p>
+                <a:pPr lvl="2"/>
+                <a:r>
+                  <a:rPr lang="en-GB" dirty="0" smtClean="0"/>
+                  <a:t>Taking equivalent proof with shortcuts removed</a:t>
+                </a:r>
+              </a:p>
+              <a:p>
+                <a:pPr lvl="2"/>
+                <a14:m>
+                  <m:oMath xmlns:m="http://schemas.openxmlformats.org/officeDocument/2006/math">
+                    <m:r>
+                      <a:rPr lang="en-GB" i="1">
+                        <a:latin typeface="Cambria Math" panose="02040503050406030204" pitchFamily="18" charset="0"/>
+                      </a:rPr>
+                      <m:t>𝑇</m:t>
+                    </m:r>
+                    <m:r>
+                      <a:rPr lang="en-GB" i="1">
+                        <a:latin typeface="Cambria Math" panose="02040503050406030204" pitchFamily="18" charset="0"/>
+                      </a:rPr>
+                      <m:t>∪</m:t>
+                    </m:r>
+                    <m:d>
+                      <m:dPr>
+                        <m:begChr m:val="{"/>
+                        <m:endChr m:val="}"/>
+                        <m:ctrlPr>
+                          <a:rPr lang="en-GB" i="1">
+                            <a:latin typeface="Cambria Math" panose="02040503050406030204" pitchFamily="18" charset="0"/>
+                          </a:rPr>
+                        </m:ctrlPr>
+                      </m:dPr>
+                      <m:e>
+                        <m:sSub>
+                          <m:sSubPr>
+                            <m:ctrlPr>
+                              <a:rPr lang="en-GB" i="1">
+                                <a:latin typeface="Cambria Math" panose="02040503050406030204" pitchFamily="18" charset="0"/>
+                              </a:rPr>
+                            </m:ctrlPr>
+                          </m:sSubPr>
+                          <m:e>
+                            <m:r>
+                              <a:rPr lang="en-GB" i="1">
+                                <a:latin typeface="Cambria Math" panose="02040503050406030204" pitchFamily="18" charset="0"/>
+                              </a:rPr>
+                              <m:t>𝜙</m:t>
+                            </m:r>
+                          </m:e>
+                          <m:sub>
+                            <m:r>
+                              <a:rPr lang="en-GB" i="1">
+                                <a:latin typeface="Cambria Math" panose="02040503050406030204" pitchFamily="18" charset="0"/>
+                              </a:rPr>
+                              <m:t>1</m:t>
+                            </m:r>
+                          </m:sub>
+                        </m:sSub>
+                        <m:r>
+                          <a:rPr lang="en-GB" i="1">
+                            <a:latin typeface="Cambria Math" panose="02040503050406030204" pitchFamily="18" charset="0"/>
+                          </a:rPr>
+                          <m:t>,…,</m:t>
+                        </m:r>
+                        <m:sSub>
+                          <m:sSubPr>
+                            <m:ctrlPr>
+                              <a:rPr lang="en-GB" i="1">
+                                <a:latin typeface="Cambria Math" panose="02040503050406030204" pitchFamily="18" charset="0"/>
+                              </a:rPr>
+                            </m:ctrlPr>
+                          </m:sSubPr>
+                          <m:e>
+                            <m:r>
+                              <a:rPr lang="en-GB" i="1">
+                                <a:latin typeface="Cambria Math" panose="02040503050406030204" pitchFamily="18" charset="0"/>
+                              </a:rPr>
+                              <m:t>𝜙</m:t>
+                            </m:r>
+                          </m:e>
+                          <m:sub>
+                            <m:r>
+                              <a:rPr lang="en-GB" i="1">
+                                <a:latin typeface="Cambria Math" panose="02040503050406030204" pitchFamily="18" charset="0"/>
+                              </a:rPr>
+                              <m:t>𝑘</m:t>
+                            </m:r>
+                          </m:sub>
+                        </m:sSub>
+                      </m:e>
+                    </m:d>
+                    <m:r>
+                      <a:rPr lang="en-GB" i="1">
+                        <a:latin typeface="Cambria Math" panose="02040503050406030204" pitchFamily="18" charset="0"/>
+                      </a:rPr>
+                      <m:t>∪</m:t>
+                    </m:r>
+                    <m:d>
+                      <m:dPr>
+                        <m:begChr m:val="{"/>
+                        <m:endChr m:val="}"/>
+                        <m:ctrlPr>
+                          <a:rPr lang="en-GB" i="1">
+                            <a:latin typeface="Cambria Math" panose="02040503050406030204" pitchFamily="18" charset="0"/>
+                          </a:rPr>
+                        </m:ctrlPr>
+                      </m:dPr>
+                      <m:e>
+                        <m:r>
+                          <a:rPr lang="en-GB" i="1">
+                            <a:latin typeface="Cambria Math" panose="02040503050406030204" pitchFamily="18" charset="0"/>
+                          </a:rPr>
+                          <m:t>¬</m:t>
+                        </m:r>
+                        <m:sSub>
+                          <m:sSubPr>
+                            <m:ctrlPr>
+                              <a:rPr lang="en-GB" i="1">
+                                <a:latin typeface="Cambria Math" panose="02040503050406030204" pitchFamily="18" charset="0"/>
+                              </a:rPr>
+                            </m:ctrlPr>
+                          </m:sSubPr>
+                          <m:e>
+                            <m:r>
+                              <a:rPr lang="en-GB" i="1">
+                                <a:latin typeface="Cambria Math" panose="02040503050406030204" pitchFamily="18" charset="0"/>
+                              </a:rPr>
+                              <m:t>𝜓</m:t>
+                            </m:r>
+                          </m:e>
+                          <m:sub>
+                            <m:r>
+                              <a:rPr lang="en-GB" i="1">
+                                <a:latin typeface="Cambria Math" panose="02040503050406030204" pitchFamily="18" charset="0"/>
+                              </a:rPr>
+                              <m:t>1</m:t>
+                            </m:r>
+                          </m:sub>
+                        </m:sSub>
+                        <m:r>
+                          <a:rPr lang="en-GB" i="1">
+                            <a:latin typeface="Cambria Math" panose="02040503050406030204" pitchFamily="18" charset="0"/>
+                          </a:rPr>
+                          <m:t>,…,¬</m:t>
+                        </m:r>
+                        <m:sSub>
+                          <m:sSubPr>
+                            <m:ctrlPr>
+                              <a:rPr lang="en-GB" i="1">
+                                <a:latin typeface="Cambria Math" panose="02040503050406030204" pitchFamily="18" charset="0"/>
+                              </a:rPr>
+                            </m:ctrlPr>
+                          </m:sSubPr>
+                          <m:e>
+                            <m:r>
+                              <a:rPr lang="en-GB" i="1">
+                                <a:latin typeface="Cambria Math" panose="02040503050406030204" pitchFamily="18" charset="0"/>
+                              </a:rPr>
+                              <m:t>𝜓</m:t>
+                            </m:r>
+                          </m:e>
+                          <m:sub>
+                            <m:r>
+                              <a:rPr lang="en-GB" i="1">
+                                <a:latin typeface="Cambria Math" panose="02040503050406030204" pitchFamily="18" charset="0"/>
+                              </a:rPr>
+                              <m:t>𝑙</m:t>
+                            </m:r>
+                            <m:r>
+                              <a:rPr lang="en-GB" b="0" i="1" smtClean="0">
+                                <a:latin typeface="Cambria Math" panose="02040503050406030204" pitchFamily="18" charset="0"/>
+                              </a:rPr>
+                              <m:t>+</m:t>
+                            </m:r>
+                            <m:r>
+                              <a:rPr lang="en-GB" b="0" i="1" smtClean="0">
+                                <a:latin typeface="Cambria Math" panose="02040503050406030204" pitchFamily="18" charset="0"/>
+                              </a:rPr>
+                              <m:t>𝑚</m:t>
+                            </m:r>
+                          </m:sub>
+                        </m:sSub>
+                      </m:e>
+                    </m:d>
+                    <m:sSub>
+                      <m:sSubPr>
+                        <m:ctrlPr>
+                          <a:rPr lang="en-GB" i="1">
+                            <a:latin typeface="Cambria Math" panose="02040503050406030204" pitchFamily="18" charset="0"/>
+                          </a:rPr>
+                        </m:ctrlPr>
+                      </m:sSubPr>
+                      <m:e>
+                        <m:r>
+                          <a:rPr lang="en-GB" i="1">
+                            <a:latin typeface="Cambria Math" panose="02040503050406030204" pitchFamily="18" charset="0"/>
+                          </a:rPr>
+                          <m:t>⊬</m:t>
+                        </m:r>
+                      </m:e>
+                      <m:sub>
+                        <m:r>
+                          <a:rPr lang="en-GB" i="1">
+                            <a:latin typeface="Cambria Math" panose="02040503050406030204" pitchFamily="18" charset="0"/>
+                          </a:rPr>
+                          <m:t>𝑀𝑅𝐴</m:t>
+                        </m:r>
+                      </m:sub>
+                    </m:sSub>
+                    <m:r>
+                      <a:rPr lang="en-GB" i="1">
+                        <a:latin typeface="Cambria Math" panose="02040503050406030204" pitchFamily="18" charset="0"/>
+                      </a:rPr>
+                      <m:t>⊥</m:t>
+                    </m:r>
+                  </m:oMath>
+                </a14:m>
+                <a:r>
+                  <a:rPr lang="en-GB" dirty="0" smtClean="0"/>
+                  <a:t> or</a:t>
+                </a:r>
+              </a:p>
+              <a:p>
+                <a:pPr lvl="2"/>
+                <a14:m>
+                  <m:oMath xmlns:m="http://schemas.openxmlformats.org/officeDocument/2006/math">
+                    <m:r>
+                      <a:rPr lang="en-GB" i="1">
+                        <a:latin typeface="Cambria Math" panose="02040503050406030204" pitchFamily="18" charset="0"/>
+                      </a:rPr>
+                      <m:t>𝑇</m:t>
+                    </m:r>
+                    <m:r>
+                      <a:rPr lang="en-GB" i="1">
+                        <a:latin typeface="Cambria Math" panose="02040503050406030204" pitchFamily="18" charset="0"/>
+                      </a:rPr>
+                      <m:t>∪</m:t>
+                    </m:r>
+                    <m:d>
+                      <m:dPr>
+                        <m:begChr m:val="{"/>
+                        <m:endChr m:val="}"/>
+                        <m:ctrlPr>
+                          <a:rPr lang="en-GB" i="1">
+                            <a:latin typeface="Cambria Math" panose="02040503050406030204" pitchFamily="18" charset="0"/>
+                          </a:rPr>
+                        </m:ctrlPr>
+                      </m:dPr>
+                      <m:e>
+                        <m:sSub>
+                          <m:sSubPr>
+                            <m:ctrlPr>
+                              <a:rPr lang="en-GB" i="1">
+                                <a:latin typeface="Cambria Math" panose="02040503050406030204" pitchFamily="18" charset="0"/>
+                              </a:rPr>
+                            </m:ctrlPr>
+                          </m:sSubPr>
+                          <m:e>
+                            <m:r>
+                              <a:rPr lang="en-GB" i="1">
+                                <a:latin typeface="Cambria Math" panose="02040503050406030204" pitchFamily="18" charset="0"/>
+                              </a:rPr>
+                              <m:t>𝜙</m:t>
+                            </m:r>
+                          </m:e>
+                          <m:sub>
+                            <m:r>
+                              <a:rPr lang="en-GB" i="1">
+                                <a:latin typeface="Cambria Math" panose="02040503050406030204" pitchFamily="18" charset="0"/>
+                              </a:rPr>
+                              <m:t>1</m:t>
+                            </m:r>
+                          </m:sub>
+                        </m:sSub>
+                        <m:r>
+                          <a:rPr lang="en-GB" i="1">
+                            <a:latin typeface="Cambria Math" panose="02040503050406030204" pitchFamily="18" charset="0"/>
+                          </a:rPr>
+                          <m:t>,…,</m:t>
+                        </m:r>
+                        <m:sSub>
+                          <m:sSubPr>
+                            <m:ctrlPr>
+                              <a:rPr lang="en-GB" i="1">
+                                <a:latin typeface="Cambria Math" panose="02040503050406030204" pitchFamily="18" charset="0"/>
+                              </a:rPr>
+                            </m:ctrlPr>
+                          </m:sSubPr>
+                          <m:e>
+                            <m:r>
+                              <a:rPr lang="en-GB" i="1">
+                                <a:latin typeface="Cambria Math" panose="02040503050406030204" pitchFamily="18" charset="0"/>
+                              </a:rPr>
+                              <m:t>𝜙</m:t>
+                            </m:r>
+                          </m:e>
+                          <m:sub>
+                            <m:r>
+                              <a:rPr lang="en-GB" i="1">
+                                <a:latin typeface="Cambria Math" panose="02040503050406030204" pitchFamily="18" charset="0"/>
+                              </a:rPr>
+                              <m:t>𝑘</m:t>
+                            </m:r>
+                          </m:sub>
+                        </m:sSub>
+                      </m:e>
+                    </m:d>
+                    <m:r>
+                      <a:rPr lang="en-GB" i="1">
+                        <a:latin typeface="Cambria Math" panose="02040503050406030204" pitchFamily="18" charset="0"/>
+                      </a:rPr>
+                      <m:t>∪</m:t>
+                    </m:r>
+                    <m:d>
+                      <m:dPr>
+                        <m:begChr m:val="{"/>
+                        <m:endChr m:val="}"/>
+                        <m:ctrlPr>
+                          <a:rPr lang="en-GB" i="1">
+                            <a:latin typeface="Cambria Math" panose="02040503050406030204" pitchFamily="18" charset="0"/>
+                          </a:rPr>
+                        </m:ctrlPr>
+                      </m:dPr>
+                      <m:e>
+                        <m:r>
+                          <a:rPr lang="en-GB" i="1">
+                            <a:latin typeface="Cambria Math" panose="02040503050406030204" pitchFamily="18" charset="0"/>
+                          </a:rPr>
+                          <m:t>¬</m:t>
+                        </m:r>
+                        <m:sSub>
+                          <m:sSubPr>
+                            <m:ctrlPr>
+                              <a:rPr lang="en-GB" i="1">
+                                <a:latin typeface="Cambria Math" panose="02040503050406030204" pitchFamily="18" charset="0"/>
+                              </a:rPr>
+                            </m:ctrlPr>
+                          </m:sSubPr>
+                          <m:e>
+                            <m:r>
+                              <a:rPr lang="en-GB" i="1">
+                                <a:latin typeface="Cambria Math" panose="02040503050406030204" pitchFamily="18" charset="0"/>
+                              </a:rPr>
+                              <m:t>𝜓</m:t>
+                            </m:r>
+                          </m:e>
+                          <m:sub>
+                            <m:r>
+                              <a:rPr lang="en-GB" i="1">
+                                <a:latin typeface="Cambria Math" panose="02040503050406030204" pitchFamily="18" charset="0"/>
+                              </a:rPr>
+                              <m:t>1</m:t>
+                            </m:r>
+                          </m:sub>
+                        </m:sSub>
+                        <m:r>
+                          <a:rPr lang="en-GB" i="1">
+                            <a:latin typeface="Cambria Math" panose="02040503050406030204" pitchFamily="18" charset="0"/>
+                          </a:rPr>
+                          <m:t>,…,¬</m:t>
+                        </m:r>
+                        <m:sSub>
+                          <m:sSubPr>
+                            <m:ctrlPr>
+                              <a:rPr lang="en-GB" i="1">
+                                <a:latin typeface="Cambria Math" panose="02040503050406030204" pitchFamily="18" charset="0"/>
+                              </a:rPr>
+                            </m:ctrlPr>
+                          </m:sSubPr>
+                          <m:e>
+                            <m:r>
+                              <a:rPr lang="en-GB" i="1">
+                                <a:latin typeface="Cambria Math" panose="02040503050406030204" pitchFamily="18" charset="0"/>
+                              </a:rPr>
+                              <m:t>𝜓</m:t>
+                            </m:r>
+                          </m:e>
+                          <m:sub>
+                            <m:r>
+                              <a:rPr lang="en-GB" i="1">
+                                <a:latin typeface="Cambria Math" panose="02040503050406030204" pitchFamily="18" charset="0"/>
+                              </a:rPr>
+                              <m:t>𝑙</m:t>
+                            </m:r>
+                          </m:sub>
+                        </m:sSub>
+                      </m:e>
+                    </m:d>
+                    <m:r>
+                      <a:rPr lang="en-GB" i="1">
+                        <a:latin typeface="Cambria Math" panose="02040503050406030204" pitchFamily="18" charset="0"/>
+                      </a:rPr>
+                      <m:t>∪</m:t>
+                    </m:r>
+                    <m:d>
+                      <m:dPr>
+                        <m:begChr m:val="{"/>
+                        <m:endChr m:val="}"/>
+                        <m:ctrlPr>
+                          <a:rPr lang="en-GB" i="1">
+                            <a:latin typeface="Cambria Math" panose="02040503050406030204" pitchFamily="18" charset="0"/>
+                          </a:rPr>
+                        </m:ctrlPr>
+                      </m:dPr>
+                      <m:e>
+                        <m:r>
+                          <a:rPr lang="en-GB" i="1">
+                            <a:latin typeface="Cambria Math" panose="02040503050406030204" pitchFamily="18" charset="0"/>
+                          </a:rPr>
+                          <m:t>¬</m:t>
+                        </m:r>
+                        <m:sSub>
+                          <m:sSubPr>
+                            <m:ctrlPr>
+                              <a:rPr lang="en-GB" i="1">
+                                <a:latin typeface="Cambria Math" panose="02040503050406030204" pitchFamily="18" charset="0"/>
+                              </a:rPr>
+                            </m:ctrlPr>
+                          </m:sSubPr>
+                          <m:e>
+                            <m:r>
+                              <a:rPr lang="en-GB" b="0" i="1" smtClean="0">
+                                <a:latin typeface="Cambria Math" panose="02040503050406030204" pitchFamily="18" charset="0"/>
+                              </a:rPr>
+                              <m:t>𝜓</m:t>
+                            </m:r>
+                          </m:e>
+                          <m:sub>
+                            <m:r>
+                              <a:rPr lang="en-GB" b="0" i="1" smtClean="0">
+                                <a:latin typeface="Cambria Math" panose="02040503050406030204" pitchFamily="18" charset="0"/>
+                              </a:rPr>
+                              <m:t>𝑙</m:t>
+                            </m:r>
+                            <m:r>
+                              <a:rPr lang="en-GB" b="0" i="1" smtClean="0">
+                                <a:latin typeface="Cambria Math" panose="02040503050406030204" pitchFamily="18" charset="0"/>
+                              </a:rPr>
+                              <m:t>+1</m:t>
+                            </m:r>
+                          </m:sub>
+                        </m:sSub>
+                        <m:r>
+                          <a:rPr lang="en-GB" i="1">
+                            <a:latin typeface="Cambria Math" panose="02040503050406030204" pitchFamily="18" charset="0"/>
+                          </a:rPr>
+                          <m:t>,…,¬</m:t>
+                        </m:r>
+                        <m:sSub>
+                          <m:sSubPr>
+                            <m:ctrlPr>
+                              <a:rPr lang="en-GB" i="1">
+                                <a:latin typeface="Cambria Math" panose="02040503050406030204" pitchFamily="18" charset="0"/>
+                              </a:rPr>
+                            </m:ctrlPr>
+                          </m:sSubPr>
+                          <m:e>
+                            <m:r>
+                              <a:rPr lang="en-GB" b="0" i="1" smtClean="0">
+                                <a:latin typeface="Cambria Math" panose="02040503050406030204" pitchFamily="18" charset="0"/>
+                              </a:rPr>
+                              <m:t>𝜓</m:t>
+                            </m:r>
+                          </m:e>
+                          <m:sub>
+                            <m:r>
+                              <a:rPr lang="en-GB" i="1">
+                                <a:latin typeface="Cambria Math" panose="02040503050406030204" pitchFamily="18" charset="0"/>
+                              </a:rPr>
+                              <m:t>𝑚</m:t>
+                            </m:r>
+                          </m:sub>
+                        </m:sSub>
+                      </m:e>
+                    </m:d>
+                    <m:sSub>
+                      <m:sSubPr>
+                        <m:ctrlPr>
+                          <a:rPr lang="en-GB" i="1">
+                            <a:latin typeface="Cambria Math" panose="02040503050406030204" pitchFamily="18" charset="0"/>
+                          </a:rPr>
+                        </m:ctrlPr>
+                      </m:sSubPr>
+                      <m:e>
+                        <m:r>
+                          <a:rPr lang="en-GB" i="1">
+                            <a:latin typeface="Cambria Math" panose="02040503050406030204" pitchFamily="18" charset="0"/>
+                          </a:rPr>
+                          <m:t>⊬</m:t>
+                        </m:r>
+                      </m:e>
+                      <m:sub>
+                        <m:r>
+                          <a:rPr lang="en-GB" i="1">
+                            <a:latin typeface="Cambria Math" panose="02040503050406030204" pitchFamily="18" charset="0"/>
+                          </a:rPr>
+                          <m:t>𝑀𝑅𝐴</m:t>
+                        </m:r>
+                      </m:sub>
+                    </m:sSub>
+                    <m:r>
+                      <a:rPr lang="en-GB" i="1">
+                        <a:latin typeface="Cambria Math" panose="02040503050406030204" pitchFamily="18" charset="0"/>
+                      </a:rPr>
+                      <m:t>⊥</m:t>
+                    </m:r>
+                  </m:oMath>
+                </a14:m>
+                <a:endParaRPr lang="en-US" dirty="0" smtClean="0"/>
+              </a:p>
+              <a:p>
+                <a:pPr lvl="1"/>
+                <a:r>
+                  <a:rPr lang="en-GB" dirty="0" smtClean="0"/>
+                  <a:t>Extended GAP</a:t>
+                </a:r>
+              </a:p>
+              <a:p>
+                <a:pPr lvl="2"/>
+                <a14:m>
+                  <m:oMath xmlns:m="http://schemas.openxmlformats.org/officeDocument/2006/math">
+                    <m:r>
+                      <a:rPr lang="en-GB" i="1">
+                        <a:latin typeface="Cambria Math" panose="02040503050406030204" pitchFamily="18" charset="0"/>
+                      </a:rPr>
+                      <m:t>𝑇</m:t>
+                    </m:r>
+                    <m:r>
+                      <a:rPr lang="en-GB" i="1">
+                        <a:latin typeface="Cambria Math" panose="02040503050406030204" pitchFamily="18" charset="0"/>
+                      </a:rPr>
+                      <m:t>∪</m:t>
+                    </m:r>
+                    <m:d>
+                      <m:dPr>
+                        <m:begChr m:val="{"/>
+                        <m:endChr m:val="}"/>
+                        <m:ctrlPr>
+                          <a:rPr lang="en-GB" i="1">
+                            <a:latin typeface="Cambria Math" panose="02040503050406030204" pitchFamily="18" charset="0"/>
+                          </a:rPr>
+                        </m:ctrlPr>
+                      </m:dPr>
+                      <m:e>
+                        <m:sSub>
+                          <m:sSubPr>
+                            <m:ctrlPr>
+                              <a:rPr lang="en-GB" i="1">
+                                <a:latin typeface="Cambria Math" panose="02040503050406030204" pitchFamily="18" charset="0"/>
+                              </a:rPr>
+                            </m:ctrlPr>
+                          </m:sSubPr>
+                          <m:e>
+                            <m:r>
+                              <a:rPr lang="en-GB" i="1">
+                                <a:latin typeface="Cambria Math" panose="02040503050406030204" pitchFamily="18" charset="0"/>
+                              </a:rPr>
+                              <m:t>𝜙</m:t>
+                            </m:r>
+                          </m:e>
+                          <m:sub>
+                            <m:r>
+                              <a:rPr lang="en-GB" i="1">
+                                <a:latin typeface="Cambria Math" panose="02040503050406030204" pitchFamily="18" charset="0"/>
+                              </a:rPr>
+                              <m:t>1</m:t>
+                            </m:r>
+                          </m:sub>
+                        </m:sSub>
+                        <m:r>
+                          <a:rPr lang="en-GB" i="1">
+                            <a:latin typeface="Cambria Math" panose="02040503050406030204" pitchFamily="18" charset="0"/>
+                          </a:rPr>
+                          <m:t>,…,</m:t>
+                        </m:r>
+                        <m:sSub>
+                          <m:sSubPr>
+                            <m:ctrlPr>
+                              <a:rPr lang="en-GB" i="1">
+                                <a:latin typeface="Cambria Math" panose="02040503050406030204" pitchFamily="18" charset="0"/>
+                              </a:rPr>
+                            </m:ctrlPr>
+                          </m:sSubPr>
+                          <m:e>
+                            <m:r>
+                              <a:rPr lang="en-GB" i="1">
+                                <a:latin typeface="Cambria Math" panose="02040503050406030204" pitchFamily="18" charset="0"/>
+                              </a:rPr>
+                              <m:t>𝜙</m:t>
+                            </m:r>
+                          </m:e>
+                          <m:sub>
+                            <m:r>
+                              <a:rPr lang="en-GB" i="1">
+                                <a:latin typeface="Cambria Math" panose="02040503050406030204" pitchFamily="18" charset="0"/>
+                              </a:rPr>
+                              <m:t>𝑘</m:t>
+                            </m:r>
+                          </m:sub>
+                        </m:sSub>
+                      </m:e>
+                    </m:d>
+                    <m:r>
+                      <a:rPr lang="en-GB" i="1">
+                        <a:latin typeface="Cambria Math" panose="02040503050406030204" pitchFamily="18" charset="0"/>
+                      </a:rPr>
+                      <m:t>∪</m:t>
+                    </m:r>
+                    <m:d>
+                      <m:dPr>
+                        <m:begChr m:val="{"/>
+                        <m:endChr m:val="}"/>
+                        <m:ctrlPr>
+                          <a:rPr lang="en-GB" i="1">
+                            <a:latin typeface="Cambria Math" panose="02040503050406030204" pitchFamily="18" charset="0"/>
+                          </a:rPr>
+                        </m:ctrlPr>
+                      </m:dPr>
+                      <m:e>
+                        <m:r>
+                          <a:rPr lang="en-GB" i="1">
+                            <a:latin typeface="Cambria Math" panose="02040503050406030204" pitchFamily="18" charset="0"/>
+                          </a:rPr>
+                          <m:t>¬</m:t>
+                        </m:r>
+                        <m:sSub>
+                          <m:sSubPr>
+                            <m:ctrlPr>
+                              <a:rPr lang="en-GB" i="1">
+                                <a:latin typeface="Cambria Math" panose="02040503050406030204" pitchFamily="18" charset="0"/>
+                              </a:rPr>
+                            </m:ctrlPr>
+                          </m:sSubPr>
+                          <m:e>
+                            <m:r>
+                              <a:rPr lang="en-GB" i="1">
+                                <a:latin typeface="Cambria Math" panose="02040503050406030204" pitchFamily="18" charset="0"/>
+                              </a:rPr>
+                              <m:t>𝜓</m:t>
+                            </m:r>
+                          </m:e>
+                          <m:sub>
+                            <m:r>
+                              <a:rPr lang="en-GB" i="1">
+                                <a:latin typeface="Cambria Math" panose="02040503050406030204" pitchFamily="18" charset="0"/>
+                              </a:rPr>
+                              <m:t>1</m:t>
+                            </m:r>
+                          </m:sub>
+                        </m:sSub>
+                        <m:r>
+                          <a:rPr lang="en-GB" i="1">
+                            <a:latin typeface="Cambria Math" panose="02040503050406030204" pitchFamily="18" charset="0"/>
+                          </a:rPr>
+                          <m:t>,…,¬</m:t>
+                        </m:r>
+                        <m:sSub>
+                          <m:sSubPr>
+                            <m:ctrlPr>
+                              <a:rPr lang="en-GB" i="1">
+                                <a:latin typeface="Cambria Math" panose="02040503050406030204" pitchFamily="18" charset="0"/>
+                              </a:rPr>
+                            </m:ctrlPr>
+                          </m:sSubPr>
+                          <m:e>
+                            <m:r>
+                              <a:rPr lang="en-GB" i="1">
+                                <a:latin typeface="Cambria Math" panose="02040503050406030204" pitchFamily="18" charset="0"/>
+                              </a:rPr>
+                              <m:t>𝜓</m:t>
+                            </m:r>
+                          </m:e>
+                          <m:sub>
+                            <m:r>
+                              <a:rPr lang="en-GB" i="1">
+                                <a:latin typeface="Cambria Math" panose="02040503050406030204" pitchFamily="18" charset="0"/>
+                              </a:rPr>
+                              <m:t>𝑙</m:t>
+                            </m:r>
+                          </m:sub>
+                        </m:sSub>
+                      </m:e>
+                    </m:d>
+                    <m:r>
+                      <a:rPr lang="en-GB" i="1">
+                        <a:latin typeface="Cambria Math" panose="02040503050406030204" pitchFamily="18" charset="0"/>
+                      </a:rPr>
+                      <m:t>∪</m:t>
+                    </m:r>
+                    <m:d>
+                      <m:dPr>
+                        <m:begChr m:val="{"/>
+                        <m:endChr m:val="}"/>
+                        <m:ctrlPr>
+                          <a:rPr lang="en-GB" i="1">
+                            <a:latin typeface="Cambria Math" panose="02040503050406030204" pitchFamily="18" charset="0"/>
+                          </a:rPr>
+                        </m:ctrlPr>
+                      </m:dPr>
+                      <m:e>
+                        <m:r>
+                          <a:rPr lang="en-GB" i="1">
+                            <a:latin typeface="Cambria Math" panose="02040503050406030204" pitchFamily="18" charset="0"/>
+                          </a:rPr>
+                          <m:t>¬</m:t>
+                        </m:r>
+                        <m:sSub>
+                          <m:sSubPr>
+                            <m:ctrlPr>
+                              <a:rPr lang="en-GB" i="1">
+                                <a:latin typeface="Cambria Math" panose="02040503050406030204" pitchFamily="18" charset="0"/>
+                              </a:rPr>
+                            </m:ctrlPr>
+                          </m:sSubPr>
+                          <m:e>
+                            <m:r>
+                              <a:rPr lang="en-GB" i="1">
+                                <a:latin typeface="Cambria Math" panose="02040503050406030204" pitchFamily="18" charset="0"/>
+                              </a:rPr>
+                              <m:t>𝜒</m:t>
+                            </m:r>
+                          </m:e>
+                          <m:sub>
+                            <m:r>
+                              <a:rPr lang="en-GB" i="1">
+                                <a:latin typeface="Cambria Math" panose="02040503050406030204" pitchFamily="18" charset="0"/>
+                              </a:rPr>
+                              <m:t>1</m:t>
+                            </m:r>
+                          </m:sub>
+                        </m:sSub>
+                        <m:r>
+                          <a:rPr lang="en-GB" i="1">
+                            <a:latin typeface="Cambria Math" panose="02040503050406030204" pitchFamily="18" charset="0"/>
+                          </a:rPr>
+                          <m:t>,…,¬</m:t>
+                        </m:r>
+                        <m:sSub>
+                          <m:sSubPr>
+                            <m:ctrlPr>
+                              <a:rPr lang="en-GB" i="1">
+                                <a:latin typeface="Cambria Math" panose="02040503050406030204" pitchFamily="18" charset="0"/>
+                              </a:rPr>
+                            </m:ctrlPr>
+                          </m:sSubPr>
+                          <m:e>
+                            <m:r>
+                              <a:rPr lang="en-GB" i="1">
+                                <a:latin typeface="Cambria Math" panose="02040503050406030204" pitchFamily="18" charset="0"/>
+                              </a:rPr>
+                              <m:t>𝜒</m:t>
+                            </m:r>
+                          </m:e>
+                          <m:sub>
+                            <m:r>
+                              <a:rPr lang="en-GB" i="1">
+                                <a:latin typeface="Cambria Math" panose="02040503050406030204" pitchFamily="18" charset="0"/>
+                              </a:rPr>
+                              <m:t>𝑚</m:t>
+                            </m:r>
+                          </m:sub>
+                        </m:sSub>
+                      </m:e>
+                    </m:d>
+                    <m:sSub>
+                      <m:sSubPr>
+                        <m:ctrlPr>
+                          <a:rPr lang="en-GB" i="1">
+                            <a:latin typeface="Cambria Math" panose="02040503050406030204" pitchFamily="18" charset="0"/>
+                          </a:rPr>
+                        </m:ctrlPr>
+                      </m:sSubPr>
+                      <m:e>
+                        <m:r>
+                          <a:rPr lang="en-GB" i="1">
+                            <a:latin typeface="Cambria Math" panose="02040503050406030204" pitchFamily="18" charset="0"/>
+                          </a:rPr>
+                          <m:t>⊬</m:t>
+                        </m:r>
+                      </m:e>
+                      <m:sub>
+                        <m:r>
+                          <a:rPr lang="en-GB" i="1">
+                            <a:latin typeface="Cambria Math" panose="02040503050406030204" pitchFamily="18" charset="0"/>
+                          </a:rPr>
+                          <m:t>𝑀𝑅𝐴</m:t>
+                        </m:r>
+                      </m:sub>
+                    </m:sSub>
+                    <m:r>
+                      <a:rPr lang="en-GB" i="1">
+                        <a:latin typeface="Cambria Math" panose="02040503050406030204" pitchFamily="18" charset="0"/>
+                      </a:rPr>
+                      <m:t>⊥</m:t>
+                    </m:r>
+                  </m:oMath>
+                </a14:m>
+                <a:endParaRPr lang="en-US" dirty="0"/>
+              </a:p>
+            </p:txBody>
+          </p:sp>
+        </mc:Choice>
+        <mc:Fallback xmlns="">
+          <p:sp>
+            <p:nvSpPr>
+              <p:cNvPr id="4" name="Content Placeholder 3"/>
+              <p:cNvSpPr>
+                <a:spLocks noGrp="1" noRot="1" noChangeAspect="1" noMove="1" noResize="1" noEditPoints="1" noAdjustHandles="1" noChangeArrowheads="1" noChangeShapeType="1" noTextEdit="1"/>
+              </p:cNvSpPr>
+              <p:nvPr>
+                <p:ph sz="half" idx="2"/>
+              </p:nvPr>
+            </p:nvSpPr>
+            <p:spPr>
+              <a:blipFill rotWithShape="0">
+                <a:blip r:embed="rId3"/>
+                <a:stretch>
+                  <a:fillRect l="-253" t="-1783" r="-1010"/>
+                </a:stretch>
+              </a:blipFill>
+            </p:spPr>
+            <p:txBody>
+              <a:bodyPr/>
+              <a:lstStyle/>
+              <a:p>
+                <a:r>
+                  <a:rPr lang="en-US">
+                    <a:noFill/>
+                  </a:rPr>
+                  <a:t> </a:t>
+                </a:r>
+              </a:p>
+            </p:txBody>
+          </p:sp>
+        </mc:Fallback>
+      </mc:AlternateContent>
+    </p:spTree>
+    <p:extLst>
+      <p:ext uri="{BB962C8B-B14F-4D97-AF65-F5344CB8AC3E}">
+        <p14:creationId xmlns:p14="http://schemas.microsoft.com/office/powerpoint/2010/main" val="2755352224"/>
+      </p:ext>
+    </p:extLst>
+  </p:cSld>
+  <p:clrMapOvr>
+    <a:masterClrMapping/>
+  </p:clrMapOvr>
+</p:sld>
+</file>
+
 <file path=ppt/slides/slide2.xml><?xml version="1.0" encoding="utf-8"?>
 <p:sld xmlns:a="http://schemas.openxmlformats.org/drawingml/2006/main" xmlns:r="http://schemas.openxmlformats.org/officeDocument/2006/relationships" xmlns:p="http://schemas.openxmlformats.org/presentationml/2006/main">
   <p:cSld>
@@ -15629,24 +16904,21 @@
       </p:sp>
       <p:pic>
         <p:nvPicPr>
-          <p:cNvPr id="6" name="Content Placeholder 2"/>
+          <p:cNvPr id="7" name="Content Placeholder 7"/>
           <p:cNvPicPr>
-            <a:picLocks noGrp="1" noChangeAspect="1"/>
+            <a:picLocks noChangeAspect="1"/>
           </p:cNvPicPr>
-          <p:nvPr>
-            <p:ph sz="half" idx="2"/>
-          </p:nvPr>
+          <p:nvPr/>
         </p:nvPicPr>
-        <p:blipFill>
+        <p:blipFill rotWithShape="1">
           <a:blip r:embed="rId2"/>
-          <a:stretch>
-            <a:fillRect/>
-          </a:stretch>
+          <a:srcRect l="49604" t="13673" r="29262" b="17446"/>
+          <a:stretch/>
         </p:blipFill>
         <p:spPr>
           <a:xfrm>
-            <a:off x="8290700" y="2603500"/>
-            <a:ext cx="2667271" cy="3416300"/>
+            <a:off x="6263230" y="2444469"/>
+            <a:ext cx="1950182" cy="3575331"/>
           </a:xfrm>
           <a:prstGeom prst="rect">
             <a:avLst/>
@@ -15655,7 +16927,7 @@
       </p:pic>
       <p:pic>
         <p:nvPicPr>
-          <p:cNvPr id="7" name="Content Placeholder 7"/>
+          <p:cNvPr id="4" name="Picture 3"/>
           <p:cNvPicPr>
             <a:picLocks noChangeAspect="1"/>
           </p:cNvPicPr>
@@ -15663,13 +16935,13 @@
         </p:nvPicPr>
         <p:blipFill rotWithShape="1">
           <a:blip r:embed="rId3"/>
-          <a:srcRect l="49604" t="13673" r="29262" b="17446"/>
+          <a:srcRect l="46167" t="22485" r="34470" b="18363"/>
           <a:stretch/>
         </p:blipFill>
         <p:spPr>
           <a:xfrm>
-            <a:off x="6263230" y="2444469"/>
-            <a:ext cx="1950182" cy="3575331"/>
+            <a:off x="8601833" y="2279337"/>
+            <a:ext cx="2567749" cy="4412189"/>
           </a:xfrm>
           <a:prstGeom prst="rect">
             <a:avLst/>
@@ -17801,6 +19073,12 @@
                   <a:rPr lang="en-GB" dirty="0" smtClean="0"/>
                   <a:t>Defined only over conjunction and negation</a:t>
                 </a:r>
+              </a:p>
+              <a:p>
+                <a:r>
+                  <a:rPr lang="en-GB" dirty="0" smtClean="0"/>
+                  <a:t>Does not address sibling derivations</a:t>
+                </a:r>
                 <a:endParaRPr lang="en-US" dirty="0"/>
               </a:p>
             </p:txBody>
@@ -18054,6 +19332,48 @@
           </a:prstGeom>
         </p:spPr>
       </p:pic>
+      <p:sp>
+        <p:nvSpPr>
+          <p:cNvPr id="7" name="Left Arrow 6"/>
+          <p:cNvSpPr/>
+          <p:nvPr/>
+        </p:nvSpPr>
+        <p:spPr>
+          <a:xfrm>
+            <a:off x="10074584" y="4946517"/>
+            <a:ext cx="1596419" cy="484632"/>
+          </a:xfrm>
+          <a:prstGeom prst="leftArrow">
+            <a:avLst/>
+          </a:prstGeom>
+        </p:spPr>
+        <p:style>
+          <a:lnRef idx="0">
+            <a:schemeClr val="accent1"/>
+          </a:lnRef>
+          <a:fillRef idx="1003">
+            <a:schemeClr val="dk2"/>
+          </a:fillRef>
+          <a:effectRef idx="3">
+            <a:schemeClr val="accent1"/>
+          </a:effectRef>
+          <a:fontRef idx="minor">
+            <a:schemeClr val="lt1"/>
+          </a:fontRef>
+        </p:style>
+        <p:txBody>
+          <a:bodyPr rtlCol="0" anchor="ctr"/>
+          <a:lstStyle/>
+          <a:p>
+            <a:pPr algn="ctr"/>
+            <a:r>
+              <a:rPr lang="en-GB" sz="1600" dirty="0" smtClean="0"/>
+              <a:t>unnecessary</a:t>
+            </a:r>
+            <a:endParaRPr lang="en-US" sz="1600" dirty="0"/>
+          </a:p>
+        </p:txBody>
+      </p:sp>
     </p:spTree>
     <p:extLst>
       <p:ext uri="{BB962C8B-B14F-4D97-AF65-F5344CB8AC3E}">
@@ -19622,6 +20942,12 @@
                   <a:rPr lang="en-GB" dirty="0" smtClean="0"/>
                   <a:t>Assume theory </a:t>
                 </a:r>
+                <a:endParaRPr lang="en-GB" b="0" i="1" dirty="0" smtClean="0">
+                  <a:latin typeface="Cambria Math" panose="02040503050406030204" pitchFamily="18" charset="0"/>
+                </a:endParaRPr>
+              </a:p>
+              <a:p>
+                <a:pPr lvl="1"/>
                 <a14:m>
                   <m:oMath xmlns:m="http://schemas.openxmlformats.org/officeDocument/2006/math">
                     <m:r>
@@ -19792,7 +21118,7 @@
               <a:blipFill rotWithShape="0">
                 <a:blip r:embed="rId2"/>
                 <a:stretch>
-                  <a:fillRect l="-253" t="-12656"/>
+                  <a:fillRect l="-253" t="-891"/>
                 </a:stretch>
               </a:blipFill>
             </p:spPr>

</xml_diff>